<commit_message>
update classroom expectations T2 22-23
</commit_message>
<xml_diff>
--- a/IntroHyland/ClassroomExpectations.pptx
+++ b/IntroHyland/ClassroomExpectations.pptx
@@ -5,24 +5,26 @@
     <p:sldMasterId id="2147483676" r:id="rId1"/>
   </p:sldMasterIdLst>
   <p:notesMasterIdLst>
-    <p:notesMasterId r:id="rId5"/>
+    <p:notesMasterId r:id="rId7"/>
   </p:notesMasterIdLst>
   <p:sldIdLst>
     <p:sldId id="256" r:id="rId2"/>
     <p:sldId id="274" r:id="rId3"/>
-    <p:sldId id="266" r:id="rId4"/>
+    <p:sldId id="277" r:id="rId4"/>
+    <p:sldId id="276" r:id="rId5"/>
+    <p:sldId id="266" r:id="rId6"/>
   </p:sldIdLst>
   <p:sldSz cx="9144000" cy="5143500" type="screen16x9"/>
   <p:notesSz cx="6858000" cy="9144000"/>
   <p:embeddedFontLst>
     <p:embeddedFont>
       <p:font typeface="Krona One" panose="020B0604020202020204" charset="0"/>
-      <p:regular r:id="rId6"/>
+      <p:regular r:id="rId8"/>
     </p:embeddedFont>
     <p:embeddedFont>
       <p:font typeface="Miriam Libre" panose="00000500000000000000" pitchFamily="2" charset="-79"/>
-      <p:regular r:id="rId7"/>
-      <p:bold r:id="rId8"/>
+      <p:regular r:id="rId9"/>
+      <p:bold r:id="rId10"/>
     </p:embeddedFont>
   </p:embeddedFontLst>
   <p:defaultTextStyle>
@@ -1766,6 +1768,274 @@
 </file>
 
 <file path=ppt/notesSlides/notesSlide3.xml><?xml version="1.0" encoding="utf-8"?>
+<p:notes xmlns:a="http://schemas.openxmlformats.org/drawingml/2006/main" xmlns:r="http://schemas.openxmlformats.org/officeDocument/2006/relationships" xmlns:p="http://schemas.openxmlformats.org/presentationml/2006/main">
+  <p:cSld>
+    <p:spTree>
+      <p:nvGrpSpPr>
+        <p:cNvPr id="1" name=""/>
+        <p:cNvGrpSpPr/>
+        <p:nvPr/>
+      </p:nvGrpSpPr>
+      <p:grpSpPr>
+        <a:xfrm>
+          <a:off x="0" y="0"/>
+          <a:ext cx="0" cy="0"/>
+          <a:chOff x="0" y="0"/>
+          <a:chExt cx="0" cy="0"/>
+        </a:xfrm>
+      </p:grpSpPr>
+      <p:sp>
+        <p:nvSpPr>
+          <p:cNvPr id="2" name="Slide Image Placeholder 1"/>
+          <p:cNvSpPr>
+            <a:spLocks noGrp="1" noRot="1" noChangeAspect="1"/>
+          </p:cNvSpPr>
+          <p:nvPr>
+            <p:ph type="sldImg"/>
+          </p:nvPr>
+        </p:nvSpPr>
+        <p:spPr>
+          <a:xfrm>
+            <a:off x="381000" y="685800"/>
+            <a:ext cx="6096000" cy="3429000"/>
+          </a:xfrm>
+        </p:spPr>
+      </p:sp>
+      <p:sp>
+        <p:nvSpPr>
+          <p:cNvPr id="3" name="Notes Placeholder 2"/>
+          <p:cNvSpPr>
+            <a:spLocks noGrp="1"/>
+          </p:cNvSpPr>
+          <p:nvPr>
+            <p:ph type="body" idx="1"/>
+          </p:nvPr>
+        </p:nvSpPr>
+        <p:spPr/>
+        <p:txBody>
+          <a:bodyPr/>
+          <a:lstStyle/>
+          <a:p>
+            <a:r>
+              <a:rPr lang="en-US" dirty="0"/>
+              <a:t>Given those expectations, here are some specific rules that embody those ideas. We will start with the DON’Ts. Do not:</a:t>
+            </a:r>
+          </a:p>
+          <a:p>
+            <a:r>
+              <a:rPr lang="en-US" dirty="0"/>
+              <a:t>Play sound from your </a:t>
+            </a:r>
+            <a:r>
+              <a:rPr lang="en-US" dirty="0" err="1"/>
+              <a:t>chromebook</a:t>
+            </a:r>
+            <a:endParaRPr lang="en-US" dirty="0"/>
+          </a:p>
+          <a:p>
+            <a:r>
+              <a:rPr lang="en-US" dirty="0"/>
+              <a:t>Write on the big screen</a:t>
+            </a:r>
+          </a:p>
+          <a:p>
+            <a:r>
+              <a:rPr lang="en-US" dirty="0"/>
+              <a:t>Hit each other</a:t>
+            </a:r>
+          </a:p>
+          <a:p>
+            <a:r>
+              <a:rPr lang="en-US" dirty="0"/>
+              <a:t>Distract each other</a:t>
+            </a:r>
+          </a:p>
+          <a:p>
+            <a:r>
+              <a:rPr lang="en-US" dirty="0"/>
+              <a:t>Or be mean to each other! Now let’s take a look at some DOs. Do:</a:t>
+            </a:r>
+          </a:p>
+          <a:p>
+            <a:r>
+              <a:rPr lang="en-US" dirty="0"/>
+              <a:t>Stay in your seats (please)</a:t>
+            </a:r>
+          </a:p>
+          <a:p>
+            <a:r>
+              <a:rPr lang="en-US" dirty="0"/>
+              <a:t>Throw away your candy wrappers – or </a:t>
+            </a:r>
+            <a:r>
+              <a:rPr lang="en-US" dirty="0" err="1"/>
+              <a:t>Ms</a:t>
+            </a:r>
+            <a:r>
+              <a:rPr lang="en-US" dirty="0"/>
+              <a:t> Bids will get mad at us</a:t>
+            </a:r>
+          </a:p>
+          <a:p>
+            <a:r>
+              <a:rPr lang="en-US" dirty="0"/>
+              <a:t>Chill – don’t go nuts all the time</a:t>
+            </a:r>
+          </a:p>
+          <a:p>
+            <a:r>
+              <a:rPr lang="en-US" dirty="0"/>
+              <a:t>And finally, be excellent to each other – this one kind of sums it up. Be respectful of your fellow students, and be respectful of us – we are taking time to be here to help you learn, and we want everyone to get the most out of it that they can!</a:t>
+            </a:r>
+          </a:p>
+          <a:p>
+            <a:endParaRPr lang="en-US" dirty="0"/>
+          </a:p>
+          <a:p>
+            <a:endParaRPr lang="en-US" dirty="0"/>
+          </a:p>
+        </p:txBody>
+      </p:sp>
+    </p:spTree>
+    <p:extLst>
+      <p:ext uri="{BB962C8B-B14F-4D97-AF65-F5344CB8AC3E}">
+        <p14:creationId xmlns:p14="http://schemas.microsoft.com/office/powerpoint/2010/main" val="626151014"/>
+      </p:ext>
+    </p:extLst>
+  </p:cSld>
+  <p:clrMapOvr>
+    <a:masterClrMapping/>
+  </p:clrMapOvr>
+</p:notes>
+</file>
+
+<file path=ppt/notesSlides/notesSlide4.xml><?xml version="1.0" encoding="utf-8"?>
+<p:notes xmlns:a="http://schemas.openxmlformats.org/drawingml/2006/main" xmlns:r="http://schemas.openxmlformats.org/officeDocument/2006/relationships" xmlns:p="http://schemas.openxmlformats.org/presentationml/2006/main">
+  <p:cSld>
+    <p:spTree>
+      <p:nvGrpSpPr>
+        <p:cNvPr id="1" name=""/>
+        <p:cNvGrpSpPr/>
+        <p:nvPr/>
+      </p:nvGrpSpPr>
+      <p:grpSpPr>
+        <a:xfrm>
+          <a:off x="0" y="0"/>
+          <a:ext cx="0" cy="0"/>
+          <a:chOff x="0" y="0"/>
+          <a:chExt cx="0" cy="0"/>
+        </a:xfrm>
+      </p:grpSpPr>
+      <p:sp>
+        <p:nvSpPr>
+          <p:cNvPr id="2" name="Slide Image Placeholder 1"/>
+          <p:cNvSpPr>
+            <a:spLocks noGrp="1" noRot="1" noChangeAspect="1"/>
+          </p:cNvSpPr>
+          <p:nvPr>
+            <p:ph type="sldImg"/>
+          </p:nvPr>
+        </p:nvSpPr>
+        <p:spPr>
+          <a:xfrm>
+            <a:off x="381000" y="685800"/>
+            <a:ext cx="6096000" cy="3429000"/>
+          </a:xfrm>
+        </p:spPr>
+      </p:sp>
+      <p:sp>
+        <p:nvSpPr>
+          <p:cNvPr id="3" name="Notes Placeholder 2"/>
+          <p:cNvSpPr>
+            <a:spLocks noGrp="1"/>
+          </p:cNvSpPr>
+          <p:nvPr>
+            <p:ph type="body" idx="1"/>
+          </p:nvPr>
+        </p:nvSpPr>
+        <p:spPr/>
+        <p:txBody>
+          <a:bodyPr/>
+          <a:lstStyle/>
+          <a:p>
+            <a:r>
+              <a:rPr lang="en-US" dirty="0"/>
+              <a:t>You might not care to respect these expectations, and still have some desire to disobey. So what happens then?</a:t>
+            </a:r>
+          </a:p>
+          <a:p>
+            <a:r>
+              <a:rPr lang="en-US" dirty="0"/>
+              <a:t>Well, we may…</a:t>
+            </a:r>
+          </a:p>
+          <a:p>
+            <a:r>
+              <a:rPr lang="en-US" dirty="0"/>
+              <a:t>Take away your chance to get candy</a:t>
+            </a:r>
+          </a:p>
+          <a:p>
+            <a:r>
+              <a:rPr lang="en-US" dirty="0"/>
+              <a:t>Tell you again what we want you to do</a:t>
+            </a:r>
+          </a:p>
+          <a:p>
+            <a:r>
+              <a:rPr lang="en-US" dirty="0"/>
+              <a:t>Let you retry something you did wrong</a:t>
+            </a:r>
+          </a:p>
+          <a:p>
+            <a:r>
+              <a:rPr lang="en-US" dirty="0"/>
+              <a:t>Send you out into the hall, or to another seat in the classroom</a:t>
+            </a:r>
+          </a:p>
+          <a:p>
+            <a:r>
+              <a:rPr lang="en-US" dirty="0"/>
+              <a:t>And lastly, </a:t>
+            </a:r>
+            <a:r>
+              <a:rPr lang="en-US" b="1" dirty="0"/>
+              <a:t>we will not hesitate to call Mr. Taylor or Ms. Mac</a:t>
+            </a:r>
+            <a:r>
+              <a:rPr lang="en-US" b="0" dirty="0"/>
+              <a:t>.</a:t>
+            </a:r>
+          </a:p>
+          <a:p>
+            <a:r>
+              <a:rPr lang="en-US" b="0" dirty="0"/>
+              <a:t>You probably don’t want us to do that – so please try to behave so we don’t have to get to that point </a:t>
+            </a:r>
+            <a:r>
+              <a:rPr lang="en-US" b="0" dirty="0">
+                <a:sym typeface="Wingdings" panose="05000000000000000000" pitchFamily="2" charset="2"/>
+              </a:rPr>
+              <a:t></a:t>
+            </a:r>
+            <a:endParaRPr lang="en-US" dirty="0"/>
+          </a:p>
+        </p:txBody>
+      </p:sp>
+    </p:spTree>
+    <p:extLst>
+      <p:ext uri="{BB962C8B-B14F-4D97-AF65-F5344CB8AC3E}">
+        <p14:creationId xmlns:p14="http://schemas.microsoft.com/office/powerpoint/2010/main" val="1268706201"/>
+      </p:ext>
+    </p:extLst>
+  </p:cSld>
+  <p:clrMapOvr>
+    <a:masterClrMapping/>
+  </p:clrMapOvr>
+</p:notes>
+</file>
+
+<file path=ppt/notesSlides/notesSlide5.xml><?xml version="1.0" encoding="utf-8"?>
 <p:notes xmlns:a="http://schemas.openxmlformats.org/drawingml/2006/main" xmlns:r="http://schemas.openxmlformats.org/officeDocument/2006/relationships" xmlns:p="http://schemas.openxmlformats.org/presentationml/2006/main" showMasterSp="0" showMasterPhAnim="0">
   <p:cSld>
     <p:spTree>
@@ -10384,6 +10654,2231 @@
   <p:cSld>
     <p:spTree>
       <p:nvGrpSpPr>
+        <p:cNvPr id="1" name=""/>
+        <p:cNvGrpSpPr/>
+        <p:nvPr/>
+      </p:nvGrpSpPr>
+      <p:grpSpPr>
+        <a:xfrm>
+          <a:off x="0" y="0"/>
+          <a:ext cx="0" cy="0"/>
+          <a:chOff x="0" y="0"/>
+          <a:chExt cx="0" cy="0"/>
+        </a:xfrm>
+      </p:grpSpPr>
+      <p:sp>
+        <p:nvSpPr>
+          <p:cNvPr id="2" name="Title 1">
+            <a:extLst>
+              <a:ext uri="{FF2B5EF4-FFF2-40B4-BE49-F238E27FC236}">
+                <a16:creationId xmlns:a16="http://schemas.microsoft.com/office/drawing/2014/main" id="{772E2426-DD00-41D7-8AD0-B44702A67DE8}"/>
+              </a:ext>
+            </a:extLst>
+          </p:cNvPr>
+          <p:cNvSpPr>
+            <a:spLocks noGrp="1"/>
+          </p:cNvSpPr>
+          <p:nvPr>
+            <p:ph type="title"/>
+          </p:nvPr>
+        </p:nvSpPr>
+        <p:spPr/>
+        <p:txBody>
+          <a:bodyPr/>
+          <a:lstStyle/>
+          <a:p>
+            <a:r>
+              <a:rPr lang="en-US" dirty="0"/>
+              <a:t>EXPECTATIONS -&gt; </a:t>
+            </a:r>
+            <a:r>
+              <a:rPr lang="en-US" dirty="0">
+                <a:highlight>
+                  <a:srgbClr val="97E4FF"/>
+                </a:highlight>
+              </a:rPr>
+              <a:t>RULES</a:t>
+            </a:r>
+          </a:p>
+        </p:txBody>
+      </p:sp>
+      <p:sp>
+        <p:nvSpPr>
+          <p:cNvPr id="3" name="Subtitle 2">
+            <a:extLst>
+              <a:ext uri="{FF2B5EF4-FFF2-40B4-BE49-F238E27FC236}">
+                <a16:creationId xmlns:a16="http://schemas.microsoft.com/office/drawing/2014/main" id="{2DF59E8A-FE2D-4F79-A55B-E3D6607BBAED}"/>
+              </a:ext>
+            </a:extLst>
+          </p:cNvPr>
+          <p:cNvSpPr>
+            <a:spLocks noGrp="1"/>
+          </p:cNvSpPr>
+          <p:nvPr>
+            <p:ph type="subTitle" idx="1"/>
+          </p:nvPr>
+        </p:nvSpPr>
+        <p:spPr>
+          <a:xfrm>
+            <a:off x="1066025" y="1498601"/>
+            <a:ext cx="2773200" cy="572700"/>
+          </a:xfrm>
+        </p:spPr>
+        <p:txBody>
+          <a:bodyPr/>
+          <a:lstStyle/>
+          <a:p>
+            <a:r>
+              <a:rPr lang="en-US" dirty="0"/>
+              <a:t>DO</a:t>
+            </a:r>
+          </a:p>
+        </p:txBody>
+      </p:sp>
+      <p:sp>
+        <p:nvSpPr>
+          <p:cNvPr id="5" name="Subtitle 4">
+            <a:extLst>
+              <a:ext uri="{FF2B5EF4-FFF2-40B4-BE49-F238E27FC236}">
+                <a16:creationId xmlns:a16="http://schemas.microsoft.com/office/drawing/2014/main" id="{2C874D6E-776C-459D-A808-FC71A9921BAA}"/>
+              </a:ext>
+            </a:extLst>
+          </p:cNvPr>
+          <p:cNvSpPr>
+            <a:spLocks noGrp="1"/>
+          </p:cNvSpPr>
+          <p:nvPr>
+            <p:ph type="subTitle" idx="3"/>
+          </p:nvPr>
+        </p:nvSpPr>
+        <p:spPr>
+          <a:xfrm>
+            <a:off x="5322475" y="1603001"/>
+            <a:ext cx="2773200" cy="468300"/>
+          </a:xfrm>
+        </p:spPr>
+        <p:txBody>
+          <a:bodyPr/>
+          <a:lstStyle/>
+          <a:p>
+            <a:r>
+              <a:rPr lang="en-US" dirty="0"/>
+              <a:t>DON’T</a:t>
+            </a:r>
+          </a:p>
+        </p:txBody>
+      </p:sp>
+      <p:sp>
+        <p:nvSpPr>
+          <p:cNvPr id="7" name="Rectangle 6">
+            <a:extLst>
+              <a:ext uri="{FF2B5EF4-FFF2-40B4-BE49-F238E27FC236}">
+                <a16:creationId xmlns:a16="http://schemas.microsoft.com/office/drawing/2014/main" id="{48E95274-E44F-4629-84A0-4B71306431A5}"/>
+              </a:ext>
+            </a:extLst>
+          </p:cNvPr>
+          <p:cNvSpPr/>
+          <p:nvPr/>
+        </p:nvSpPr>
+        <p:spPr>
+          <a:xfrm>
+            <a:off x="605956" y="2071302"/>
+            <a:ext cx="1404389" cy="593594"/>
+          </a:xfrm>
+          <a:prstGeom prst="rect">
+            <a:avLst/>
+          </a:prstGeom>
+          <a:solidFill>
+            <a:schemeClr val="accent3"/>
+          </a:solidFill>
+          <a:ln>
+            <a:solidFill>
+              <a:schemeClr val="tx1"/>
+            </a:solidFill>
+          </a:ln>
+        </p:spPr>
+        <p:style>
+          <a:lnRef idx="2">
+            <a:schemeClr val="accent1">
+              <a:shade val="50000"/>
+            </a:schemeClr>
+          </a:lnRef>
+          <a:fillRef idx="1">
+            <a:schemeClr val="accent1"/>
+          </a:fillRef>
+          <a:effectRef idx="0">
+            <a:schemeClr val="accent1"/>
+          </a:effectRef>
+          <a:fontRef idx="minor">
+            <a:schemeClr val="lt1"/>
+          </a:fontRef>
+        </p:style>
+        <p:txBody>
+          <a:bodyPr rtlCol="0" anchor="ctr"/>
+          <a:lstStyle/>
+          <a:p>
+            <a:pPr algn="ctr"/>
+            <a:r>
+              <a:rPr lang="en-US" b="1" dirty="0">
+                <a:solidFill>
+                  <a:schemeClr val="tx1"/>
+                </a:solidFill>
+                <a:latin typeface="Miriam Libre" panose="00000500000000000000" pitchFamily="2" charset="-79"/>
+                <a:cs typeface="Miriam Libre" panose="00000500000000000000" pitchFamily="2" charset="-79"/>
+              </a:rPr>
+              <a:t>STAY IN YOUR SEATS 🪑</a:t>
+            </a:r>
+          </a:p>
+        </p:txBody>
+      </p:sp>
+      <p:sp>
+        <p:nvSpPr>
+          <p:cNvPr id="8" name="Rectangle 7">
+            <a:extLst>
+              <a:ext uri="{FF2B5EF4-FFF2-40B4-BE49-F238E27FC236}">
+                <a16:creationId xmlns:a16="http://schemas.microsoft.com/office/drawing/2014/main" id="{0C23A681-3557-4B3E-A147-432589BED4E9}"/>
+              </a:ext>
+            </a:extLst>
+          </p:cNvPr>
+          <p:cNvSpPr/>
+          <p:nvPr/>
+        </p:nvSpPr>
+        <p:spPr>
+          <a:xfrm>
+            <a:off x="188330" y="2822818"/>
+            <a:ext cx="1762600" cy="985321"/>
+          </a:xfrm>
+          <a:prstGeom prst="rect">
+            <a:avLst/>
+          </a:prstGeom>
+          <a:solidFill>
+            <a:schemeClr val="accent3"/>
+          </a:solidFill>
+          <a:ln>
+            <a:solidFill>
+              <a:schemeClr val="tx1"/>
+            </a:solidFill>
+          </a:ln>
+        </p:spPr>
+        <p:style>
+          <a:lnRef idx="2">
+            <a:schemeClr val="accent1">
+              <a:shade val="50000"/>
+            </a:schemeClr>
+          </a:lnRef>
+          <a:fillRef idx="1">
+            <a:schemeClr val="accent1"/>
+          </a:fillRef>
+          <a:effectRef idx="0">
+            <a:schemeClr val="accent1"/>
+          </a:effectRef>
+          <a:fontRef idx="minor">
+            <a:schemeClr val="lt1"/>
+          </a:fontRef>
+        </p:style>
+        <p:txBody>
+          <a:bodyPr rtlCol="0" anchor="ctr"/>
+          <a:lstStyle/>
+          <a:p>
+            <a:pPr algn="ctr"/>
+            <a:r>
+              <a:rPr lang="en-US" b="1" dirty="0">
+                <a:solidFill>
+                  <a:schemeClr val="tx1"/>
+                </a:solidFill>
+                <a:latin typeface="Miriam Libre" panose="00000500000000000000" pitchFamily="2" charset="-79"/>
+                <a:cs typeface="Miriam Libre" panose="00000500000000000000" pitchFamily="2" charset="-79"/>
+              </a:rPr>
+              <a:t>THROW AWAY CANDY WRAPPERS 🍬🚮</a:t>
+            </a:r>
+          </a:p>
+        </p:txBody>
+      </p:sp>
+      <p:sp>
+        <p:nvSpPr>
+          <p:cNvPr id="9" name="Rectangle 8">
+            <a:extLst>
+              <a:ext uri="{FF2B5EF4-FFF2-40B4-BE49-F238E27FC236}">
+                <a16:creationId xmlns:a16="http://schemas.microsoft.com/office/drawing/2014/main" id="{17BE2F62-4F71-4B3A-A4AA-FD2CBE419B1F}"/>
+              </a:ext>
+            </a:extLst>
+          </p:cNvPr>
+          <p:cNvSpPr/>
+          <p:nvPr/>
+        </p:nvSpPr>
+        <p:spPr>
+          <a:xfrm>
+            <a:off x="646305" y="3968344"/>
+            <a:ext cx="1205346" cy="498765"/>
+          </a:xfrm>
+          <a:prstGeom prst="rect">
+            <a:avLst/>
+          </a:prstGeom>
+          <a:solidFill>
+            <a:schemeClr val="accent3"/>
+          </a:solidFill>
+          <a:ln>
+            <a:solidFill>
+              <a:schemeClr val="tx1"/>
+            </a:solidFill>
+          </a:ln>
+        </p:spPr>
+        <p:style>
+          <a:lnRef idx="2">
+            <a:schemeClr val="accent1">
+              <a:shade val="50000"/>
+            </a:schemeClr>
+          </a:lnRef>
+          <a:fillRef idx="1">
+            <a:schemeClr val="accent1"/>
+          </a:fillRef>
+          <a:effectRef idx="0">
+            <a:schemeClr val="accent1"/>
+          </a:effectRef>
+          <a:fontRef idx="minor">
+            <a:schemeClr val="lt1"/>
+          </a:fontRef>
+        </p:style>
+        <p:txBody>
+          <a:bodyPr rtlCol="0" anchor="ctr"/>
+          <a:lstStyle/>
+          <a:p>
+            <a:pPr algn="ctr"/>
+            <a:r>
+              <a:rPr lang="en-US" b="1" dirty="0">
+                <a:solidFill>
+                  <a:schemeClr val="tx1"/>
+                </a:solidFill>
+                <a:latin typeface="Miriam Libre" panose="00000500000000000000" pitchFamily="2" charset="-79"/>
+                <a:cs typeface="Miriam Libre" panose="00000500000000000000" pitchFamily="2" charset="-79"/>
+              </a:rPr>
+              <a:t>CHILL 😎 </a:t>
+            </a:r>
+          </a:p>
+        </p:txBody>
+      </p:sp>
+      <p:sp>
+        <p:nvSpPr>
+          <p:cNvPr id="10" name="Rectangle 9">
+            <a:extLst>
+              <a:ext uri="{FF2B5EF4-FFF2-40B4-BE49-F238E27FC236}">
+                <a16:creationId xmlns:a16="http://schemas.microsoft.com/office/drawing/2014/main" id="{BCBE1CDE-4984-48B9-96CC-5EDF131CCF21}"/>
+              </a:ext>
+            </a:extLst>
+          </p:cNvPr>
+          <p:cNvSpPr/>
+          <p:nvPr/>
+        </p:nvSpPr>
+        <p:spPr>
+          <a:xfrm>
+            <a:off x="2281651" y="2260571"/>
+            <a:ext cx="1885518" cy="739478"/>
+          </a:xfrm>
+          <a:prstGeom prst="rect">
+            <a:avLst/>
+          </a:prstGeom>
+          <a:solidFill>
+            <a:schemeClr val="accent3"/>
+          </a:solidFill>
+          <a:ln>
+            <a:solidFill>
+              <a:schemeClr val="tx1"/>
+            </a:solidFill>
+          </a:ln>
+        </p:spPr>
+        <p:style>
+          <a:lnRef idx="2">
+            <a:schemeClr val="accent1">
+              <a:shade val="50000"/>
+            </a:schemeClr>
+          </a:lnRef>
+          <a:fillRef idx="1">
+            <a:schemeClr val="accent1"/>
+          </a:fillRef>
+          <a:effectRef idx="0">
+            <a:schemeClr val="accent1"/>
+          </a:effectRef>
+          <a:fontRef idx="minor">
+            <a:schemeClr val="lt1"/>
+          </a:fontRef>
+        </p:style>
+        <p:txBody>
+          <a:bodyPr rtlCol="0" anchor="ctr"/>
+          <a:lstStyle/>
+          <a:p>
+            <a:pPr algn="ctr"/>
+            <a:r>
+              <a:rPr lang="en-US" b="1" dirty="0">
+                <a:solidFill>
+                  <a:schemeClr val="tx1"/>
+                </a:solidFill>
+                <a:latin typeface="Miriam Libre" panose="00000500000000000000" pitchFamily="2" charset="-79"/>
+                <a:cs typeface="Miriam Libre" panose="00000500000000000000" pitchFamily="2" charset="-79"/>
+              </a:rPr>
+              <a:t>BE EXCELLENT TO EACH OTHER </a:t>
+            </a:r>
+            <a:r>
+              <a:rPr lang="en-US" sz="1100" dirty="0">
+                <a:solidFill>
+                  <a:schemeClr val="tx1"/>
+                </a:solidFill>
+                <a:latin typeface="Miriam Libre" panose="00000500000000000000" pitchFamily="2" charset="-79"/>
+                <a:cs typeface="Miriam Libre" panose="00000500000000000000" pitchFamily="2" charset="-79"/>
+              </a:rPr>
+              <a:t>(AND US)</a:t>
+            </a:r>
+            <a:endParaRPr lang="en-US" dirty="0">
+              <a:solidFill>
+                <a:schemeClr val="tx1"/>
+              </a:solidFill>
+              <a:latin typeface="Miriam Libre" panose="00000500000000000000" pitchFamily="2" charset="-79"/>
+              <a:cs typeface="Miriam Libre" panose="00000500000000000000" pitchFamily="2" charset="-79"/>
+            </a:endParaRPr>
+          </a:p>
+        </p:txBody>
+      </p:sp>
+      <p:sp>
+        <p:nvSpPr>
+          <p:cNvPr id="13" name="Rectangle 12">
+            <a:extLst>
+              <a:ext uri="{FF2B5EF4-FFF2-40B4-BE49-F238E27FC236}">
+                <a16:creationId xmlns:a16="http://schemas.microsoft.com/office/drawing/2014/main" id="{0A8D8805-CFE6-4B11-BEDB-D6C71859D6EC}"/>
+              </a:ext>
+            </a:extLst>
+          </p:cNvPr>
+          <p:cNvSpPr/>
+          <p:nvPr/>
+        </p:nvSpPr>
+        <p:spPr>
+          <a:xfrm>
+            <a:off x="4928821" y="2176851"/>
+            <a:ext cx="1670573" cy="990298"/>
+          </a:xfrm>
+          <a:prstGeom prst="rect">
+            <a:avLst/>
+          </a:prstGeom>
+          <a:solidFill>
+            <a:schemeClr val="accent1">
+              <a:lumMod val="75000"/>
+            </a:schemeClr>
+          </a:solidFill>
+          <a:ln>
+            <a:solidFill>
+              <a:schemeClr val="tx1"/>
+            </a:solidFill>
+          </a:ln>
+        </p:spPr>
+        <p:style>
+          <a:lnRef idx="2">
+            <a:schemeClr val="accent1">
+              <a:shade val="50000"/>
+            </a:schemeClr>
+          </a:lnRef>
+          <a:fillRef idx="1">
+            <a:schemeClr val="accent1"/>
+          </a:fillRef>
+          <a:effectRef idx="0">
+            <a:schemeClr val="accent1"/>
+          </a:effectRef>
+          <a:fontRef idx="minor">
+            <a:schemeClr val="lt1"/>
+          </a:fontRef>
+        </p:style>
+        <p:txBody>
+          <a:bodyPr rtlCol="0" anchor="ctr"/>
+          <a:lstStyle/>
+          <a:p>
+            <a:pPr algn="ctr"/>
+            <a:r>
+              <a:rPr lang="en-US" b="1" dirty="0">
+                <a:solidFill>
+                  <a:schemeClr val="tx1"/>
+                </a:solidFill>
+                <a:latin typeface="Miriam Libre" panose="00000500000000000000" pitchFamily="2" charset="-79"/>
+                <a:cs typeface="Miriam Libre" panose="00000500000000000000" pitchFamily="2" charset="-79"/>
+              </a:rPr>
+              <a:t>PLAY SOUND FROM YOUR CHROMEBOOK 🔊</a:t>
+            </a:r>
+          </a:p>
+        </p:txBody>
+      </p:sp>
+      <p:sp>
+        <p:nvSpPr>
+          <p:cNvPr id="14" name="Rectangle 13">
+            <a:extLst>
+              <a:ext uri="{FF2B5EF4-FFF2-40B4-BE49-F238E27FC236}">
+                <a16:creationId xmlns:a16="http://schemas.microsoft.com/office/drawing/2014/main" id="{215EDC8C-FCEC-435E-9BC7-A7207EB86732}"/>
+              </a:ext>
+            </a:extLst>
+          </p:cNvPr>
+          <p:cNvSpPr/>
+          <p:nvPr/>
+        </p:nvSpPr>
+        <p:spPr>
+          <a:xfrm>
+            <a:off x="5042966" y="3416218"/>
+            <a:ext cx="1442282" cy="906919"/>
+          </a:xfrm>
+          <a:prstGeom prst="rect">
+            <a:avLst/>
+          </a:prstGeom>
+          <a:solidFill>
+            <a:schemeClr val="accent1">
+              <a:lumMod val="75000"/>
+            </a:schemeClr>
+          </a:solidFill>
+          <a:ln>
+            <a:solidFill>
+              <a:schemeClr val="tx1"/>
+            </a:solidFill>
+          </a:ln>
+        </p:spPr>
+        <p:style>
+          <a:lnRef idx="2">
+            <a:schemeClr val="accent1">
+              <a:shade val="50000"/>
+            </a:schemeClr>
+          </a:lnRef>
+          <a:fillRef idx="1">
+            <a:schemeClr val="accent1"/>
+          </a:fillRef>
+          <a:effectRef idx="0">
+            <a:schemeClr val="accent1"/>
+          </a:effectRef>
+          <a:fontRef idx="minor">
+            <a:schemeClr val="lt1"/>
+          </a:fontRef>
+        </p:style>
+        <p:txBody>
+          <a:bodyPr rtlCol="0" anchor="ctr"/>
+          <a:lstStyle/>
+          <a:p>
+            <a:pPr algn="ctr"/>
+            <a:r>
+              <a:rPr lang="en-US" b="1" dirty="0">
+                <a:solidFill>
+                  <a:schemeClr val="tx1"/>
+                </a:solidFill>
+                <a:latin typeface="Miriam Libre" panose="00000500000000000000" pitchFamily="2" charset="-79"/>
+                <a:cs typeface="Miriam Libre" panose="00000500000000000000" pitchFamily="2" charset="-79"/>
+              </a:rPr>
+              <a:t>WRITE ON THE SCREEN 🖊📺</a:t>
+            </a:r>
+          </a:p>
+        </p:txBody>
+      </p:sp>
+      <p:sp>
+        <p:nvSpPr>
+          <p:cNvPr id="16" name="Rectangle 15">
+            <a:extLst>
+              <a:ext uri="{FF2B5EF4-FFF2-40B4-BE49-F238E27FC236}">
+                <a16:creationId xmlns:a16="http://schemas.microsoft.com/office/drawing/2014/main" id="{5B79CBB1-617D-417C-B8CD-F66B5B75FACA}"/>
+              </a:ext>
+            </a:extLst>
+          </p:cNvPr>
+          <p:cNvSpPr/>
+          <p:nvPr/>
+        </p:nvSpPr>
+        <p:spPr>
+          <a:xfrm>
+            <a:off x="6930115" y="2822818"/>
+            <a:ext cx="1324424" cy="875027"/>
+          </a:xfrm>
+          <a:prstGeom prst="rect">
+            <a:avLst/>
+          </a:prstGeom>
+          <a:solidFill>
+            <a:schemeClr val="accent1">
+              <a:lumMod val="75000"/>
+            </a:schemeClr>
+          </a:solidFill>
+          <a:ln>
+            <a:solidFill>
+              <a:schemeClr val="tx1"/>
+            </a:solidFill>
+          </a:ln>
+        </p:spPr>
+        <p:style>
+          <a:lnRef idx="2">
+            <a:schemeClr val="accent1">
+              <a:shade val="50000"/>
+            </a:schemeClr>
+          </a:lnRef>
+          <a:fillRef idx="1">
+            <a:schemeClr val="accent1"/>
+          </a:fillRef>
+          <a:effectRef idx="0">
+            <a:schemeClr val="accent1"/>
+          </a:effectRef>
+          <a:fontRef idx="minor">
+            <a:schemeClr val="lt1"/>
+          </a:fontRef>
+        </p:style>
+        <p:txBody>
+          <a:bodyPr rtlCol="0" anchor="ctr"/>
+          <a:lstStyle/>
+          <a:p>
+            <a:pPr algn="ctr"/>
+            <a:r>
+              <a:rPr lang="en-US" b="1" dirty="0">
+                <a:solidFill>
+                  <a:schemeClr val="tx1"/>
+                </a:solidFill>
+                <a:latin typeface="Miriam Libre" panose="00000500000000000000" pitchFamily="2" charset="-79"/>
+                <a:cs typeface="Miriam Libre" panose="00000500000000000000" pitchFamily="2" charset="-79"/>
+              </a:rPr>
+              <a:t>DISTRACT EACH OTHER 🗣</a:t>
+            </a:r>
+          </a:p>
+        </p:txBody>
+      </p:sp>
+      <p:sp>
+        <p:nvSpPr>
+          <p:cNvPr id="17" name="Rectangle 16">
+            <a:extLst>
+              <a:ext uri="{FF2B5EF4-FFF2-40B4-BE49-F238E27FC236}">
+                <a16:creationId xmlns:a16="http://schemas.microsoft.com/office/drawing/2014/main" id="{256B5EA2-A390-406A-AC8B-449673003EB4}"/>
+              </a:ext>
+            </a:extLst>
+          </p:cNvPr>
+          <p:cNvSpPr/>
+          <p:nvPr/>
+        </p:nvSpPr>
+        <p:spPr>
+          <a:xfrm>
+            <a:off x="7032567" y="3869678"/>
+            <a:ext cx="1496370" cy="597431"/>
+          </a:xfrm>
+          <a:prstGeom prst="rect">
+            <a:avLst/>
+          </a:prstGeom>
+          <a:solidFill>
+            <a:schemeClr val="accent1">
+              <a:lumMod val="75000"/>
+            </a:schemeClr>
+          </a:solidFill>
+          <a:ln>
+            <a:solidFill>
+              <a:schemeClr val="tx1"/>
+            </a:solidFill>
+          </a:ln>
+        </p:spPr>
+        <p:style>
+          <a:lnRef idx="2">
+            <a:schemeClr val="accent1">
+              <a:shade val="50000"/>
+            </a:schemeClr>
+          </a:lnRef>
+          <a:fillRef idx="1">
+            <a:schemeClr val="accent1"/>
+          </a:fillRef>
+          <a:effectRef idx="0">
+            <a:schemeClr val="accent1"/>
+          </a:effectRef>
+          <a:fontRef idx="minor">
+            <a:schemeClr val="lt1"/>
+          </a:fontRef>
+        </p:style>
+        <p:txBody>
+          <a:bodyPr rtlCol="0" anchor="ctr"/>
+          <a:lstStyle/>
+          <a:p>
+            <a:pPr algn="ctr"/>
+            <a:r>
+              <a:rPr lang="en-US" b="1" dirty="0">
+                <a:solidFill>
+                  <a:schemeClr val="tx1"/>
+                </a:solidFill>
+                <a:latin typeface="Miriam Libre" panose="00000500000000000000" pitchFamily="2" charset="-79"/>
+                <a:cs typeface="Miriam Libre" panose="00000500000000000000" pitchFamily="2" charset="-79"/>
+              </a:rPr>
+              <a:t>BE MEAN 😔</a:t>
+            </a:r>
+          </a:p>
+        </p:txBody>
+      </p:sp>
+      <p:sp>
+        <p:nvSpPr>
+          <p:cNvPr id="15" name="Rectangle 14">
+            <a:extLst>
+              <a:ext uri="{FF2B5EF4-FFF2-40B4-BE49-F238E27FC236}">
+                <a16:creationId xmlns:a16="http://schemas.microsoft.com/office/drawing/2014/main" id="{4BFB7C71-D7D2-462E-A49F-0C7325FB09DB}"/>
+              </a:ext>
+            </a:extLst>
+          </p:cNvPr>
+          <p:cNvSpPr/>
+          <p:nvPr/>
+        </p:nvSpPr>
+        <p:spPr>
+          <a:xfrm>
+            <a:off x="7032568" y="2158147"/>
+            <a:ext cx="1959498" cy="489466"/>
+          </a:xfrm>
+          <a:prstGeom prst="rect">
+            <a:avLst/>
+          </a:prstGeom>
+          <a:solidFill>
+            <a:schemeClr val="accent1">
+              <a:lumMod val="75000"/>
+            </a:schemeClr>
+          </a:solidFill>
+          <a:ln>
+            <a:solidFill>
+              <a:schemeClr val="tx1"/>
+            </a:solidFill>
+          </a:ln>
+        </p:spPr>
+        <p:style>
+          <a:lnRef idx="2">
+            <a:schemeClr val="accent1">
+              <a:shade val="50000"/>
+            </a:schemeClr>
+          </a:lnRef>
+          <a:fillRef idx="1">
+            <a:schemeClr val="accent1"/>
+          </a:fillRef>
+          <a:effectRef idx="0">
+            <a:schemeClr val="accent1"/>
+          </a:effectRef>
+          <a:fontRef idx="minor">
+            <a:schemeClr val="lt1"/>
+          </a:fontRef>
+        </p:style>
+        <p:txBody>
+          <a:bodyPr rtlCol="0" anchor="ctr"/>
+          <a:lstStyle/>
+          <a:p>
+            <a:pPr algn="ctr"/>
+            <a:r>
+              <a:rPr lang="en-US" b="1" dirty="0">
+                <a:solidFill>
+                  <a:schemeClr val="tx1"/>
+                </a:solidFill>
+                <a:latin typeface="Miriam Libre" panose="00000500000000000000" pitchFamily="2" charset="-79"/>
+                <a:cs typeface="Miriam Libre" panose="00000500000000000000" pitchFamily="2" charset="-79"/>
+              </a:rPr>
+              <a:t>HIT EACH OTHER 🤼‍♂️</a:t>
+            </a:r>
+          </a:p>
+        </p:txBody>
+      </p:sp>
+      <p:pic>
+        <p:nvPicPr>
+          <p:cNvPr id="1028" name="Picture 4" descr="Keanu World Order: Bill &amp; Ted's Excellent Adventure – Midwest Film Journal">
+            <a:extLst>
+              <a:ext uri="{FF2B5EF4-FFF2-40B4-BE49-F238E27FC236}">
+                <a16:creationId xmlns:a16="http://schemas.microsoft.com/office/drawing/2014/main" id="{A8004A78-497F-4BC2-AC78-063D9861749A}"/>
+              </a:ext>
+            </a:extLst>
+          </p:cNvPr>
+          <p:cNvPicPr>
+            <a:picLocks noChangeAspect="1" noChangeArrowheads="1"/>
+          </p:cNvPicPr>
+          <p:nvPr/>
+        </p:nvPicPr>
+        <p:blipFill rotWithShape="1">
+          <a:blip r:embed="rId3">
+            <a:extLst>
+              <a:ext uri="{28A0092B-C50C-407E-A947-70E740481C1C}">
+                <a14:useLocalDpi xmlns:a14="http://schemas.microsoft.com/office/drawing/2010/main" val="0"/>
+              </a:ext>
+            </a:extLst>
+          </a:blip>
+          <a:srcRect l="5055" r="3989"/>
+          <a:stretch/>
+        </p:blipFill>
+        <p:spPr bwMode="auto">
+          <a:xfrm>
+            <a:off x="2093786" y="3414973"/>
+            <a:ext cx="2504313" cy="1479917"/>
+          </a:xfrm>
+          <a:prstGeom prst="rect">
+            <a:avLst/>
+          </a:prstGeom>
+          <a:noFill/>
+          <a:ln w="28575">
+            <a:solidFill>
+              <a:schemeClr val="tx1"/>
+            </a:solidFill>
+          </a:ln>
+          <a:extLst>
+            <a:ext uri="{909E8E84-426E-40DD-AFC4-6F175D3DCCD1}">
+              <a14:hiddenFill xmlns:a14="http://schemas.microsoft.com/office/drawing/2010/main">
+                <a:solidFill>
+                  <a:srgbClr val="FFFFFF"/>
+                </a:solidFill>
+              </a14:hiddenFill>
+            </a:ext>
+          </a:extLst>
+        </p:spPr>
+      </p:pic>
+    </p:spTree>
+    <p:extLst>
+      <p:ext uri="{BB962C8B-B14F-4D97-AF65-F5344CB8AC3E}">
+        <p14:creationId xmlns:p14="http://schemas.microsoft.com/office/powerpoint/2010/main" val="4271859582"/>
+      </p:ext>
+    </p:extLst>
+  </p:cSld>
+  <p:clrMapOvr>
+    <a:masterClrMapping/>
+  </p:clrMapOvr>
+  <p:timing>
+    <p:tnLst>
+      <p:par>
+        <p:cTn id="1" dur="indefinite" restart="never" nodeType="tmRoot">
+          <p:childTnLst>
+            <p:seq concurrent="1" nextAc="seek">
+              <p:cTn id="2" dur="indefinite" nodeType="mainSeq">
+                <p:childTnLst>
+                  <p:par>
+                    <p:cTn id="3" fill="hold">
+                      <p:stCondLst>
+                        <p:cond delay="indefinite"/>
+                      </p:stCondLst>
+                      <p:childTnLst>
+                        <p:par>
+                          <p:cTn id="4" fill="hold">
+                            <p:stCondLst>
+                              <p:cond delay="0"/>
+                            </p:stCondLst>
+                            <p:childTnLst>
+                              <p:par>
+                                <p:cTn id="5" presetID="1" presetClass="entr" presetSubtype="0" fill="hold" grpId="0" nodeType="clickEffect">
+                                  <p:stCondLst>
+                                    <p:cond delay="0"/>
+                                  </p:stCondLst>
+                                  <p:childTnLst>
+                                    <p:set>
+                                      <p:cBhvr>
+                                        <p:cTn id="6" dur="1" fill="hold">
+                                          <p:stCondLst>
+                                            <p:cond delay="0"/>
+                                          </p:stCondLst>
+                                        </p:cTn>
+                                        <p:tgtEl>
+                                          <p:spTgt spid="13"/>
+                                        </p:tgtEl>
+                                        <p:attrNameLst>
+                                          <p:attrName>style.visibility</p:attrName>
+                                        </p:attrNameLst>
+                                      </p:cBhvr>
+                                      <p:to>
+                                        <p:strVal val="visible"/>
+                                      </p:to>
+                                    </p:set>
+                                  </p:childTnLst>
+                                </p:cTn>
+                              </p:par>
+                            </p:childTnLst>
+                          </p:cTn>
+                        </p:par>
+                      </p:childTnLst>
+                    </p:cTn>
+                  </p:par>
+                  <p:par>
+                    <p:cTn id="7" fill="hold">
+                      <p:stCondLst>
+                        <p:cond delay="indefinite"/>
+                      </p:stCondLst>
+                      <p:childTnLst>
+                        <p:par>
+                          <p:cTn id="8" fill="hold">
+                            <p:stCondLst>
+                              <p:cond delay="0"/>
+                            </p:stCondLst>
+                            <p:childTnLst>
+                              <p:par>
+                                <p:cTn id="9" presetID="1" presetClass="entr" presetSubtype="0" fill="hold" grpId="0" nodeType="clickEffect">
+                                  <p:stCondLst>
+                                    <p:cond delay="0"/>
+                                  </p:stCondLst>
+                                  <p:childTnLst>
+                                    <p:set>
+                                      <p:cBhvr>
+                                        <p:cTn id="10" dur="1" fill="hold">
+                                          <p:stCondLst>
+                                            <p:cond delay="0"/>
+                                          </p:stCondLst>
+                                        </p:cTn>
+                                        <p:tgtEl>
+                                          <p:spTgt spid="14"/>
+                                        </p:tgtEl>
+                                        <p:attrNameLst>
+                                          <p:attrName>style.visibility</p:attrName>
+                                        </p:attrNameLst>
+                                      </p:cBhvr>
+                                      <p:to>
+                                        <p:strVal val="visible"/>
+                                      </p:to>
+                                    </p:set>
+                                  </p:childTnLst>
+                                </p:cTn>
+                              </p:par>
+                            </p:childTnLst>
+                          </p:cTn>
+                        </p:par>
+                      </p:childTnLst>
+                    </p:cTn>
+                  </p:par>
+                  <p:par>
+                    <p:cTn id="11" fill="hold">
+                      <p:stCondLst>
+                        <p:cond delay="indefinite"/>
+                      </p:stCondLst>
+                      <p:childTnLst>
+                        <p:par>
+                          <p:cTn id="12" fill="hold">
+                            <p:stCondLst>
+                              <p:cond delay="0"/>
+                            </p:stCondLst>
+                            <p:childTnLst>
+                              <p:par>
+                                <p:cTn id="13" presetID="1" presetClass="entr" presetSubtype="0" fill="hold" grpId="0" nodeType="clickEffect">
+                                  <p:stCondLst>
+                                    <p:cond delay="0"/>
+                                  </p:stCondLst>
+                                  <p:childTnLst>
+                                    <p:set>
+                                      <p:cBhvr>
+                                        <p:cTn id="14" dur="1" fill="hold">
+                                          <p:stCondLst>
+                                            <p:cond delay="0"/>
+                                          </p:stCondLst>
+                                        </p:cTn>
+                                        <p:tgtEl>
+                                          <p:spTgt spid="15"/>
+                                        </p:tgtEl>
+                                        <p:attrNameLst>
+                                          <p:attrName>style.visibility</p:attrName>
+                                        </p:attrNameLst>
+                                      </p:cBhvr>
+                                      <p:to>
+                                        <p:strVal val="visible"/>
+                                      </p:to>
+                                    </p:set>
+                                  </p:childTnLst>
+                                </p:cTn>
+                              </p:par>
+                            </p:childTnLst>
+                          </p:cTn>
+                        </p:par>
+                      </p:childTnLst>
+                    </p:cTn>
+                  </p:par>
+                  <p:par>
+                    <p:cTn id="15" fill="hold">
+                      <p:stCondLst>
+                        <p:cond delay="indefinite"/>
+                      </p:stCondLst>
+                      <p:childTnLst>
+                        <p:par>
+                          <p:cTn id="16" fill="hold">
+                            <p:stCondLst>
+                              <p:cond delay="0"/>
+                            </p:stCondLst>
+                            <p:childTnLst>
+                              <p:par>
+                                <p:cTn id="17" presetID="1" presetClass="entr" presetSubtype="0" fill="hold" grpId="0" nodeType="clickEffect">
+                                  <p:stCondLst>
+                                    <p:cond delay="0"/>
+                                  </p:stCondLst>
+                                  <p:childTnLst>
+                                    <p:set>
+                                      <p:cBhvr>
+                                        <p:cTn id="18" dur="1" fill="hold">
+                                          <p:stCondLst>
+                                            <p:cond delay="0"/>
+                                          </p:stCondLst>
+                                        </p:cTn>
+                                        <p:tgtEl>
+                                          <p:spTgt spid="16"/>
+                                        </p:tgtEl>
+                                        <p:attrNameLst>
+                                          <p:attrName>style.visibility</p:attrName>
+                                        </p:attrNameLst>
+                                      </p:cBhvr>
+                                      <p:to>
+                                        <p:strVal val="visible"/>
+                                      </p:to>
+                                    </p:set>
+                                  </p:childTnLst>
+                                </p:cTn>
+                              </p:par>
+                            </p:childTnLst>
+                          </p:cTn>
+                        </p:par>
+                      </p:childTnLst>
+                    </p:cTn>
+                  </p:par>
+                  <p:par>
+                    <p:cTn id="19" fill="hold">
+                      <p:stCondLst>
+                        <p:cond delay="indefinite"/>
+                      </p:stCondLst>
+                      <p:childTnLst>
+                        <p:par>
+                          <p:cTn id="20" fill="hold">
+                            <p:stCondLst>
+                              <p:cond delay="0"/>
+                            </p:stCondLst>
+                            <p:childTnLst>
+                              <p:par>
+                                <p:cTn id="21" presetID="1" presetClass="entr" presetSubtype="0" fill="hold" grpId="0" nodeType="clickEffect">
+                                  <p:stCondLst>
+                                    <p:cond delay="0"/>
+                                  </p:stCondLst>
+                                  <p:childTnLst>
+                                    <p:set>
+                                      <p:cBhvr>
+                                        <p:cTn id="22" dur="1" fill="hold">
+                                          <p:stCondLst>
+                                            <p:cond delay="0"/>
+                                          </p:stCondLst>
+                                        </p:cTn>
+                                        <p:tgtEl>
+                                          <p:spTgt spid="17"/>
+                                        </p:tgtEl>
+                                        <p:attrNameLst>
+                                          <p:attrName>style.visibility</p:attrName>
+                                        </p:attrNameLst>
+                                      </p:cBhvr>
+                                      <p:to>
+                                        <p:strVal val="visible"/>
+                                      </p:to>
+                                    </p:set>
+                                  </p:childTnLst>
+                                </p:cTn>
+                              </p:par>
+                            </p:childTnLst>
+                          </p:cTn>
+                        </p:par>
+                      </p:childTnLst>
+                    </p:cTn>
+                  </p:par>
+                  <p:par>
+                    <p:cTn id="23" fill="hold">
+                      <p:stCondLst>
+                        <p:cond delay="indefinite"/>
+                      </p:stCondLst>
+                      <p:childTnLst>
+                        <p:par>
+                          <p:cTn id="24" fill="hold">
+                            <p:stCondLst>
+                              <p:cond delay="0"/>
+                            </p:stCondLst>
+                            <p:childTnLst>
+                              <p:par>
+                                <p:cTn id="25" presetID="1" presetClass="entr" presetSubtype="0" fill="hold" grpId="0" nodeType="clickEffect">
+                                  <p:stCondLst>
+                                    <p:cond delay="0"/>
+                                  </p:stCondLst>
+                                  <p:childTnLst>
+                                    <p:set>
+                                      <p:cBhvr>
+                                        <p:cTn id="26" dur="1" fill="hold">
+                                          <p:stCondLst>
+                                            <p:cond delay="0"/>
+                                          </p:stCondLst>
+                                        </p:cTn>
+                                        <p:tgtEl>
+                                          <p:spTgt spid="7"/>
+                                        </p:tgtEl>
+                                        <p:attrNameLst>
+                                          <p:attrName>style.visibility</p:attrName>
+                                        </p:attrNameLst>
+                                      </p:cBhvr>
+                                      <p:to>
+                                        <p:strVal val="visible"/>
+                                      </p:to>
+                                    </p:set>
+                                  </p:childTnLst>
+                                </p:cTn>
+                              </p:par>
+                            </p:childTnLst>
+                          </p:cTn>
+                        </p:par>
+                      </p:childTnLst>
+                    </p:cTn>
+                  </p:par>
+                  <p:par>
+                    <p:cTn id="27" fill="hold">
+                      <p:stCondLst>
+                        <p:cond delay="indefinite"/>
+                      </p:stCondLst>
+                      <p:childTnLst>
+                        <p:par>
+                          <p:cTn id="28" fill="hold">
+                            <p:stCondLst>
+                              <p:cond delay="0"/>
+                            </p:stCondLst>
+                            <p:childTnLst>
+                              <p:par>
+                                <p:cTn id="29" presetID="1" presetClass="entr" presetSubtype="0" fill="hold" grpId="0" nodeType="clickEffect">
+                                  <p:stCondLst>
+                                    <p:cond delay="0"/>
+                                  </p:stCondLst>
+                                  <p:childTnLst>
+                                    <p:set>
+                                      <p:cBhvr>
+                                        <p:cTn id="30" dur="1" fill="hold">
+                                          <p:stCondLst>
+                                            <p:cond delay="0"/>
+                                          </p:stCondLst>
+                                        </p:cTn>
+                                        <p:tgtEl>
+                                          <p:spTgt spid="8"/>
+                                        </p:tgtEl>
+                                        <p:attrNameLst>
+                                          <p:attrName>style.visibility</p:attrName>
+                                        </p:attrNameLst>
+                                      </p:cBhvr>
+                                      <p:to>
+                                        <p:strVal val="visible"/>
+                                      </p:to>
+                                    </p:set>
+                                  </p:childTnLst>
+                                </p:cTn>
+                              </p:par>
+                            </p:childTnLst>
+                          </p:cTn>
+                        </p:par>
+                      </p:childTnLst>
+                    </p:cTn>
+                  </p:par>
+                  <p:par>
+                    <p:cTn id="31" fill="hold">
+                      <p:stCondLst>
+                        <p:cond delay="indefinite"/>
+                      </p:stCondLst>
+                      <p:childTnLst>
+                        <p:par>
+                          <p:cTn id="32" fill="hold">
+                            <p:stCondLst>
+                              <p:cond delay="0"/>
+                            </p:stCondLst>
+                            <p:childTnLst>
+                              <p:par>
+                                <p:cTn id="33" presetID="1" presetClass="entr" presetSubtype="0" fill="hold" grpId="0" nodeType="clickEffect">
+                                  <p:stCondLst>
+                                    <p:cond delay="0"/>
+                                  </p:stCondLst>
+                                  <p:childTnLst>
+                                    <p:set>
+                                      <p:cBhvr>
+                                        <p:cTn id="34" dur="1" fill="hold">
+                                          <p:stCondLst>
+                                            <p:cond delay="0"/>
+                                          </p:stCondLst>
+                                        </p:cTn>
+                                        <p:tgtEl>
+                                          <p:spTgt spid="9"/>
+                                        </p:tgtEl>
+                                        <p:attrNameLst>
+                                          <p:attrName>style.visibility</p:attrName>
+                                        </p:attrNameLst>
+                                      </p:cBhvr>
+                                      <p:to>
+                                        <p:strVal val="visible"/>
+                                      </p:to>
+                                    </p:set>
+                                  </p:childTnLst>
+                                </p:cTn>
+                              </p:par>
+                            </p:childTnLst>
+                          </p:cTn>
+                        </p:par>
+                      </p:childTnLst>
+                    </p:cTn>
+                  </p:par>
+                  <p:par>
+                    <p:cTn id="35" fill="hold">
+                      <p:stCondLst>
+                        <p:cond delay="indefinite"/>
+                      </p:stCondLst>
+                      <p:childTnLst>
+                        <p:par>
+                          <p:cTn id="36" fill="hold">
+                            <p:stCondLst>
+                              <p:cond delay="0"/>
+                            </p:stCondLst>
+                            <p:childTnLst>
+                              <p:par>
+                                <p:cTn id="37" presetID="1" presetClass="entr" presetSubtype="0" fill="hold" grpId="0" nodeType="clickEffect">
+                                  <p:stCondLst>
+                                    <p:cond delay="0"/>
+                                  </p:stCondLst>
+                                  <p:childTnLst>
+                                    <p:set>
+                                      <p:cBhvr>
+                                        <p:cTn id="38" dur="1" fill="hold">
+                                          <p:stCondLst>
+                                            <p:cond delay="0"/>
+                                          </p:stCondLst>
+                                        </p:cTn>
+                                        <p:tgtEl>
+                                          <p:spTgt spid="10"/>
+                                        </p:tgtEl>
+                                        <p:attrNameLst>
+                                          <p:attrName>style.visibility</p:attrName>
+                                        </p:attrNameLst>
+                                      </p:cBhvr>
+                                      <p:to>
+                                        <p:strVal val="visible"/>
+                                      </p:to>
+                                    </p:set>
+                                  </p:childTnLst>
+                                </p:cTn>
+                              </p:par>
+                              <p:par>
+                                <p:cTn id="39" presetID="10" presetClass="entr" presetSubtype="0" fill="hold" nodeType="withEffect">
+                                  <p:stCondLst>
+                                    <p:cond delay="0"/>
+                                  </p:stCondLst>
+                                  <p:childTnLst>
+                                    <p:set>
+                                      <p:cBhvr>
+                                        <p:cTn id="40" dur="1" fill="hold">
+                                          <p:stCondLst>
+                                            <p:cond delay="0"/>
+                                          </p:stCondLst>
+                                        </p:cTn>
+                                        <p:tgtEl>
+                                          <p:spTgt spid="1028"/>
+                                        </p:tgtEl>
+                                        <p:attrNameLst>
+                                          <p:attrName>style.visibility</p:attrName>
+                                        </p:attrNameLst>
+                                      </p:cBhvr>
+                                      <p:to>
+                                        <p:strVal val="visible"/>
+                                      </p:to>
+                                    </p:set>
+                                    <p:animEffect transition="in" filter="fade">
+                                      <p:cBhvr>
+                                        <p:cTn id="41" dur="500"/>
+                                        <p:tgtEl>
+                                          <p:spTgt spid="1028"/>
+                                        </p:tgtEl>
+                                      </p:cBhvr>
+                                    </p:animEffect>
+                                  </p:childTnLst>
+                                </p:cTn>
+                              </p:par>
+                            </p:childTnLst>
+                          </p:cTn>
+                        </p:par>
+                      </p:childTnLst>
+                    </p:cTn>
+                  </p:par>
+                </p:childTnLst>
+              </p:cTn>
+              <p:prevCondLst>
+                <p:cond evt="onPrev" delay="0">
+                  <p:tgtEl>
+                    <p:sldTgt/>
+                  </p:tgtEl>
+                </p:cond>
+              </p:prevCondLst>
+              <p:nextCondLst>
+                <p:cond evt="onNext" delay="0">
+                  <p:tgtEl>
+                    <p:sldTgt/>
+                  </p:tgtEl>
+                </p:cond>
+              </p:nextCondLst>
+            </p:seq>
+          </p:childTnLst>
+        </p:cTn>
+      </p:par>
+    </p:tnLst>
+    <p:bldLst>
+      <p:bldP spid="7" grpId="0" animBg="1"/>
+      <p:bldP spid="8" grpId="0" animBg="1"/>
+      <p:bldP spid="9" grpId="0" animBg="1"/>
+      <p:bldP spid="10" grpId="0" animBg="1"/>
+      <p:bldP spid="13" grpId="0" animBg="1"/>
+      <p:bldP spid="14" grpId="0" animBg="1"/>
+      <p:bldP spid="16" grpId="0" animBg="1"/>
+      <p:bldP spid="17" grpId="0" animBg="1"/>
+      <p:bldP spid="15" grpId="0" animBg="1"/>
+    </p:bldLst>
+  </p:timing>
+</p:sld>
+</file>
+
+<file path=ppt/slides/slide4.xml><?xml version="1.0" encoding="utf-8"?>
+<p:sld xmlns:a="http://schemas.openxmlformats.org/drawingml/2006/main" xmlns:r="http://schemas.openxmlformats.org/officeDocument/2006/relationships" xmlns:p="http://schemas.openxmlformats.org/presentationml/2006/main">
+  <p:cSld>
+    <p:spTree>
+      <p:nvGrpSpPr>
+        <p:cNvPr id="1" name=""/>
+        <p:cNvGrpSpPr/>
+        <p:nvPr/>
+      </p:nvGrpSpPr>
+      <p:grpSpPr>
+        <a:xfrm>
+          <a:off x="0" y="0"/>
+          <a:ext cx="0" cy="0"/>
+          <a:chOff x="0" y="0"/>
+          <a:chExt cx="0" cy="0"/>
+        </a:xfrm>
+      </p:grpSpPr>
+      <p:sp>
+        <p:nvSpPr>
+          <p:cNvPr id="2" name="Google Shape;1408;p49">
+            <a:extLst>
+              <a:ext uri="{FF2B5EF4-FFF2-40B4-BE49-F238E27FC236}">
+                <a16:creationId xmlns:a16="http://schemas.microsoft.com/office/drawing/2014/main" id="{1BD2D95A-8BC4-4753-9401-A91E7BB2DC1E}"/>
+              </a:ext>
+            </a:extLst>
+          </p:cNvPr>
+          <p:cNvSpPr txBox="1">
+            <a:spLocks/>
+          </p:cNvSpPr>
+          <p:nvPr/>
+        </p:nvSpPr>
+        <p:spPr>
+          <a:xfrm>
+            <a:off x="720000" y="445025"/>
+            <a:ext cx="7704000" cy="572700"/>
+          </a:xfrm>
+          <a:prstGeom prst="rect">
+            <a:avLst/>
+          </a:prstGeom>
+        </p:spPr>
+        <p:txBody>
+          <a:bodyPr spcFirstLastPara="1" wrap="square" lIns="91425" tIns="91425" rIns="91425" bIns="91425" anchor="t" anchorCtr="0">
+            <a:noAutofit/>
+          </a:bodyPr>
+          <a:lstStyle>
+            <a:defPPr marR="0" lvl="0" algn="l" rtl="0">
+              <a:lnSpc>
+                <a:spcPct val="100000"/>
+              </a:lnSpc>
+              <a:spcBef>
+                <a:spcPts val="0"/>
+              </a:spcBef>
+              <a:spcAft>
+                <a:spcPts val="0"/>
+              </a:spcAft>
+            </a:defPPr>
+            <a:lvl1pPr marR="0" lvl="0" algn="l" rtl="0">
+              <a:lnSpc>
+                <a:spcPct val="100000"/>
+              </a:lnSpc>
+              <a:spcBef>
+                <a:spcPts val="0"/>
+              </a:spcBef>
+              <a:spcAft>
+                <a:spcPts val="0"/>
+              </a:spcAft>
+              <a:buClr>
+                <a:srgbClr val="000000"/>
+              </a:buClr>
+              <a:buFont typeface="Arial"/>
+              <a:defRPr sz="1400" b="0" i="0" u="none" strike="noStrike" cap="none">
+                <a:solidFill>
+                  <a:srgbClr val="000000"/>
+                </a:solidFill>
+                <a:latin typeface="Arial"/>
+                <a:ea typeface="Arial"/>
+                <a:cs typeface="Arial"/>
+                <a:sym typeface="Arial"/>
+              </a:defRPr>
+            </a:lvl1pPr>
+            <a:lvl2pPr marR="0" lvl="1" algn="l" rtl="0">
+              <a:lnSpc>
+                <a:spcPct val="100000"/>
+              </a:lnSpc>
+              <a:spcBef>
+                <a:spcPts val="0"/>
+              </a:spcBef>
+              <a:spcAft>
+                <a:spcPts val="0"/>
+              </a:spcAft>
+              <a:buClr>
+                <a:srgbClr val="000000"/>
+              </a:buClr>
+              <a:buFont typeface="Arial"/>
+              <a:defRPr sz="1400" b="0" i="0" u="none" strike="noStrike" cap="none">
+                <a:solidFill>
+                  <a:srgbClr val="000000"/>
+                </a:solidFill>
+                <a:latin typeface="Arial"/>
+                <a:ea typeface="Arial"/>
+                <a:cs typeface="Arial"/>
+                <a:sym typeface="Arial"/>
+              </a:defRPr>
+            </a:lvl2pPr>
+            <a:lvl3pPr marR="0" lvl="2" algn="l" rtl="0">
+              <a:lnSpc>
+                <a:spcPct val="100000"/>
+              </a:lnSpc>
+              <a:spcBef>
+                <a:spcPts val="0"/>
+              </a:spcBef>
+              <a:spcAft>
+                <a:spcPts val="0"/>
+              </a:spcAft>
+              <a:buClr>
+                <a:srgbClr val="000000"/>
+              </a:buClr>
+              <a:buFont typeface="Arial"/>
+              <a:defRPr sz="1400" b="0" i="0" u="none" strike="noStrike" cap="none">
+                <a:solidFill>
+                  <a:srgbClr val="000000"/>
+                </a:solidFill>
+                <a:latin typeface="Arial"/>
+                <a:ea typeface="Arial"/>
+                <a:cs typeface="Arial"/>
+                <a:sym typeface="Arial"/>
+              </a:defRPr>
+            </a:lvl3pPr>
+            <a:lvl4pPr marR="0" lvl="3" algn="l" rtl="0">
+              <a:lnSpc>
+                <a:spcPct val="100000"/>
+              </a:lnSpc>
+              <a:spcBef>
+                <a:spcPts val="0"/>
+              </a:spcBef>
+              <a:spcAft>
+                <a:spcPts val="0"/>
+              </a:spcAft>
+              <a:buClr>
+                <a:srgbClr val="000000"/>
+              </a:buClr>
+              <a:buFont typeface="Arial"/>
+              <a:defRPr sz="1400" b="0" i="0" u="none" strike="noStrike" cap="none">
+                <a:solidFill>
+                  <a:srgbClr val="000000"/>
+                </a:solidFill>
+                <a:latin typeface="Arial"/>
+                <a:ea typeface="Arial"/>
+                <a:cs typeface="Arial"/>
+                <a:sym typeface="Arial"/>
+              </a:defRPr>
+            </a:lvl4pPr>
+            <a:lvl5pPr marR="0" lvl="4" algn="l" rtl="0">
+              <a:lnSpc>
+                <a:spcPct val="100000"/>
+              </a:lnSpc>
+              <a:spcBef>
+                <a:spcPts val="0"/>
+              </a:spcBef>
+              <a:spcAft>
+                <a:spcPts val="0"/>
+              </a:spcAft>
+              <a:buClr>
+                <a:srgbClr val="000000"/>
+              </a:buClr>
+              <a:buFont typeface="Arial"/>
+              <a:defRPr sz="1400" b="0" i="0" u="none" strike="noStrike" cap="none">
+                <a:solidFill>
+                  <a:srgbClr val="000000"/>
+                </a:solidFill>
+                <a:latin typeface="Arial"/>
+                <a:ea typeface="Arial"/>
+                <a:cs typeface="Arial"/>
+                <a:sym typeface="Arial"/>
+              </a:defRPr>
+            </a:lvl5pPr>
+            <a:lvl6pPr marR="0" lvl="5" algn="l" rtl="0">
+              <a:lnSpc>
+                <a:spcPct val="100000"/>
+              </a:lnSpc>
+              <a:spcBef>
+                <a:spcPts val="0"/>
+              </a:spcBef>
+              <a:spcAft>
+                <a:spcPts val="0"/>
+              </a:spcAft>
+              <a:buClr>
+                <a:srgbClr val="000000"/>
+              </a:buClr>
+              <a:buFont typeface="Arial"/>
+              <a:defRPr sz="1400" b="0" i="0" u="none" strike="noStrike" cap="none">
+                <a:solidFill>
+                  <a:srgbClr val="000000"/>
+                </a:solidFill>
+                <a:latin typeface="Arial"/>
+                <a:ea typeface="Arial"/>
+                <a:cs typeface="Arial"/>
+                <a:sym typeface="Arial"/>
+              </a:defRPr>
+            </a:lvl6pPr>
+            <a:lvl7pPr marR="0" lvl="6" algn="l" rtl="0">
+              <a:lnSpc>
+                <a:spcPct val="100000"/>
+              </a:lnSpc>
+              <a:spcBef>
+                <a:spcPts val="0"/>
+              </a:spcBef>
+              <a:spcAft>
+                <a:spcPts val="0"/>
+              </a:spcAft>
+              <a:buClr>
+                <a:srgbClr val="000000"/>
+              </a:buClr>
+              <a:buFont typeface="Arial"/>
+              <a:defRPr sz="1400" b="0" i="0" u="none" strike="noStrike" cap="none">
+                <a:solidFill>
+                  <a:srgbClr val="000000"/>
+                </a:solidFill>
+                <a:latin typeface="Arial"/>
+                <a:ea typeface="Arial"/>
+                <a:cs typeface="Arial"/>
+                <a:sym typeface="Arial"/>
+              </a:defRPr>
+            </a:lvl7pPr>
+            <a:lvl8pPr marR="0" lvl="7" algn="l" rtl="0">
+              <a:lnSpc>
+                <a:spcPct val="100000"/>
+              </a:lnSpc>
+              <a:spcBef>
+                <a:spcPts val="0"/>
+              </a:spcBef>
+              <a:spcAft>
+                <a:spcPts val="0"/>
+              </a:spcAft>
+              <a:buClr>
+                <a:srgbClr val="000000"/>
+              </a:buClr>
+              <a:buFont typeface="Arial"/>
+              <a:defRPr sz="1400" b="0" i="0" u="none" strike="noStrike" cap="none">
+                <a:solidFill>
+                  <a:srgbClr val="000000"/>
+                </a:solidFill>
+                <a:latin typeface="Arial"/>
+                <a:ea typeface="Arial"/>
+                <a:cs typeface="Arial"/>
+                <a:sym typeface="Arial"/>
+              </a:defRPr>
+            </a:lvl8pPr>
+            <a:lvl9pPr marR="0" lvl="8" algn="l" rtl="0">
+              <a:lnSpc>
+                <a:spcPct val="100000"/>
+              </a:lnSpc>
+              <a:spcBef>
+                <a:spcPts val="0"/>
+              </a:spcBef>
+              <a:spcAft>
+                <a:spcPts val="0"/>
+              </a:spcAft>
+              <a:buClr>
+                <a:srgbClr val="000000"/>
+              </a:buClr>
+              <a:buFont typeface="Arial"/>
+              <a:defRPr sz="1400" b="0" i="0" u="none" strike="noStrike" cap="none">
+                <a:solidFill>
+                  <a:srgbClr val="000000"/>
+                </a:solidFill>
+                <a:latin typeface="Arial"/>
+                <a:ea typeface="Arial"/>
+                <a:cs typeface="Arial"/>
+                <a:sym typeface="Arial"/>
+              </a:defRPr>
+            </a:lvl9pPr>
+          </a:lstStyle>
+          <a:p>
+            <a:r>
+              <a:rPr lang="en-US" sz="2800" b="1" dirty="0">
+                <a:highlight>
+                  <a:schemeClr val="accent3"/>
+                </a:highlight>
+                <a:latin typeface="Krona One" panose="020B0604020202020204" charset="0"/>
+              </a:rPr>
+              <a:t>ESCALATION</a:t>
+            </a:r>
+          </a:p>
+        </p:txBody>
+      </p:sp>
+      <p:sp>
+        <p:nvSpPr>
+          <p:cNvPr id="3" name="TextBox 2">
+            <a:extLst>
+              <a:ext uri="{FF2B5EF4-FFF2-40B4-BE49-F238E27FC236}">
+                <a16:creationId xmlns:a16="http://schemas.microsoft.com/office/drawing/2014/main" id="{EBA8BFB3-632E-4600-9436-FF94D220B665}"/>
+              </a:ext>
+            </a:extLst>
+          </p:cNvPr>
+          <p:cNvSpPr txBox="1"/>
+          <p:nvPr/>
+        </p:nvSpPr>
+        <p:spPr>
+          <a:xfrm>
+            <a:off x="720000" y="1436948"/>
+            <a:ext cx="7059946" cy="584775"/>
+          </a:xfrm>
+          <a:prstGeom prst="rect">
+            <a:avLst/>
+          </a:prstGeom>
+          <a:noFill/>
+        </p:spPr>
+        <p:txBody>
+          <a:bodyPr wrap="none" rtlCol="0">
+            <a:spAutoFit/>
+          </a:bodyPr>
+          <a:lstStyle/>
+          <a:p>
+            <a:r>
+              <a:rPr lang="en-US" sz="3200" i="1" dirty="0">
+                <a:latin typeface="Miriam Libre" panose="00000500000000000000" pitchFamily="2" charset="-79"/>
+                <a:cs typeface="Miriam Libre" panose="00000500000000000000" pitchFamily="2" charset="-79"/>
+              </a:rPr>
+              <a:t>What if I still want to misbehave? </a:t>
+            </a:r>
+          </a:p>
+        </p:txBody>
+      </p:sp>
+      <p:pic>
+        <p:nvPicPr>
+          <p:cNvPr id="2050" name="Picture 2">
+            <a:extLst>
+              <a:ext uri="{FF2B5EF4-FFF2-40B4-BE49-F238E27FC236}">
+                <a16:creationId xmlns:a16="http://schemas.microsoft.com/office/drawing/2014/main" id="{897A7825-94D1-430A-BF3C-94FBC5E04F2F}"/>
+              </a:ext>
+            </a:extLst>
+          </p:cNvPr>
+          <p:cNvPicPr>
+            <a:picLocks noChangeAspect="1" noChangeArrowheads="1"/>
+          </p:cNvPicPr>
+          <p:nvPr/>
+        </p:nvPicPr>
+        <p:blipFill rotWithShape="1">
+          <a:blip r:embed="rId3">
+            <a:extLst>
+              <a:ext uri="{BEBA8EAE-BF5A-486C-A8C5-ECC9F3942E4B}">
+                <a14:imgProps xmlns:a14="http://schemas.microsoft.com/office/drawing/2010/main">
+                  <a14:imgLayer r:embed="rId4">
+                    <a14:imgEffect>
+                      <a14:colorTemperature colorTemp="8800"/>
+                    </a14:imgEffect>
+                  </a14:imgLayer>
+                </a14:imgProps>
+              </a:ext>
+              <a:ext uri="{28A0092B-C50C-407E-A947-70E740481C1C}">
+                <a14:useLocalDpi xmlns:a14="http://schemas.microsoft.com/office/drawing/2010/main" val="0"/>
+              </a:ext>
+            </a:extLst>
+          </a:blip>
+          <a:srcRect l="48891"/>
+          <a:stretch/>
+        </p:blipFill>
+        <p:spPr bwMode="auto">
+          <a:xfrm>
+            <a:off x="4968433" y="2199445"/>
+            <a:ext cx="3560424" cy="2345323"/>
+          </a:xfrm>
+          <a:prstGeom prst="rect">
+            <a:avLst/>
+          </a:prstGeom>
+          <a:noFill/>
+          <a:extLst>
+            <a:ext uri="{909E8E84-426E-40DD-AFC4-6F175D3DCCD1}">
+              <a14:hiddenFill xmlns:a14="http://schemas.microsoft.com/office/drawing/2010/main">
+                <a:solidFill>
+                  <a:srgbClr val="FFFFFF"/>
+                </a:solidFill>
+              </a14:hiddenFill>
+            </a:ext>
+          </a:extLst>
+        </p:spPr>
+      </p:pic>
+      <p:sp>
+        <p:nvSpPr>
+          <p:cNvPr id="5" name="TextBox 4">
+            <a:extLst>
+              <a:ext uri="{FF2B5EF4-FFF2-40B4-BE49-F238E27FC236}">
+                <a16:creationId xmlns:a16="http://schemas.microsoft.com/office/drawing/2014/main" id="{C2F98E4F-C74C-4738-B8A6-D679A7CF46E0}"/>
+              </a:ext>
+            </a:extLst>
+          </p:cNvPr>
+          <p:cNvSpPr txBox="1"/>
+          <p:nvPr/>
+        </p:nvSpPr>
+        <p:spPr>
+          <a:xfrm>
+            <a:off x="720000" y="2199445"/>
+            <a:ext cx="4206239" cy="2154436"/>
+          </a:xfrm>
+          <a:prstGeom prst="rect">
+            <a:avLst/>
+          </a:prstGeom>
+          <a:noFill/>
+        </p:spPr>
+        <p:txBody>
+          <a:bodyPr wrap="square" rtlCol="0">
+            <a:spAutoFit/>
+          </a:bodyPr>
+          <a:lstStyle/>
+          <a:p>
+            <a:r>
+              <a:rPr lang="en-US" sz="2400" b="1" dirty="0">
+                <a:latin typeface="Miriam Libre" panose="00000500000000000000" pitchFamily="2" charset="-79"/>
+                <a:cs typeface="Miriam Libre" panose="00000500000000000000" pitchFamily="2" charset="-79"/>
+              </a:rPr>
+              <a:t>We may:</a:t>
+            </a:r>
+          </a:p>
+          <a:p>
+            <a:endParaRPr lang="en-US" sz="1000" b="1" dirty="0">
+              <a:latin typeface="Miriam Libre" panose="00000500000000000000" pitchFamily="2" charset="-79"/>
+              <a:cs typeface="Miriam Libre" panose="00000500000000000000" pitchFamily="2" charset="-79"/>
+            </a:endParaRPr>
+          </a:p>
+          <a:p>
+            <a:pPr marL="342900" indent="-342900">
+              <a:buFont typeface="Arial" panose="020B0604020202020204" pitchFamily="34" charset="0"/>
+              <a:buChar char="•"/>
+            </a:pPr>
+            <a:r>
+              <a:rPr lang="en-US" sz="2000" dirty="0">
+                <a:solidFill>
+                  <a:srgbClr val="00B050"/>
+                </a:solidFill>
+                <a:latin typeface="Miriam Libre" panose="00000500000000000000" pitchFamily="2" charset="-79"/>
+                <a:cs typeface="Miriam Libre" panose="00000500000000000000" pitchFamily="2" charset="-79"/>
+              </a:rPr>
+              <a:t>Withhold candy</a:t>
+            </a:r>
+          </a:p>
+          <a:p>
+            <a:pPr marL="342900" indent="-342900">
+              <a:buFont typeface="Arial" panose="020B0604020202020204" pitchFamily="34" charset="0"/>
+              <a:buChar char="•"/>
+            </a:pPr>
+            <a:r>
+              <a:rPr lang="en-US" sz="2000" dirty="0">
+                <a:solidFill>
+                  <a:srgbClr val="6CA62C"/>
+                </a:solidFill>
+                <a:latin typeface="Miriam Libre" panose="00000500000000000000" pitchFamily="2" charset="-79"/>
+                <a:cs typeface="Miriam Libre" panose="00000500000000000000" pitchFamily="2" charset="-79"/>
+              </a:rPr>
+              <a:t>Restate our instructions</a:t>
+            </a:r>
+          </a:p>
+          <a:p>
+            <a:pPr marL="342900" indent="-342900">
+              <a:buFont typeface="Arial" panose="020B0604020202020204" pitchFamily="34" charset="0"/>
+              <a:buChar char="•"/>
+            </a:pPr>
+            <a:r>
+              <a:rPr lang="en-US" sz="2000" dirty="0">
+                <a:solidFill>
+                  <a:schemeClr val="accent2">
+                    <a:lumMod val="50000"/>
+                  </a:schemeClr>
+                </a:solidFill>
+                <a:latin typeface="Miriam Libre" panose="00000500000000000000" pitchFamily="2" charset="-79"/>
+                <a:cs typeface="Miriam Libre" panose="00000500000000000000" pitchFamily="2" charset="-79"/>
+              </a:rPr>
+              <a:t>Give you a chance to try again</a:t>
+            </a:r>
+          </a:p>
+          <a:p>
+            <a:pPr marL="342900" indent="-342900">
+              <a:buFont typeface="Arial" panose="020B0604020202020204" pitchFamily="34" charset="0"/>
+              <a:buChar char="•"/>
+            </a:pPr>
+            <a:r>
+              <a:rPr lang="en-US" sz="2000" dirty="0">
+                <a:solidFill>
+                  <a:schemeClr val="accent1">
+                    <a:lumMod val="50000"/>
+                  </a:schemeClr>
+                </a:solidFill>
+                <a:latin typeface="Miriam Libre" panose="00000500000000000000" pitchFamily="2" charset="-79"/>
+                <a:cs typeface="Miriam Libre" panose="00000500000000000000" pitchFamily="2" charset="-79"/>
+              </a:rPr>
+              <a:t>Let you work in the hall</a:t>
+            </a:r>
+          </a:p>
+          <a:p>
+            <a:pPr marL="342900" indent="-342900">
+              <a:buFont typeface="Arial" panose="020B0604020202020204" pitchFamily="34" charset="0"/>
+              <a:buChar char="•"/>
+            </a:pPr>
+            <a:r>
+              <a:rPr lang="en-US" sz="2000" b="1" dirty="0">
+                <a:solidFill>
+                  <a:srgbClr val="FF0000"/>
+                </a:solidFill>
+                <a:latin typeface="Miriam Libre" panose="00000500000000000000" pitchFamily="2" charset="-79"/>
+                <a:cs typeface="Miriam Libre" panose="00000500000000000000" pitchFamily="2" charset="-79"/>
+              </a:rPr>
+              <a:t>Call Mr. Taylor / Ms. Mac</a:t>
+            </a:r>
+          </a:p>
+        </p:txBody>
+      </p:sp>
+    </p:spTree>
+    <p:extLst>
+      <p:ext uri="{BB962C8B-B14F-4D97-AF65-F5344CB8AC3E}">
+        <p14:creationId xmlns:p14="http://schemas.microsoft.com/office/powerpoint/2010/main" val="2249180225"/>
+      </p:ext>
+    </p:extLst>
+  </p:cSld>
+  <p:clrMapOvr>
+    <a:masterClrMapping/>
+  </p:clrMapOvr>
+  <p:timing>
+    <p:tnLst>
+      <p:par>
+        <p:cTn id="1" dur="indefinite" restart="never" nodeType="tmRoot">
+          <p:childTnLst>
+            <p:seq concurrent="1" nextAc="seek">
+              <p:cTn id="2" dur="indefinite" nodeType="mainSeq">
+                <p:childTnLst>
+                  <p:par>
+                    <p:cTn id="3" fill="hold">
+                      <p:stCondLst>
+                        <p:cond delay="indefinite"/>
+                      </p:stCondLst>
+                      <p:childTnLst>
+                        <p:par>
+                          <p:cTn id="4" fill="hold">
+                            <p:stCondLst>
+                              <p:cond delay="0"/>
+                            </p:stCondLst>
+                            <p:childTnLst>
+                              <p:par>
+                                <p:cTn id="5" presetID="22" presetClass="entr" presetSubtype="1" fill="hold" nodeType="clickEffect">
+                                  <p:stCondLst>
+                                    <p:cond delay="0"/>
+                                  </p:stCondLst>
+                                  <p:childTnLst>
+                                    <p:set>
+                                      <p:cBhvr>
+                                        <p:cTn id="6" dur="1" fill="hold">
+                                          <p:stCondLst>
+                                            <p:cond delay="0"/>
+                                          </p:stCondLst>
+                                        </p:cTn>
+                                        <p:tgtEl>
+                                          <p:spTgt spid="5">
+                                            <p:txEl>
+                                              <p:pRg st="0" end="0"/>
+                                            </p:txEl>
+                                          </p:spTgt>
+                                        </p:tgtEl>
+                                        <p:attrNameLst>
+                                          <p:attrName>style.visibility</p:attrName>
+                                        </p:attrNameLst>
+                                      </p:cBhvr>
+                                      <p:to>
+                                        <p:strVal val="visible"/>
+                                      </p:to>
+                                    </p:set>
+                                    <p:animEffect transition="in" filter="wipe(up)">
+                                      <p:cBhvr>
+                                        <p:cTn id="7" dur="500"/>
+                                        <p:tgtEl>
+                                          <p:spTgt spid="5">
+                                            <p:txEl>
+                                              <p:pRg st="0" end="0"/>
+                                            </p:txEl>
+                                          </p:spTgt>
+                                        </p:tgtEl>
+                                      </p:cBhvr>
+                                    </p:animEffect>
+                                  </p:childTnLst>
+                                </p:cTn>
+                              </p:par>
+                            </p:childTnLst>
+                          </p:cTn>
+                        </p:par>
+                      </p:childTnLst>
+                    </p:cTn>
+                  </p:par>
+                  <p:par>
+                    <p:cTn id="8" fill="hold">
+                      <p:stCondLst>
+                        <p:cond delay="indefinite"/>
+                      </p:stCondLst>
+                      <p:childTnLst>
+                        <p:par>
+                          <p:cTn id="9" fill="hold">
+                            <p:stCondLst>
+                              <p:cond delay="0"/>
+                            </p:stCondLst>
+                            <p:childTnLst>
+                              <p:par>
+                                <p:cTn id="10" presetID="22" presetClass="entr" presetSubtype="1" fill="hold" nodeType="clickEffect">
+                                  <p:stCondLst>
+                                    <p:cond delay="0"/>
+                                  </p:stCondLst>
+                                  <p:childTnLst>
+                                    <p:set>
+                                      <p:cBhvr>
+                                        <p:cTn id="11" dur="1" fill="hold">
+                                          <p:stCondLst>
+                                            <p:cond delay="0"/>
+                                          </p:stCondLst>
+                                        </p:cTn>
+                                        <p:tgtEl>
+                                          <p:spTgt spid="5">
+                                            <p:txEl>
+                                              <p:pRg st="2" end="2"/>
+                                            </p:txEl>
+                                          </p:spTgt>
+                                        </p:tgtEl>
+                                        <p:attrNameLst>
+                                          <p:attrName>style.visibility</p:attrName>
+                                        </p:attrNameLst>
+                                      </p:cBhvr>
+                                      <p:to>
+                                        <p:strVal val="visible"/>
+                                      </p:to>
+                                    </p:set>
+                                    <p:animEffect transition="in" filter="wipe(up)">
+                                      <p:cBhvr>
+                                        <p:cTn id="12" dur="500"/>
+                                        <p:tgtEl>
+                                          <p:spTgt spid="5">
+                                            <p:txEl>
+                                              <p:pRg st="2" end="2"/>
+                                            </p:txEl>
+                                          </p:spTgt>
+                                        </p:tgtEl>
+                                      </p:cBhvr>
+                                    </p:animEffect>
+                                  </p:childTnLst>
+                                </p:cTn>
+                              </p:par>
+                            </p:childTnLst>
+                          </p:cTn>
+                        </p:par>
+                      </p:childTnLst>
+                    </p:cTn>
+                  </p:par>
+                  <p:par>
+                    <p:cTn id="13" fill="hold">
+                      <p:stCondLst>
+                        <p:cond delay="indefinite"/>
+                      </p:stCondLst>
+                      <p:childTnLst>
+                        <p:par>
+                          <p:cTn id="14" fill="hold">
+                            <p:stCondLst>
+                              <p:cond delay="0"/>
+                            </p:stCondLst>
+                            <p:childTnLst>
+                              <p:par>
+                                <p:cTn id="15" presetID="22" presetClass="entr" presetSubtype="1" fill="hold" nodeType="clickEffect">
+                                  <p:stCondLst>
+                                    <p:cond delay="0"/>
+                                  </p:stCondLst>
+                                  <p:childTnLst>
+                                    <p:set>
+                                      <p:cBhvr>
+                                        <p:cTn id="16" dur="1" fill="hold">
+                                          <p:stCondLst>
+                                            <p:cond delay="0"/>
+                                          </p:stCondLst>
+                                        </p:cTn>
+                                        <p:tgtEl>
+                                          <p:spTgt spid="5">
+                                            <p:txEl>
+                                              <p:pRg st="3" end="3"/>
+                                            </p:txEl>
+                                          </p:spTgt>
+                                        </p:tgtEl>
+                                        <p:attrNameLst>
+                                          <p:attrName>style.visibility</p:attrName>
+                                        </p:attrNameLst>
+                                      </p:cBhvr>
+                                      <p:to>
+                                        <p:strVal val="visible"/>
+                                      </p:to>
+                                    </p:set>
+                                    <p:animEffect transition="in" filter="wipe(up)">
+                                      <p:cBhvr>
+                                        <p:cTn id="17" dur="500"/>
+                                        <p:tgtEl>
+                                          <p:spTgt spid="5">
+                                            <p:txEl>
+                                              <p:pRg st="3" end="3"/>
+                                            </p:txEl>
+                                          </p:spTgt>
+                                        </p:tgtEl>
+                                      </p:cBhvr>
+                                    </p:animEffect>
+                                  </p:childTnLst>
+                                </p:cTn>
+                              </p:par>
+                            </p:childTnLst>
+                          </p:cTn>
+                        </p:par>
+                      </p:childTnLst>
+                    </p:cTn>
+                  </p:par>
+                  <p:par>
+                    <p:cTn id="18" fill="hold">
+                      <p:stCondLst>
+                        <p:cond delay="indefinite"/>
+                      </p:stCondLst>
+                      <p:childTnLst>
+                        <p:par>
+                          <p:cTn id="19" fill="hold">
+                            <p:stCondLst>
+                              <p:cond delay="0"/>
+                            </p:stCondLst>
+                            <p:childTnLst>
+                              <p:par>
+                                <p:cTn id="20" presetID="22" presetClass="entr" presetSubtype="1" fill="hold" nodeType="clickEffect">
+                                  <p:stCondLst>
+                                    <p:cond delay="0"/>
+                                  </p:stCondLst>
+                                  <p:childTnLst>
+                                    <p:set>
+                                      <p:cBhvr>
+                                        <p:cTn id="21" dur="1" fill="hold">
+                                          <p:stCondLst>
+                                            <p:cond delay="0"/>
+                                          </p:stCondLst>
+                                        </p:cTn>
+                                        <p:tgtEl>
+                                          <p:spTgt spid="5">
+                                            <p:txEl>
+                                              <p:pRg st="4" end="4"/>
+                                            </p:txEl>
+                                          </p:spTgt>
+                                        </p:tgtEl>
+                                        <p:attrNameLst>
+                                          <p:attrName>style.visibility</p:attrName>
+                                        </p:attrNameLst>
+                                      </p:cBhvr>
+                                      <p:to>
+                                        <p:strVal val="visible"/>
+                                      </p:to>
+                                    </p:set>
+                                    <p:animEffect transition="in" filter="wipe(up)">
+                                      <p:cBhvr>
+                                        <p:cTn id="22" dur="500"/>
+                                        <p:tgtEl>
+                                          <p:spTgt spid="5">
+                                            <p:txEl>
+                                              <p:pRg st="4" end="4"/>
+                                            </p:txEl>
+                                          </p:spTgt>
+                                        </p:tgtEl>
+                                      </p:cBhvr>
+                                    </p:animEffect>
+                                  </p:childTnLst>
+                                </p:cTn>
+                              </p:par>
+                            </p:childTnLst>
+                          </p:cTn>
+                        </p:par>
+                      </p:childTnLst>
+                    </p:cTn>
+                  </p:par>
+                  <p:par>
+                    <p:cTn id="23" fill="hold">
+                      <p:stCondLst>
+                        <p:cond delay="indefinite"/>
+                      </p:stCondLst>
+                      <p:childTnLst>
+                        <p:par>
+                          <p:cTn id="24" fill="hold">
+                            <p:stCondLst>
+                              <p:cond delay="0"/>
+                            </p:stCondLst>
+                            <p:childTnLst>
+                              <p:par>
+                                <p:cTn id="25" presetID="22" presetClass="entr" presetSubtype="1" fill="hold" nodeType="clickEffect">
+                                  <p:stCondLst>
+                                    <p:cond delay="0"/>
+                                  </p:stCondLst>
+                                  <p:childTnLst>
+                                    <p:set>
+                                      <p:cBhvr>
+                                        <p:cTn id="26" dur="1" fill="hold">
+                                          <p:stCondLst>
+                                            <p:cond delay="0"/>
+                                          </p:stCondLst>
+                                        </p:cTn>
+                                        <p:tgtEl>
+                                          <p:spTgt spid="5">
+                                            <p:txEl>
+                                              <p:pRg st="5" end="5"/>
+                                            </p:txEl>
+                                          </p:spTgt>
+                                        </p:tgtEl>
+                                        <p:attrNameLst>
+                                          <p:attrName>style.visibility</p:attrName>
+                                        </p:attrNameLst>
+                                      </p:cBhvr>
+                                      <p:to>
+                                        <p:strVal val="visible"/>
+                                      </p:to>
+                                    </p:set>
+                                    <p:animEffect transition="in" filter="wipe(up)">
+                                      <p:cBhvr>
+                                        <p:cTn id="27" dur="500"/>
+                                        <p:tgtEl>
+                                          <p:spTgt spid="5">
+                                            <p:txEl>
+                                              <p:pRg st="5" end="5"/>
+                                            </p:txEl>
+                                          </p:spTgt>
+                                        </p:tgtEl>
+                                      </p:cBhvr>
+                                    </p:animEffect>
+                                  </p:childTnLst>
+                                </p:cTn>
+                              </p:par>
+                            </p:childTnLst>
+                          </p:cTn>
+                        </p:par>
+                      </p:childTnLst>
+                    </p:cTn>
+                  </p:par>
+                  <p:par>
+                    <p:cTn id="28" fill="hold">
+                      <p:stCondLst>
+                        <p:cond delay="indefinite"/>
+                      </p:stCondLst>
+                      <p:childTnLst>
+                        <p:par>
+                          <p:cTn id="29" fill="hold">
+                            <p:stCondLst>
+                              <p:cond delay="0"/>
+                            </p:stCondLst>
+                            <p:childTnLst>
+                              <p:par>
+                                <p:cTn id="30" presetID="22" presetClass="entr" presetSubtype="1" fill="hold" nodeType="clickEffect">
+                                  <p:stCondLst>
+                                    <p:cond delay="0"/>
+                                  </p:stCondLst>
+                                  <p:childTnLst>
+                                    <p:set>
+                                      <p:cBhvr>
+                                        <p:cTn id="31" dur="1" fill="hold">
+                                          <p:stCondLst>
+                                            <p:cond delay="0"/>
+                                          </p:stCondLst>
+                                        </p:cTn>
+                                        <p:tgtEl>
+                                          <p:spTgt spid="5">
+                                            <p:txEl>
+                                              <p:pRg st="6" end="6"/>
+                                            </p:txEl>
+                                          </p:spTgt>
+                                        </p:tgtEl>
+                                        <p:attrNameLst>
+                                          <p:attrName>style.visibility</p:attrName>
+                                        </p:attrNameLst>
+                                      </p:cBhvr>
+                                      <p:to>
+                                        <p:strVal val="visible"/>
+                                      </p:to>
+                                    </p:set>
+                                    <p:animEffect transition="in" filter="wipe(up)">
+                                      <p:cBhvr>
+                                        <p:cTn id="32" dur="500"/>
+                                        <p:tgtEl>
+                                          <p:spTgt spid="5">
+                                            <p:txEl>
+                                              <p:pRg st="6" end="6"/>
+                                            </p:txEl>
+                                          </p:spTgt>
+                                        </p:tgtEl>
+                                      </p:cBhvr>
+                                    </p:animEffect>
+                                  </p:childTnLst>
+                                </p:cTn>
+                              </p:par>
+                            </p:childTnLst>
+                          </p:cTn>
+                        </p:par>
+                      </p:childTnLst>
+                    </p:cTn>
+                  </p:par>
+                  <p:par>
+                    <p:cTn id="33" fill="hold">
+                      <p:stCondLst>
+                        <p:cond delay="indefinite"/>
+                      </p:stCondLst>
+                      <p:childTnLst>
+                        <p:par>
+                          <p:cTn id="34" fill="hold">
+                            <p:stCondLst>
+                              <p:cond delay="0"/>
+                            </p:stCondLst>
+                            <p:childTnLst>
+                              <p:par>
+                                <p:cTn id="35" presetID="10" presetClass="entr" presetSubtype="0" fill="hold" nodeType="clickEffect">
+                                  <p:stCondLst>
+                                    <p:cond delay="0"/>
+                                  </p:stCondLst>
+                                  <p:childTnLst>
+                                    <p:set>
+                                      <p:cBhvr>
+                                        <p:cTn id="36" dur="1" fill="hold">
+                                          <p:stCondLst>
+                                            <p:cond delay="0"/>
+                                          </p:stCondLst>
+                                        </p:cTn>
+                                        <p:tgtEl>
+                                          <p:spTgt spid="2050"/>
+                                        </p:tgtEl>
+                                        <p:attrNameLst>
+                                          <p:attrName>style.visibility</p:attrName>
+                                        </p:attrNameLst>
+                                      </p:cBhvr>
+                                      <p:to>
+                                        <p:strVal val="visible"/>
+                                      </p:to>
+                                    </p:set>
+                                    <p:animEffect transition="in" filter="fade">
+                                      <p:cBhvr>
+                                        <p:cTn id="37" dur="500"/>
+                                        <p:tgtEl>
+                                          <p:spTgt spid="2050"/>
+                                        </p:tgtEl>
+                                      </p:cBhvr>
+                                    </p:animEffect>
+                                  </p:childTnLst>
+                                </p:cTn>
+                              </p:par>
+                            </p:childTnLst>
+                          </p:cTn>
+                        </p:par>
+                      </p:childTnLst>
+                    </p:cTn>
+                  </p:par>
+                </p:childTnLst>
+              </p:cTn>
+              <p:prevCondLst>
+                <p:cond evt="onPrev" delay="0">
+                  <p:tgtEl>
+                    <p:sldTgt/>
+                  </p:tgtEl>
+                </p:cond>
+              </p:prevCondLst>
+              <p:nextCondLst>
+                <p:cond evt="onNext" delay="0">
+                  <p:tgtEl>
+                    <p:sldTgt/>
+                  </p:tgtEl>
+                </p:cond>
+              </p:nextCondLst>
+            </p:seq>
+          </p:childTnLst>
+        </p:cTn>
+      </p:par>
+    </p:tnLst>
+  </p:timing>
+</p:sld>
+</file>
+
+<file path=ppt/slides/slide5.xml><?xml version="1.0" encoding="utf-8"?>
+<p:sld xmlns:a="http://schemas.openxmlformats.org/drawingml/2006/main" xmlns:r="http://schemas.openxmlformats.org/officeDocument/2006/relationships" xmlns:p="http://schemas.openxmlformats.org/presentationml/2006/main">
+  <p:cSld>
+    <p:spTree>
+      <p:nvGrpSpPr>
         <p:cNvPr id="1" name="Shape 962"/>
         <p:cNvGrpSpPr/>
         <p:nvPr/>

</xml_diff>

<commit_message>
Update gitbook 2022-11-14 16:51:01
</commit_message>
<xml_diff>
--- a/IntroHyland/ClassroomExpectations.pptx
+++ b/IntroHyland/ClassroomExpectations.pptx
@@ -5,24 +5,26 @@
     <p:sldMasterId id="2147483676" r:id="rId1"/>
   </p:sldMasterIdLst>
   <p:notesMasterIdLst>
-    <p:notesMasterId r:id="rId5"/>
+    <p:notesMasterId r:id="rId7"/>
   </p:notesMasterIdLst>
   <p:sldIdLst>
     <p:sldId id="256" r:id="rId2"/>
     <p:sldId id="274" r:id="rId3"/>
-    <p:sldId id="266" r:id="rId4"/>
+    <p:sldId id="277" r:id="rId4"/>
+    <p:sldId id="276" r:id="rId5"/>
+    <p:sldId id="266" r:id="rId6"/>
   </p:sldIdLst>
   <p:sldSz cx="9144000" cy="5143500" type="screen16x9"/>
   <p:notesSz cx="6858000" cy="9144000"/>
   <p:embeddedFontLst>
     <p:embeddedFont>
       <p:font typeface="Krona One" panose="020B0604020202020204" charset="0"/>
-      <p:regular r:id="rId6"/>
+      <p:regular r:id="rId8"/>
     </p:embeddedFont>
     <p:embeddedFont>
       <p:font typeface="Miriam Libre" panose="00000500000000000000" pitchFamily="2" charset="-79"/>
-      <p:regular r:id="rId7"/>
-      <p:bold r:id="rId8"/>
+      <p:regular r:id="rId9"/>
+      <p:bold r:id="rId10"/>
     </p:embeddedFont>
   </p:embeddedFontLst>
   <p:defaultTextStyle>
@@ -1766,6 +1768,274 @@
 </file>
 
 <file path=ppt/notesSlides/notesSlide3.xml><?xml version="1.0" encoding="utf-8"?>
+<p:notes xmlns:a="http://schemas.openxmlformats.org/drawingml/2006/main" xmlns:r="http://schemas.openxmlformats.org/officeDocument/2006/relationships" xmlns:p="http://schemas.openxmlformats.org/presentationml/2006/main">
+  <p:cSld>
+    <p:spTree>
+      <p:nvGrpSpPr>
+        <p:cNvPr id="1" name=""/>
+        <p:cNvGrpSpPr/>
+        <p:nvPr/>
+      </p:nvGrpSpPr>
+      <p:grpSpPr>
+        <a:xfrm>
+          <a:off x="0" y="0"/>
+          <a:ext cx="0" cy="0"/>
+          <a:chOff x="0" y="0"/>
+          <a:chExt cx="0" cy="0"/>
+        </a:xfrm>
+      </p:grpSpPr>
+      <p:sp>
+        <p:nvSpPr>
+          <p:cNvPr id="2" name="Slide Image Placeholder 1"/>
+          <p:cNvSpPr>
+            <a:spLocks noGrp="1" noRot="1" noChangeAspect="1"/>
+          </p:cNvSpPr>
+          <p:nvPr>
+            <p:ph type="sldImg"/>
+          </p:nvPr>
+        </p:nvSpPr>
+        <p:spPr>
+          <a:xfrm>
+            <a:off x="381000" y="685800"/>
+            <a:ext cx="6096000" cy="3429000"/>
+          </a:xfrm>
+        </p:spPr>
+      </p:sp>
+      <p:sp>
+        <p:nvSpPr>
+          <p:cNvPr id="3" name="Notes Placeholder 2"/>
+          <p:cNvSpPr>
+            <a:spLocks noGrp="1"/>
+          </p:cNvSpPr>
+          <p:nvPr>
+            <p:ph type="body" idx="1"/>
+          </p:nvPr>
+        </p:nvSpPr>
+        <p:spPr/>
+        <p:txBody>
+          <a:bodyPr/>
+          <a:lstStyle/>
+          <a:p>
+            <a:r>
+              <a:rPr lang="en-US" dirty="0"/>
+              <a:t>Given those expectations, here are some specific rules that embody those ideas. We will start with the DON’Ts. Do not:</a:t>
+            </a:r>
+          </a:p>
+          <a:p>
+            <a:r>
+              <a:rPr lang="en-US" dirty="0"/>
+              <a:t>Play sound from your </a:t>
+            </a:r>
+            <a:r>
+              <a:rPr lang="en-US" dirty="0" err="1"/>
+              <a:t>chromebook</a:t>
+            </a:r>
+            <a:endParaRPr lang="en-US" dirty="0"/>
+          </a:p>
+          <a:p>
+            <a:r>
+              <a:rPr lang="en-US" dirty="0"/>
+              <a:t>Write on the big screen</a:t>
+            </a:r>
+          </a:p>
+          <a:p>
+            <a:r>
+              <a:rPr lang="en-US" dirty="0"/>
+              <a:t>Hit each other</a:t>
+            </a:r>
+          </a:p>
+          <a:p>
+            <a:r>
+              <a:rPr lang="en-US" dirty="0"/>
+              <a:t>Distract each other</a:t>
+            </a:r>
+          </a:p>
+          <a:p>
+            <a:r>
+              <a:rPr lang="en-US" dirty="0"/>
+              <a:t>Or be mean to each other! Now let’s take a look at some DOs. Do:</a:t>
+            </a:r>
+          </a:p>
+          <a:p>
+            <a:r>
+              <a:rPr lang="en-US" dirty="0"/>
+              <a:t>Stay in your seats (please)</a:t>
+            </a:r>
+          </a:p>
+          <a:p>
+            <a:r>
+              <a:rPr lang="en-US" dirty="0"/>
+              <a:t>Throw away your candy wrappers – or </a:t>
+            </a:r>
+            <a:r>
+              <a:rPr lang="en-US" dirty="0" err="1"/>
+              <a:t>Ms</a:t>
+            </a:r>
+            <a:r>
+              <a:rPr lang="en-US" dirty="0"/>
+              <a:t> Bids will get mad at us</a:t>
+            </a:r>
+          </a:p>
+          <a:p>
+            <a:r>
+              <a:rPr lang="en-US" dirty="0"/>
+              <a:t>Chill – don’t go nuts all the time</a:t>
+            </a:r>
+          </a:p>
+          <a:p>
+            <a:r>
+              <a:rPr lang="en-US" dirty="0"/>
+              <a:t>And finally, be excellent to each other – this one kind of sums it up. Be respectful of your fellow students, and be respectful of us – we are taking time to be here to help you learn, and we want everyone to get the most out of it that they can!</a:t>
+            </a:r>
+          </a:p>
+          <a:p>
+            <a:endParaRPr lang="en-US" dirty="0"/>
+          </a:p>
+          <a:p>
+            <a:endParaRPr lang="en-US" dirty="0"/>
+          </a:p>
+        </p:txBody>
+      </p:sp>
+    </p:spTree>
+    <p:extLst>
+      <p:ext uri="{BB962C8B-B14F-4D97-AF65-F5344CB8AC3E}">
+        <p14:creationId xmlns:p14="http://schemas.microsoft.com/office/powerpoint/2010/main" val="626151014"/>
+      </p:ext>
+    </p:extLst>
+  </p:cSld>
+  <p:clrMapOvr>
+    <a:masterClrMapping/>
+  </p:clrMapOvr>
+</p:notes>
+</file>
+
+<file path=ppt/notesSlides/notesSlide4.xml><?xml version="1.0" encoding="utf-8"?>
+<p:notes xmlns:a="http://schemas.openxmlformats.org/drawingml/2006/main" xmlns:r="http://schemas.openxmlformats.org/officeDocument/2006/relationships" xmlns:p="http://schemas.openxmlformats.org/presentationml/2006/main">
+  <p:cSld>
+    <p:spTree>
+      <p:nvGrpSpPr>
+        <p:cNvPr id="1" name=""/>
+        <p:cNvGrpSpPr/>
+        <p:nvPr/>
+      </p:nvGrpSpPr>
+      <p:grpSpPr>
+        <a:xfrm>
+          <a:off x="0" y="0"/>
+          <a:ext cx="0" cy="0"/>
+          <a:chOff x="0" y="0"/>
+          <a:chExt cx="0" cy="0"/>
+        </a:xfrm>
+      </p:grpSpPr>
+      <p:sp>
+        <p:nvSpPr>
+          <p:cNvPr id="2" name="Slide Image Placeholder 1"/>
+          <p:cNvSpPr>
+            <a:spLocks noGrp="1" noRot="1" noChangeAspect="1"/>
+          </p:cNvSpPr>
+          <p:nvPr>
+            <p:ph type="sldImg"/>
+          </p:nvPr>
+        </p:nvSpPr>
+        <p:spPr>
+          <a:xfrm>
+            <a:off x="381000" y="685800"/>
+            <a:ext cx="6096000" cy="3429000"/>
+          </a:xfrm>
+        </p:spPr>
+      </p:sp>
+      <p:sp>
+        <p:nvSpPr>
+          <p:cNvPr id="3" name="Notes Placeholder 2"/>
+          <p:cNvSpPr>
+            <a:spLocks noGrp="1"/>
+          </p:cNvSpPr>
+          <p:nvPr>
+            <p:ph type="body" idx="1"/>
+          </p:nvPr>
+        </p:nvSpPr>
+        <p:spPr/>
+        <p:txBody>
+          <a:bodyPr/>
+          <a:lstStyle/>
+          <a:p>
+            <a:r>
+              <a:rPr lang="en-US" dirty="0"/>
+              <a:t>You might not care to respect these expectations, and still have some desire to disobey. So what happens then?</a:t>
+            </a:r>
+          </a:p>
+          <a:p>
+            <a:r>
+              <a:rPr lang="en-US" dirty="0"/>
+              <a:t>Well, we may…</a:t>
+            </a:r>
+          </a:p>
+          <a:p>
+            <a:r>
+              <a:rPr lang="en-US" dirty="0"/>
+              <a:t>Take away your chance to get candy</a:t>
+            </a:r>
+          </a:p>
+          <a:p>
+            <a:r>
+              <a:rPr lang="en-US" dirty="0"/>
+              <a:t>Tell you again what we want you to do</a:t>
+            </a:r>
+          </a:p>
+          <a:p>
+            <a:r>
+              <a:rPr lang="en-US" dirty="0"/>
+              <a:t>Let you retry something you did wrong</a:t>
+            </a:r>
+          </a:p>
+          <a:p>
+            <a:r>
+              <a:rPr lang="en-US" dirty="0"/>
+              <a:t>Send you out into the hall, or to another seat in the classroom</a:t>
+            </a:r>
+          </a:p>
+          <a:p>
+            <a:r>
+              <a:rPr lang="en-US" dirty="0"/>
+              <a:t>And lastly, </a:t>
+            </a:r>
+            <a:r>
+              <a:rPr lang="en-US" b="1" dirty="0"/>
+              <a:t>we will not hesitate to call Mr. Taylor or Ms. Mac</a:t>
+            </a:r>
+            <a:r>
+              <a:rPr lang="en-US" b="0" dirty="0"/>
+              <a:t>.</a:t>
+            </a:r>
+          </a:p>
+          <a:p>
+            <a:r>
+              <a:rPr lang="en-US" b="0" dirty="0"/>
+              <a:t>You probably don’t want us to do that – so please try to behave so we don’t have to get to that point </a:t>
+            </a:r>
+            <a:r>
+              <a:rPr lang="en-US" b="0" dirty="0">
+                <a:sym typeface="Wingdings" panose="05000000000000000000" pitchFamily="2" charset="2"/>
+              </a:rPr>
+              <a:t></a:t>
+            </a:r>
+            <a:endParaRPr lang="en-US" dirty="0"/>
+          </a:p>
+        </p:txBody>
+      </p:sp>
+    </p:spTree>
+    <p:extLst>
+      <p:ext uri="{BB962C8B-B14F-4D97-AF65-F5344CB8AC3E}">
+        <p14:creationId xmlns:p14="http://schemas.microsoft.com/office/powerpoint/2010/main" val="1268706201"/>
+      </p:ext>
+    </p:extLst>
+  </p:cSld>
+  <p:clrMapOvr>
+    <a:masterClrMapping/>
+  </p:clrMapOvr>
+</p:notes>
+</file>
+
+<file path=ppt/notesSlides/notesSlide5.xml><?xml version="1.0" encoding="utf-8"?>
 <p:notes xmlns:a="http://schemas.openxmlformats.org/drawingml/2006/main" xmlns:r="http://schemas.openxmlformats.org/officeDocument/2006/relationships" xmlns:p="http://schemas.openxmlformats.org/presentationml/2006/main" showMasterSp="0" showMasterPhAnim="0">
   <p:cSld>
     <p:spTree>
@@ -10384,6 +10654,2231 @@
   <p:cSld>
     <p:spTree>
       <p:nvGrpSpPr>
+        <p:cNvPr id="1" name=""/>
+        <p:cNvGrpSpPr/>
+        <p:nvPr/>
+      </p:nvGrpSpPr>
+      <p:grpSpPr>
+        <a:xfrm>
+          <a:off x="0" y="0"/>
+          <a:ext cx="0" cy="0"/>
+          <a:chOff x="0" y="0"/>
+          <a:chExt cx="0" cy="0"/>
+        </a:xfrm>
+      </p:grpSpPr>
+      <p:sp>
+        <p:nvSpPr>
+          <p:cNvPr id="2" name="Title 1">
+            <a:extLst>
+              <a:ext uri="{FF2B5EF4-FFF2-40B4-BE49-F238E27FC236}">
+                <a16:creationId xmlns:a16="http://schemas.microsoft.com/office/drawing/2014/main" id="{772E2426-DD00-41D7-8AD0-B44702A67DE8}"/>
+              </a:ext>
+            </a:extLst>
+          </p:cNvPr>
+          <p:cNvSpPr>
+            <a:spLocks noGrp="1"/>
+          </p:cNvSpPr>
+          <p:nvPr>
+            <p:ph type="title"/>
+          </p:nvPr>
+        </p:nvSpPr>
+        <p:spPr/>
+        <p:txBody>
+          <a:bodyPr/>
+          <a:lstStyle/>
+          <a:p>
+            <a:r>
+              <a:rPr lang="en-US" dirty="0"/>
+              <a:t>EXPECTATIONS -&gt; </a:t>
+            </a:r>
+            <a:r>
+              <a:rPr lang="en-US" dirty="0">
+                <a:highlight>
+                  <a:srgbClr val="97E4FF"/>
+                </a:highlight>
+              </a:rPr>
+              <a:t>RULES</a:t>
+            </a:r>
+          </a:p>
+        </p:txBody>
+      </p:sp>
+      <p:sp>
+        <p:nvSpPr>
+          <p:cNvPr id="3" name="Subtitle 2">
+            <a:extLst>
+              <a:ext uri="{FF2B5EF4-FFF2-40B4-BE49-F238E27FC236}">
+                <a16:creationId xmlns:a16="http://schemas.microsoft.com/office/drawing/2014/main" id="{2DF59E8A-FE2D-4F79-A55B-E3D6607BBAED}"/>
+              </a:ext>
+            </a:extLst>
+          </p:cNvPr>
+          <p:cNvSpPr>
+            <a:spLocks noGrp="1"/>
+          </p:cNvSpPr>
+          <p:nvPr>
+            <p:ph type="subTitle" idx="1"/>
+          </p:nvPr>
+        </p:nvSpPr>
+        <p:spPr>
+          <a:xfrm>
+            <a:off x="1066025" y="1498601"/>
+            <a:ext cx="2773200" cy="572700"/>
+          </a:xfrm>
+        </p:spPr>
+        <p:txBody>
+          <a:bodyPr/>
+          <a:lstStyle/>
+          <a:p>
+            <a:r>
+              <a:rPr lang="en-US" dirty="0"/>
+              <a:t>DO</a:t>
+            </a:r>
+          </a:p>
+        </p:txBody>
+      </p:sp>
+      <p:sp>
+        <p:nvSpPr>
+          <p:cNvPr id="5" name="Subtitle 4">
+            <a:extLst>
+              <a:ext uri="{FF2B5EF4-FFF2-40B4-BE49-F238E27FC236}">
+                <a16:creationId xmlns:a16="http://schemas.microsoft.com/office/drawing/2014/main" id="{2C874D6E-776C-459D-A808-FC71A9921BAA}"/>
+              </a:ext>
+            </a:extLst>
+          </p:cNvPr>
+          <p:cNvSpPr>
+            <a:spLocks noGrp="1"/>
+          </p:cNvSpPr>
+          <p:nvPr>
+            <p:ph type="subTitle" idx="3"/>
+          </p:nvPr>
+        </p:nvSpPr>
+        <p:spPr>
+          <a:xfrm>
+            <a:off x="5322475" y="1603001"/>
+            <a:ext cx="2773200" cy="468300"/>
+          </a:xfrm>
+        </p:spPr>
+        <p:txBody>
+          <a:bodyPr/>
+          <a:lstStyle/>
+          <a:p>
+            <a:r>
+              <a:rPr lang="en-US" dirty="0"/>
+              <a:t>DON’T</a:t>
+            </a:r>
+          </a:p>
+        </p:txBody>
+      </p:sp>
+      <p:sp>
+        <p:nvSpPr>
+          <p:cNvPr id="7" name="Rectangle 6">
+            <a:extLst>
+              <a:ext uri="{FF2B5EF4-FFF2-40B4-BE49-F238E27FC236}">
+                <a16:creationId xmlns:a16="http://schemas.microsoft.com/office/drawing/2014/main" id="{48E95274-E44F-4629-84A0-4B71306431A5}"/>
+              </a:ext>
+            </a:extLst>
+          </p:cNvPr>
+          <p:cNvSpPr/>
+          <p:nvPr/>
+        </p:nvSpPr>
+        <p:spPr>
+          <a:xfrm>
+            <a:off x="605956" y="2071302"/>
+            <a:ext cx="1404389" cy="593594"/>
+          </a:xfrm>
+          <a:prstGeom prst="rect">
+            <a:avLst/>
+          </a:prstGeom>
+          <a:solidFill>
+            <a:schemeClr val="accent3"/>
+          </a:solidFill>
+          <a:ln>
+            <a:solidFill>
+              <a:schemeClr val="tx1"/>
+            </a:solidFill>
+          </a:ln>
+        </p:spPr>
+        <p:style>
+          <a:lnRef idx="2">
+            <a:schemeClr val="accent1">
+              <a:shade val="50000"/>
+            </a:schemeClr>
+          </a:lnRef>
+          <a:fillRef idx="1">
+            <a:schemeClr val="accent1"/>
+          </a:fillRef>
+          <a:effectRef idx="0">
+            <a:schemeClr val="accent1"/>
+          </a:effectRef>
+          <a:fontRef idx="minor">
+            <a:schemeClr val="lt1"/>
+          </a:fontRef>
+        </p:style>
+        <p:txBody>
+          <a:bodyPr rtlCol="0" anchor="ctr"/>
+          <a:lstStyle/>
+          <a:p>
+            <a:pPr algn="ctr"/>
+            <a:r>
+              <a:rPr lang="en-US" b="1" dirty="0">
+                <a:solidFill>
+                  <a:schemeClr val="tx1"/>
+                </a:solidFill>
+                <a:latin typeface="Miriam Libre" panose="00000500000000000000" pitchFamily="2" charset="-79"/>
+                <a:cs typeface="Miriam Libre" panose="00000500000000000000" pitchFamily="2" charset="-79"/>
+              </a:rPr>
+              <a:t>STAY IN YOUR SEATS 🪑</a:t>
+            </a:r>
+          </a:p>
+        </p:txBody>
+      </p:sp>
+      <p:sp>
+        <p:nvSpPr>
+          <p:cNvPr id="8" name="Rectangle 7">
+            <a:extLst>
+              <a:ext uri="{FF2B5EF4-FFF2-40B4-BE49-F238E27FC236}">
+                <a16:creationId xmlns:a16="http://schemas.microsoft.com/office/drawing/2014/main" id="{0C23A681-3557-4B3E-A147-432589BED4E9}"/>
+              </a:ext>
+            </a:extLst>
+          </p:cNvPr>
+          <p:cNvSpPr/>
+          <p:nvPr/>
+        </p:nvSpPr>
+        <p:spPr>
+          <a:xfrm>
+            <a:off x="188330" y="2822818"/>
+            <a:ext cx="1762600" cy="985321"/>
+          </a:xfrm>
+          <a:prstGeom prst="rect">
+            <a:avLst/>
+          </a:prstGeom>
+          <a:solidFill>
+            <a:schemeClr val="accent3"/>
+          </a:solidFill>
+          <a:ln>
+            <a:solidFill>
+              <a:schemeClr val="tx1"/>
+            </a:solidFill>
+          </a:ln>
+        </p:spPr>
+        <p:style>
+          <a:lnRef idx="2">
+            <a:schemeClr val="accent1">
+              <a:shade val="50000"/>
+            </a:schemeClr>
+          </a:lnRef>
+          <a:fillRef idx="1">
+            <a:schemeClr val="accent1"/>
+          </a:fillRef>
+          <a:effectRef idx="0">
+            <a:schemeClr val="accent1"/>
+          </a:effectRef>
+          <a:fontRef idx="minor">
+            <a:schemeClr val="lt1"/>
+          </a:fontRef>
+        </p:style>
+        <p:txBody>
+          <a:bodyPr rtlCol="0" anchor="ctr"/>
+          <a:lstStyle/>
+          <a:p>
+            <a:pPr algn="ctr"/>
+            <a:r>
+              <a:rPr lang="en-US" b="1" dirty="0">
+                <a:solidFill>
+                  <a:schemeClr val="tx1"/>
+                </a:solidFill>
+                <a:latin typeface="Miriam Libre" panose="00000500000000000000" pitchFamily="2" charset="-79"/>
+                <a:cs typeface="Miriam Libre" panose="00000500000000000000" pitchFamily="2" charset="-79"/>
+              </a:rPr>
+              <a:t>THROW AWAY CANDY WRAPPERS 🍬🚮</a:t>
+            </a:r>
+          </a:p>
+        </p:txBody>
+      </p:sp>
+      <p:sp>
+        <p:nvSpPr>
+          <p:cNvPr id="9" name="Rectangle 8">
+            <a:extLst>
+              <a:ext uri="{FF2B5EF4-FFF2-40B4-BE49-F238E27FC236}">
+                <a16:creationId xmlns:a16="http://schemas.microsoft.com/office/drawing/2014/main" id="{17BE2F62-4F71-4B3A-A4AA-FD2CBE419B1F}"/>
+              </a:ext>
+            </a:extLst>
+          </p:cNvPr>
+          <p:cNvSpPr/>
+          <p:nvPr/>
+        </p:nvSpPr>
+        <p:spPr>
+          <a:xfrm>
+            <a:off x="646305" y="3968344"/>
+            <a:ext cx="1205346" cy="498765"/>
+          </a:xfrm>
+          <a:prstGeom prst="rect">
+            <a:avLst/>
+          </a:prstGeom>
+          <a:solidFill>
+            <a:schemeClr val="accent3"/>
+          </a:solidFill>
+          <a:ln>
+            <a:solidFill>
+              <a:schemeClr val="tx1"/>
+            </a:solidFill>
+          </a:ln>
+        </p:spPr>
+        <p:style>
+          <a:lnRef idx="2">
+            <a:schemeClr val="accent1">
+              <a:shade val="50000"/>
+            </a:schemeClr>
+          </a:lnRef>
+          <a:fillRef idx="1">
+            <a:schemeClr val="accent1"/>
+          </a:fillRef>
+          <a:effectRef idx="0">
+            <a:schemeClr val="accent1"/>
+          </a:effectRef>
+          <a:fontRef idx="minor">
+            <a:schemeClr val="lt1"/>
+          </a:fontRef>
+        </p:style>
+        <p:txBody>
+          <a:bodyPr rtlCol="0" anchor="ctr"/>
+          <a:lstStyle/>
+          <a:p>
+            <a:pPr algn="ctr"/>
+            <a:r>
+              <a:rPr lang="en-US" b="1" dirty="0">
+                <a:solidFill>
+                  <a:schemeClr val="tx1"/>
+                </a:solidFill>
+                <a:latin typeface="Miriam Libre" panose="00000500000000000000" pitchFamily="2" charset="-79"/>
+                <a:cs typeface="Miriam Libre" panose="00000500000000000000" pitchFamily="2" charset="-79"/>
+              </a:rPr>
+              <a:t>CHILL 😎 </a:t>
+            </a:r>
+          </a:p>
+        </p:txBody>
+      </p:sp>
+      <p:sp>
+        <p:nvSpPr>
+          <p:cNvPr id="10" name="Rectangle 9">
+            <a:extLst>
+              <a:ext uri="{FF2B5EF4-FFF2-40B4-BE49-F238E27FC236}">
+                <a16:creationId xmlns:a16="http://schemas.microsoft.com/office/drawing/2014/main" id="{BCBE1CDE-4984-48B9-96CC-5EDF131CCF21}"/>
+              </a:ext>
+            </a:extLst>
+          </p:cNvPr>
+          <p:cNvSpPr/>
+          <p:nvPr/>
+        </p:nvSpPr>
+        <p:spPr>
+          <a:xfrm>
+            <a:off x="2281651" y="2260571"/>
+            <a:ext cx="1885518" cy="739478"/>
+          </a:xfrm>
+          <a:prstGeom prst="rect">
+            <a:avLst/>
+          </a:prstGeom>
+          <a:solidFill>
+            <a:schemeClr val="accent3"/>
+          </a:solidFill>
+          <a:ln>
+            <a:solidFill>
+              <a:schemeClr val="tx1"/>
+            </a:solidFill>
+          </a:ln>
+        </p:spPr>
+        <p:style>
+          <a:lnRef idx="2">
+            <a:schemeClr val="accent1">
+              <a:shade val="50000"/>
+            </a:schemeClr>
+          </a:lnRef>
+          <a:fillRef idx="1">
+            <a:schemeClr val="accent1"/>
+          </a:fillRef>
+          <a:effectRef idx="0">
+            <a:schemeClr val="accent1"/>
+          </a:effectRef>
+          <a:fontRef idx="minor">
+            <a:schemeClr val="lt1"/>
+          </a:fontRef>
+        </p:style>
+        <p:txBody>
+          <a:bodyPr rtlCol="0" anchor="ctr"/>
+          <a:lstStyle/>
+          <a:p>
+            <a:pPr algn="ctr"/>
+            <a:r>
+              <a:rPr lang="en-US" b="1" dirty="0">
+                <a:solidFill>
+                  <a:schemeClr val="tx1"/>
+                </a:solidFill>
+                <a:latin typeface="Miriam Libre" panose="00000500000000000000" pitchFamily="2" charset="-79"/>
+                <a:cs typeface="Miriam Libre" panose="00000500000000000000" pitchFamily="2" charset="-79"/>
+              </a:rPr>
+              <a:t>BE EXCELLENT TO EACH OTHER </a:t>
+            </a:r>
+            <a:r>
+              <a:rPr lang="en-US" sz="1100" dirty="0">
+                <a:solidFill>
+                  <a:schemeClr val="tx1"/>
+                </a:solidFill>
+                <a:latin typeface="Miriam Libre" panose="00000500000000000000" pitchFamily="2" charset="-79"/>
+                <a:cs typeface="Miriam Libre" panose="00000500000000000000" pitchFamily="2" charset="-79"/>
+              </a:rPr>
+              <a:t>(AND US)</a:t>
+            </a:r>
+            <a:endParaRPr lang="en-US" dirty="0">
+              <a:solidFill>
+                <a:schemeClr val="tx1"/>
+              </a:solidFill>
+              <a:latin typeface="Miriam Libre" panose="00000500000000000000" pitchFamily="2" charset="-79"/>
+              <a:cs typeface="Miriam Libre" panose="00000500000000000000" pitchFamily="2" charset="-79"/>
+            </a:endParaRPr>
+          </a:p>
+        </p:txBody>
+      </p:sp>
+      <p:sp>
+        <p:nvSpPr>
+          <p:cNvPr id="13" name="Rectangle 12">
+            <a:extLst>
+              <a:ext uri="{FF2B5EF4-FFF2-40B4-BE49-F238E27FC236}">
+                <a16:creationId xmlns:a16="http://schemas.microsoft.com/office/drawing/2014/main" id="{0A8D8805-CFE6-4B11-BEDB-D6C71859D6EC}"/>
+              </a:ext>
+            </a:extLst>
+          </p:cNvPr>
+          <p:cNvSpPr/>
+          <p:nvPr/>
+        </p:nvSpPr>
+        <p:spPr>
+          <a:xfrm>
+            <a:off x="4928821" y="2176851"/>
+            <a:ext cx="1670573" cy="990298"/>
+          </a:xfrm>
+          <a:prstGeom prst="rect">
+            <a:avLst/>
+          </a:prstGeom>
+          <a:solidFill>
+            <a:schemeClr val="accent1">
+              <a:lumMod val="75000"/>
+            </a:schemeClr>
+          </a:solidFill>
+          <a:ln>
+            <a:solidFill>
+              <a:schemeClr val="tx1"/>
+            </a:solidFill>
+          </a:ln>
+        </p:spPr>
+        <p:style>
+          <a:lnRef idx="2">
+            <a:schemeClr val="accent1">
+              <a:shade val="50000"/>
+            </a:schemeClr>
+          </a:lnRef>
+          <a:fillRef idx="1">
+            <a:schemeClr val="accent1"/>
+          </a:fillRef>
+          <a:effectRef idx="0">
+            <a:schemeClr val="accent1"/>
+          </a:effectRef>
+          <a:fontRef idx="minor">
+            <a:schemeClr val="lt1"/>
+          </a:fontRef>
+        </p:style>
+        <p:txBody>
+          <a:bodyPr rtlCol="0" anchor="ctr"/>
+          <a:lstStyle/>
+          <a:p>
+            <a:pPr algn="ctr"/>
+            <a:r>
+              <a:rPr lang="en-US" b="1" dirty="0">
+                <a:solidFill>
+                  <a:schemeClr val="tx1"/>
+                </a:solidFill>
+                <a:latin typeface="Miriam Libre" panose="00000500000000000000" pitchFamily="2" charset="-79"/>
+                <a:cs typeface="Miriam Libre" panose="00000500000000000000" pitchFamily="2" charset="-79"/>
+              </a:rPr>
+              <a:t>PLAY SOUND FROM YOUR CHROMEBOOK 🔊</a:t>
+            </a:r>
+          </a:p>
+        </p:txBody>
+      </p:sp>
+      <p:sp>
+        <p:nvSpPr>
+          <p:cNvPr id="14" name="Rectangle 13">
+            <a:extLst>
+              <a:ext uri="{FF2B5EF4-FFF2-40B4-BE49-F238E27FC236}">
+                <a16:creationId xmlns:a16="http://schemas.microsoft.com/office/drawing/2014/main" id="{215EDC8C-FCEC-435E-9BC7-A7207EB86732}"/>
+              </a:ext>
+            </a:extLst>
+          </p:cNvPr>
+          <p:cNvSpPr/>
+          <p:nvPr/>
+        </p:nvSpPr>
+        <p:spPr>
+          <a:xfrm>
+            <a:off x="5042966" y="3416218"/>
+            <a:ext cx="1442282" cy="906919"/>
+          </a:xfrm>
+          <a:prstGeom prst="rect">
+            <a:avLst/>
+          </a:prstGeom>
+          <a:solidFill>
+            <a:schemeClr val="accent1">
+              <a:lumMod val="75000"/>
+            </a:schemeClr>
+          </a:solidFill>
+          <a:ln>
+            <a:solidFill>
+              <a:schemeClr val="tx1"/>
+            </a:solidFill>
+          </a:ln>
+        </p:spPr>
+        <p:style>
+          <a:lnRef idx="2">
+            <a:schemeClr val="accent1">
+              <a:shade val="50000"/>
+            </a:schemeClr>
+          </a:lnRef>
+          <a:fillRef idx="1">
+            <a:schemeClr val="accent1"/>
+          </a:fillRef>
+          <a:effectRef idx="0">
+            <a:schemeClr val="accent1"/>
+          </a:effectRef>
+          <a:fontRef idx="minor">
+            <a:schemeClr val="lt1"/>
+          </a:fontRef>
+        </p:style>
+        <p:txBody>
+          <a:bodyPr rtlCol="0" anchor="ctr"/>
+          <a:lstStyle/>
+          <a:p>
+            <a:pPr algn="ctr"/>
+            <a:r>
+              <a:rPr lang="en-US" b="1" dirty="0">
+                <a:solidFill>
+                  <a:schemeClr val="tx1"/>
+                </a:solidFill>
+                <a:latin typeface="Miriam Libre" panose="00000500000000000000" pitchFamily="2" charset="-79"/>
+                <a:cs typeface="Miriam Libre" panose="00000500000000000000" pitchFamily="2" charset="-79"/>
+              </a:rPr>
+              <a:t>WRITE ON THE SCREEN 🖊📺</a:t>
+            </a:r>
+          </a:p>
+        </p:txBody>
+      </p:sp>
+      <p:sp>
+        <p:nvSpPr>
+          <p:cNvPr id="16" name="Rectangle 15">
+            <a:extLst>
+              <a:ext uri="{FF2B5EF4-FFF2-40B4-BE49-F238E27FC236}">
+                <a16:creationId xmlns:a16="http://schemas.microsoft.com/office/drawing/2014/main" id="{5B79CBB1-617D-417C-B8CD-F66B5B75FACA}"/>
+              </a:ext>
+            </a:extLst>
+          </p:cNvPr>
+          <p:cNvSpPr/>
+          <p:nvPr/>
+        </p:nvSpPr>
+        <p:spPr>
+          <a:xfrm>
+            <a:off x="6930115" y="2822818"/>
+            <a:ext cx="1324424" cy="875027"/>
+          </a:xfrm>
+          <a:prstGeom prst="rect">
+            <a:avLst/>
+          </a:prstGeom>
+          <a:solidFill>
+            <a:schemeClr val="accent1">
+              <a:lumMod val="75000"/>
+            </a:schemeClr>
+          </a:solidFill>
+          <a:ln>
+            <a:solidFill>
+              <a:schemeClr val="tx1"/>
+            </a:solidFill>
+          </a:ln>
+        </p:spPr>
+        <p:style>
+          <a:lnRef idx="2">
+            <a:schemeClr val="accent1">
+              <a:shade val="50000"/>
+            </a:schemeClr>
+          </a:lnRef>
+          <a:fillRef idx="1">
+            <a:schemeClr val="accent1"/>
+          </a:fillRef>
+          <a:effectRef idx="0">
+            <a:schemeClr val="accent1"/>
+          </a:effectRef>
+          <a:fontRef idx="minor">
+            <a:schemeClr val="lt1"/>
+          </a:fontRef>
+        </p:style>
+        <p:txBody>
+          <a:bodyPr rtlCol="0" anchor="ctr"/>
+          <a:lstStyle/>
+          <a:p>
+            <a:pPr algn="ctr"/>
+            <a:r>
+              <a:rPr lang="en-US" b="1" dirty="0">
+                <a:solidFill>
+                  <a:schemeClr val="tx1"/>
+                </a:solidFill>
+                <a:latin typeface="Miriam Libre" panose="00000500000000000000" pitchFamily="2" charset="-79"/>
+                <a:cs typeface="Miriam Libre" panose="00000500000000000000" pitchFamily="2" charset="-79"/>
+              </a:rPr>
+              <a:t>DISTRACT EACH OTHER 🗣</a:t>
+            </a:r>
+          </a:p>
+        </p:txBody>
+      </p:sp>
+      <p:sp>
+        <p:nvSpPr>
+          <p:cNvPr id="17" name="Rectangle 16">
+            <a:extLst>
+              <a:ext uri="{FF2B5EF4-FFF2-40B4-BE49-F238E27FC236}">
+                <a16:creationId xmlns:a16="http://schemas.microsoft.com/office/drawing/2014/main" id="{256B5EA2-A390-406A-AC8B-449673003EB4}"/>
+              </a:ext>
+            </a:extLst>
+          </p:cNvPr>
+          <p:cNvSpPr/>
+          <p:nvPr/>
+        </p:nvSpPr>
+        <p:spPr>
+          <a:xfrm>
+            <a:off x="7032567" y="3869678"/>
+            <a:ext cx="1496370" cy="597431"/>
+          </a:xfrm>
+          <a:prstGeom prst="rect">
+            <a:avLst/>
+          </a:prstGeom>
+          <a:solidFill>
+            <a:schemeClr val="accent1">
+              <a:lumMod val="75000"/>
+            </a:schemeClr>
+          </a:solidFill>
+          <a:ln>
+            <a:solidFill>
+              <a:schemeClr val="tx1"/>
+            </a:solidFill>
+          </a:ln>
+        </p:spPr>
+        <p:style>
+          <a:lnRef idx="2">
+            <a:schemeClr val="accent1">
+              <a:shade val="50000"/>
+            </a:schemeClr>
+          </a:lnRef>
+          <a:fillRef idx="1">
+            <a:schemeClr val="accent1"/>
+          </a:fillRef>
+          <a:effectRef idx="0">
+            <a:schemeClr val="accent1"/>
+          </a:effectRef>
+          <a:fontRef idx="minor">
+            <a:schemeClr val="lt1"/>
+          </a:fontRef>
+        </p:style>
+        <p:txBody>
+          <a:bodyPr rtlCol="0" anchor="ctr"/>
+          <a:lstStyle/>
+          <a:p>
+            <a:pPr algn="ctr"/>
+            <a:r>
+              <a:rPr lang="en-US" b="1" dirty="0">
+                <a:solidFill>
+                  <a:schemeClr val="tx1"/>
+                </a:solidFill>
+                <a:latin typeface="Miriam Libre" panose="00000500000000000000" pitchFamily="2" charset="-79"/>
+                <a:cs typeface="Miriam Libre" panose="00000500000000000000" pitchFamily="2" charset="-79"/>
+              </a:rPr>
+              <a:t>BE MEAN 😔</a:t>
+            </a:r>
+          </a:p>
+        </p:txBody>
+      </p:sp>
+      <p:sp>
+        <p:nvSpPr>
+          <p:cNvPr id="15" name="Rectangle 14">
+            <a:extLst>
+              <a:ext uri="{FF2B5EF4-FFF2-40B4-BE49-F238E27FC236}">
+                <a16:creationId xmlns:a16="http://schemas.microsoft.com/office/drawing/2014/main" id="{4BFB7C71-D7D2-462E-A49F-0C7325FB09DB}"/>
+              </a:ext>
+            </a:extLst>
+          </p:cNvPr>
+          <p:cNvSpPr/>
+          <p:nvPr/>
+        </p:nvSpPr>
+        <p:spPr>
+          <a:xfrm>
+            <a:off x="7032568" y="2158147"/>
+            <a:ext cx="1959498" cy="489466"/>
+          </a:xfrm>
+          <a:prstGeom prst="rect">
+            <a:avLst/>
+          </a:prstGeom>
+          <a:solidFill>
+            <a:schemeClr val="accent1">
+              <a:lumMod val="75000"/>
+            </a:schemeClr>
+          </a:solidFill>
+          <a:ln>
+            <a:solidFill>
+              <a:schemeClr val="tx1"/>
+            </a:solidFill>
+          </a:ln>
+        </p:spPr>
+        <p:style>
+          <a:lnRef idx="2">
+            <a:schemeClr val="accent1">
+              <a:shade val="50000"/>
+            </a:schemeClr>
+          </a:lnRef>
+          <a:fillRef idx="1">
+            <a:schemeClr val="accent1"/>
+          </a:fillRef>
+          <a:effectRef idx="0">
+            <a:schemeClr val="accent1"/>
+          </a:effectRef>
+          <a:fontRef idx="minor">
+            <a:schemeClr val="lt1"/>
+          </a:fontRef>
+        </p:style>
+        <p:txBody>
+          <a:bodyPr rtlCol="0" anchor="ctr"/>
+          <a:lstStyle/>
+          <a:p>
+            <a:pPr algn="ctr"/>
+            <a:r>
+              <a:rPr lang="en-US" b="1" dirty="0">
+                <a:solidFill>
+                  <a:schemeClr val="tx1"/>
+                </a:solidFill>
+                <a:latin typeface="Miriam Libre" panose="00000500000000000000" pitchFamily="2" charset="-79"/>
+                <a:cs typeface="Miriam Libre" panose="00000500000000000000" pitchFamily="2" charset="-79"/>
+              </a:rPr>
+              <a:t>HIT EACH OTHER 🤼‍♂️</a:t>
+            </a:r>
+          </a:p>
+        </p:txBody>
+      </p:sp>
+      <p:pic>
+        <p:nvPicPr>
+          <p:cNvPr id="1028" name="Picture 4" descr="Keanu World Order: Bill &amp; Ted's Excellent Adventure – Midwest Film Journal">
+            <a:extLst>
+              <a:ext uri="{FF2B5EF4-FFF2-40B4-BE49-F238E27FC236}">
+                <a16:creationId xmlns:a16="http://schemas.microsoft.com/office/drawing/2014/main" id="{A8004A78-497F-4BC2-AC78-063D9861749A}"/>
+              </a:ext>
+            </a:extLst>
+          </p:cNvPr>
+          <p:cNvPicPr>
+            <a:picLocks noChangeAspect="1" noChangeArrowheads="1"/>
+          </p:cNvPicPr>
+          <p:nvPr/>
+        </p:nvPicPr>
+        <p:blipFill rotWithShape="1">
+          <a:blip r:embed="rId3">
+            <a:extLst>
+              <a:ext uri="{28A0092B-C50C-407E-A947-70E740481C1C}">
+                <a14:useLocalDpi xmlns:a14="http://schemas.microsoft.com/office/drawing/2010/main" val="0"/>
+              </a:ext>
+            </a:extLst>
+          </a:blip>
+          <a:srcRect l="5055" r="3989"/>
+          <a:stretch/>
+        </p:blipFill>
+        <p:spPr bwMode="auto">
+          <a:xfrm>
+            <a:off x="2093786" y="3414973"/>
+            <a:ext cx="2504313" cy="1479917"/>
+          </a:xfrm>
+          <a:prstGeom prst="rect">
+            <a:avLst/>
+          </a:prstGeom>
+          <a:noFill/>
+          <a:ln w="28575">
+            <a:solidFill>
+              <a:schemeClr val="tx1"/>
+            </a:solidFill>
+          </a:ln>
+          <a:extLst>
+            <a:ext uri="{909E8E84-426E-40DD-AFC4-6F175D3DCCD1}">
+              <a14:hiddenFill xmlns:a14="http://schemas.microsoft.com/office/drawing/2010/main">
+                <a:solidFill>
+                  <a:srgbClr val="FFFFFF"/>
+                </a:solidFill>
+              </a14:hiddenFill>
+            </a:ext>
+          </a:extLst>
+        </p:spPr>
+      </p:pic>
+    </p:spTree>
+    <p:extLst>
+      <p:ext uri="{BB962C8B-B14F-4D97-AF65-F5344CB8AC3E}">
+        <p14:creationId xmlns:p14="http://schemas.microsoft.com/office/powerpoint/2010/main" val="4271859582"/>
+      </p:ext>
+    </p:extLst>
+  </p:cSld>
+  <p:clrMapOvr>
+    <a:masterClrMapping/>
+  </p:clrMapOvr>
+  <p:timing>
+    <p:tnLst>
+      <p:par>
+        <p:cTn id="1" dur="indefinite" restart="never" nodeType="tmRoot">
+          <p:childTnLst>
+            <p:seq concurrent="1" nextAc="seek">
+              <p:cTn id="2" dur="indefinite" nodeType="mainSeq">
+                <p:childTnLst>
+                  <p:par>
+                    <p:cTn id="3" fill="hold">
+                      <p:stCondLst>
+                        <p:cond delay="indefinite"/>
+                      </p:stCondLst>
+                      <p:childTnLst>
+                        <p:par>
+                          <p:cTn id="4" fill="hold">
+                            <p:stCondLst>
+                              <p:cond delay="0"/>
+                            </p:stCondLst>
+                            <p:childTnLst>
+                              <p:par>
+                                <p:cTn id="5" presetID="1" presetClass="entr" presetSubtype="0" fill="hold" grpId="0" nodeType="clickEffect">
+                                  <p:stCondLst>
+                                    <p:cond delay="0"/>
+                                  </p:stCondLst>
+                                  <p:childTnLst>
+                                    <p:set>
+                                      <p:cBhvr>
+                                        <p:cTn id="6" dur="1" fill="hold">
+                                          <p:stCondLst>
+                                            <p:cond delay="0"/>
+                                          </p:stCondLst>
+                                        </p:cTn>
+                                        <p:tgtEl>
+                                          <p:spTgt spid="13"/>
+                                        </p:tgtEl>
+                                        <p:attrNameLst>
+                                          <p:attrName>style.visibility</p:attrName>
+                                        </p:attrNameLst>
+                                      </p:cBhvr>
+                                      <p:to>
+                                        <p:strVal val="visible"/>
+                                      </p:to>
+                                    </p:set>
+                                  </p:childTnLst>
+                                </p:cTn>
+                              </p:par>
+                            </p:childTnLst>
+                          </p:cTn>
+                        </p:par>
+                      </p:childTnLst>
+                    </p:cTn>
+                  </p:par>
+                  <p:par>
+                    <p:cTn id="7" fill="hold">
+                      <p:stCondLst>
+                        <p:cond delay="indefinite"/>
+                      </p:stCondLst>
+                      <p:childTnLst>
+                        <p:par>
+                          <p:cTn id="8" fill="hold">
+                            <p:stCondLst>
+                              <p:cond delay="0"/>
+                            </p:stCondLst>
+                            <p:childTnLst>
+                              <p:par>
+                                <p:cTn id="9" presetID="1" presetClass="entr" presetSubtype="0" fill="hold" grpId="0" nodeType="clickEffect">
+                                  <p:stCondLst>
+                                    <p:cond delay="0"/>
+                                  </p:stCondLst>
+                                  <p:childTnLst>
+                                    <p:set>
+                                      <p:cBhvr>
+                                        <p:cTn id="10" dur="1" fill="hold">
+                                          <p:stCondLst>
+                                            <p:cond delay="0"/>
+                                          </p:stCondLst>
+                                        </p:cTn>
+                                        <p:tgtEl>
+                                          <p:spTgt spid="14"/>
+                                        </p:tgtEl>
+                                        <p:attrNameLst>
+                                          <p:attrName>style.visibility</p:attrName>
+                                        </p:attrNameLst>
+                                      </p:cBhvr>
+                                      <p:to>
+                                        <p:strVal val="visible"/>
+                                      </p:to>
+                                    </p:set>
+                                  </p:childTnLst>
+                                </p:cTn>
+                              </p:par>
+                            </p:childTnLst>
+                          </p:cTn>
+                        </p:par>
+                      </p:childTnLst>
+                    </p:cTn>
+                  </p:par>
+                  <p:par>
+                    <p:cTn id="11" fill="hold">
+                      <p:stCondLst>
+                        <p:cond delay="indefinite"/>
+                      </p:stCondLst>
+                      <p:childTnLst>
+                        <p:par>
+                          <p:cTn id="12" fill="hold">
+                            <p:stCondLst>
+                              <p:cond delay="0"/>
+                            </p:stCondLst>
+                            <p:childTnLst>
+                              <p:par>
+                                <p:cTn id="13" presetID="1" presetClass="entr" presetSubtype="0" fill="hold" grpId="0" nodeType="clickEffect">
+                                  <p:stCondLst>
+                                    <p:cond delay="0"/>
+                                  </p:stCondLst>
+                                  <p:childTnLst>
+                                    <p:set>
+                                      <p:cBhvr>
+                                        <p:cTn id="14" dur="1" fill="hold">
+                                          <p:stCondLst>
+                                            <p:cond delay="0"/>
+                                          </p:stCondLst>
+                                        </p:cTn>
+                                        <p:tgtEl>
+                                          <p:spTgt spid="15"/>
+                                        </p:tgtEl>
+                                        <p:attrNameLst>
+                                          <p:attrName>style.visibility</p:attrName>
+                                        </p:attrNameLst>
+                                      </p:cBhvr>
+                                      <p:to>
+                                        <p:strVal val="visible"/>
+                                      </p:to>
+                                    </p:set>
+                                  </p:childTnLst>
+                                </p:cTn>
+                              </p:par>
+                            </p:childTnLst>
+                          </p:cTn>
+                        </p:par>
+                      </p:childTnLst>
+                    </p:cTn>
+                  </p:par>
+                  <p:par>
+                    <p:cTn id="15" fill="hold">
+                      <p:stCondLst>
+                        <p:cond delay="indefinite"/>
+                      </p:stCondLst>
+                      <p:childTnLst>
+                        <p:par>
+                          <p:cTn id="16" fill="hold">
+                            <p:stCondLst>
+                              <p:cond delay="0"/>
+                            </p:stCondLst>
+                            <p:childTnLst>
+                              <p:par>
+                                <p:cTn id="17" presetID="1" presetClass="entr" presetSubtype="0" fill="hold" grpId="0" nodeType="clickEffect">
+                                  <p:stCondLst>
+                                    <p:cond delay="0"/>
+                                  </p:stCondLst>
+                                  <p:childTnLst>
+                                    <p:set>
+                                      <p:cBhvr>
+                                        <p:cTn id="18" dur="1" fill="hold">
+                                          <p:stCondLst>
+                                            <p:cond delay="0"/>
+                                          </p:stCondLst>
+                                        </p:cTn>
+                                        <p:tgtEl>
+                                          <p:spTgt spid="16"/>
+                                        </p:tgtEl>
+                                        <p:attrNameLst>
+                                          <p:attrName>style.visibility</p:attrName>
+                                        </p:attrNameLst>
+                                      </p:cBhvr>
+                                      <p:to>
+                                        <p:strVal val="visible"/>
+                                      </p:to>
+                                    </p:set>
+                                  </p:childTnLst>
+                                </p:cTn>
+                              </p:par>
+                            </p:childTnLst>
+                          </p:cTn>
+                        </p:par>
+                      </p:childTnLst>
+                    </p:cTn>
+                  </p:par>
+                  <p:par>
+                    <p:cTn id="19" fill="hold">
+                      <p:stCondLst>
+                        <p:cond delay="indefinite"/>
+                      </p:stCondLst>
+                      <p:childTnLst>
+                        <p:par>
+                          <p:cTn id="20" fill="hold">
+                            <p:stCondLst>
+                              <p:cond delay="0"/>
+                            </p:stCondLst>
+                            <p:childTnLst>
+                              <p:par>
+                                <p:cTn id="21" presetID="1" presetClass="entr" presetSubtype="0" fill="hold" grpId="0" nodeType="clickEffect">
+                                  <p:stCondLst>
+                                    <p:cond delay="0"/>
+                                  </p:stCondLst>
+                                  <p:childTnLst>
+                                    <p:set>
+                                      <p:cBhvr>
+                                        <p:cTn id="22" dur="1" fill="hold">
+                                          <p:stCondLst>
+                                            <p:cond delay="0"/>
+                                          </p:stCondLst>
+                                        </p:cTn>
+                                        <p:tgtEl>
+                                          <p:spTgt spid="17"/>
+                                        </p:tgtEl>
+                                        <p:attrNameLst>
+                                          <p:attrName>style.visibility</p:attrName>
+                                        </p:attrNameLst>
+                                      </p:cBhvr>
+                                      <p:to>
+                                        <p:strVal val="visible"/>
+                                      </p:to>
+                                    </p:set>
+                                  </p:childTnLst>
+                                </p:cTn>
+                              </p:par>
+                            </p:childTnLst>
+                          </p:cTn>
+                        </p:par>
+                      </p:childTnLst>
+                    </p:cTn>
+                  </p:par>
+                  <p:par>
+                    <p:cTn id="23" fill="hold">
+                      <p:stCondLst>
+                        <p:cond delay="indefinite"/>
+                      </p:stCondLst>
+                      <p:childTnLst>
+                        <p:par>
+                          <p:cTn id="24" fill="hold">
+                            <p:stCondLst>
+                              <p:cond delay="0"/>
+                            </p:stCondLst>
+                            <p:childTnLst>
+                              <p:par>
+                                <p:cTn id="25" presetID="1" presetClass="entr" presetSubtype="0" fill="hold" grpId="0" nodeType="clickEffect">
+                                  <p:stCondLst>
+                                    <p:cond delay="0"/>
+                                  </p:stCondLst>
+                                  <p:childTnLst>
+                                    <p:set>
+                                      <p:cBhvr>
+                                        <p:cTn id="26" dur="1" fill="hold">
+                                          <p:stCondLst>
+                                            <p:cond delay="0"/>
+                                          </p:stCondLst>
+                                        </p:cTn>
+                                        <p:tgtEl>
+                                          <p:spTgt spid="7"/>
+                                        </p:tgtEl>
+                                        <p:attrNameLst>
+                                          <p:attrName>style.visibility</p:attrName>
+                                        </p:attrNameLst>
+                                      </p:cBhvr>
+                                      <p:to>
+                                        <p:strVal val="visible"/>
+                                      </p:to>
+                                    </p:set>
+                                  </p:childTnLst>
+                                </p:cTn>
+                              </p:par>
+                            </p:childTnLst>
+                          </p:cTn>
+                        </p:par>
+                      </p:childTnLst>
+                    </p:cTn>
+                  </p:par>
+                  <p:par>
+                    <p:cTn id="27" fill="hold">
+                      <p:stCondLst>
+                        <p:cond delay="indefinite"/>
+                      </p:stCondLst>
+                      <p:childTnLst>
+                        <p:par>
+                          <p:cTn id="28" fill="hold">
+                            <p:stCondLst>
+                              <p:cond delay="0"/>
+                            </p:stCondLst>
+                            <p:childTnLst>
+                              <p:par>
+                                <p:cTn id="29" presetID="1" presetClass="entr" presetSubtype="0" fill="hold" grpId="0" nodeType="clickEffect">
+                                  <p:stCondLst>
+                                    <p:cond delay="0"/>
+                                  </p:stCondLst>
+                                  <p:childTnLst>
+                                    <p:set>
+                                      <p:cBhvr>
+                                        <p:cTn id="30" dur="1" fill="hold">
+                                          <p:stCondLst>
+                                            <p:cond delay="0"/>
+                                          </p:stCondLst>
+                                        </p:cTn>
+                                        <p:tgtEl>
+                                          <p:spTgt spid="8"/>
+                                        </p:tgtEl>
+                                        <p:attrNameLst>
+                                          <p:attrName>style.visibility</p:attrName>
+                                        </p:attrNameLst>
+                                      </p:cBhvr>
+                                      <p:to>
+                                        <p:strVal val="visible"/>
+                                      </p:to>
+                                    </p:set>
+                                  </p:childTnLst>
+                                </p:cTn>
+                              </p:par>
+                            </p:childTnLst>
+                          </p:cTn>
+                        </p:par>
+                      </p:childTnLst>
+                    </p:cTn>
+                  </p:par>
+                  <p:par>
+                    <p:cTn id="31" fill="hold">
+                      <p:stCondLst>
+                        <p:cond delay="indefinite"/>
+                      </p:stCondLst>
+                      <p:childTnLst>
+                        <p:par>
+                          <p:cTn id="32" fill="hold">
+                            <p:stCondLst>
+                              <p:cond delay="0"/>
+                            </p:stCondLst>
+                            <p:childTnLst>
+                              <p:par>
+                                <p:cTn id="33" presetID="1" presetClass="entr" presetSubtype="0" fill="hold" grpId="0" nodeType="clickEffect">
+                                  <p:stCondLst>
+                                    <p:cond delay="0"/>
+                                  </p:stCondLst>
+                                  <p:childTnLst>
+                                    <p:set>
+                                      <p:cBhvr>
+                                        <p:cTn id="34" dur="1" fill="hold">
+                                          <p:stCondLst>
+                                            <p:cond delay="0"/>
+                                          </p:stCondLst>
+                                        </p:cTn>
+                                        <p:tgtEl>
+                                          <p:spTgt spid="9"/>
+                                        </p:tgtEl>
+                                        <p:attrNameLst>
+                                          <p:attrName>style.visibility</p:attrName>
+                                        </p:attrNameLst>
+                                      </p:cBhvr>
+                                      <p:to>
+                                        <p:strVal val="visible"/>
+                                      </p:to>
+                                    </p:set>
+                                  </p:childTnLst>
+                                </p:cTn>
+                              </p:par>
+                            </p:childTnLst>
+                          </p:cTn>
+                        </p:par>
+                      </p:childTnLst>
+                    </p:cTn>
+                  </p:par>
+                  <p:par>
+                    <p:cTn id="35" fill="hold">
+                      <p:stCondLst>
+                        <p:cond delay="indefinite"/>
+                      </p:stCondLst>
+                      <p:childTnLst>
+                        <p:par>
+                          <p:cTn id="36" fill="hold">
+                            <p:stCondLst>
+                              <p:cond delay="0"/>
+                            </p:stCondLst>
+                            <p:childTnLst>
+                              <p:par>
+                                <p:cTn id="37" presetID="1" presetClass="entr" presetSubtype="0" fill="hold" grpId="0" nodeType="clickEffect">
+                                  <p:stCondLst>
+                                    <p:cond delay="0"/>
+                                  </p:stCondLst>
+                                  <p:childTnLst>
+                                    <p:set>
+                                      <p:cBhvr>
+                                        <p:cTn id="38" dur="1" fill="hold">
+                                          <p:stCondLst>
+                                            <p:cond delay="0"/>
+                                          </p:stCondLst>
+                                        </p:cTn>
+                                        <p:tgtEl>
+                                          <p:spTgt spid="10"/>
+                                        </p:tgtEl>
+                                        <p:attrNameLst>
+                                          <p:attrName>style.visibility</p:attrName>
+                                        </p:attrNameLst>
+                                      </p:cBhvr>
+                                      <p:to>
+                                        <p:strVal val="visible"/>
+                                      </p:to>
+                                    </p:set>
+                                  </p:childTnLst>
+                                </p:cTn>
+                              </p:par>
+                              <p:par>
+                                <p:cTn id="39" presetID="10" presetClass="entr" presetSubtype="0" fill="hold" nodeType="withEffect">
+                                  <p:stCondLst>
+                                    <p:cond delay="0"/>
+                                  </p:stCondLst>
+                                  <p:childTnLst>
+                                    <p:set>
+                                      <p:cBhvr>
+                                        <p:cTn id="40" dur="1" fill="hold">
+                                          <p:stCondLst>
+                                            <p:cond delay="0"/>
+                                          </p:stCondLst>
+                                        </p:cTn>
+                                        <p:tgtEl>
+                                          <p:spTgt spid="1028"/>
+                                        </p:tgtEl>
+                                        <p:attrNameLst>
+                                          <p:attrName>style.visibility</p:attrName>
+                                        </p:attrNameLst>
+                                      </p:cBhvr>
+                                      <p:to>
+                                        <p:strVal val="visible"/>
+                                      </p:to>
+                                    </p:set>
+                                    <p:animEffect transition="in" filter="fade">
+                                      <p:cBhvr>
+                                        <p:cTn id="41" dur="500"/>
+                                        <p:tgtEl>
+                                          <p:spTgt spid="1028"/>
+                                        </p:tgtEl>
+                                      </p:cBhvr>
+                                    </p:animEffect>
+                                  </p:childTnLst>
+                                </p:cTn>
+                              </p:par>
+                            </p:childTnLst>
+                          </p:cTn>
+                        </p:par>
+                      </p:childTnLst>
+                    </p:cTn>
+                  </p:par>
+                </p:childTnLst>
+              </p:cTn>
+              <p:prevCondLst>
+                <p:cond evt="onPrev" delay="0">
+                  <p:tgtEl>
+                    <p:sldTgt/>
+                  </p:tgtEl>
+                </p:cond>
+              </p:prevCondLst>
+              <p:nextCondLst>
+                <p:cond evt="onNext" delay="0">
+                  <p:tgtEl>
+                    <p:sldTgt/>
+                  </p:tgtEl>
+                </p:cond>
+              </p:nextCondLst>
+            </p:seq>
+          </p:childTnLst>
+        </p:cTn>
+      </p:par>
+    </p:tnLst>
+    <p:bldLst>
+      <p:bldP spid="7" grpId="0" animBg="1"/>
+      <p:bldP spid="8" grpId="0" animBg="1"/>
+      <p:bldP spid="9" grpId="0" animBg="1"/>
+      <p:bldP spid="10" grpId="0" animBg="1"/>
+      <p:bldP spid="13" grpId="0" animBg="1"/>
+      <p:bldP spid="14" grpId="0" animBg="1"/>
+      <p:bldP spid="16" grpId="0" animBg="1"/>
+      <p:bldP spid="17" grpId="0" animBg="1"/>
+      <p:bldP spid="15" grpId="0" animBg="1"/>
+    </p:bldLst>
+  </p:timing>
+</p:sld>
+</file>
+
+<file path=ppt/slides/slide4.xml><?xml version="1.0" encoding="utf-8"?>
+<p:sld xmlns:a="http://schemas.openxmlformats.org/drawingml/2006/main" xmlns:r="http://schemas.openxmlformats.org/officeDocument/2006/relationships" xmlns:p="http://schemas.openxmlformats.org/presentationml/2006/main">
+  <p:cSld>
+    <p:spTree>
+      <p:nvGrpSpPr>
+        <p:cNvPr id="1" name=""/>
+        <p:cNvGrpSpPr/>
+        <p:nvPr/>
+      </p:nvGrpSpPr>
+      <p:grpSpPr>
+        <a:xfrm>
+          <a:off x="0" y="0"/>
+          <a:ext cx="0" cy="0"/>
+          <a:chOff x="0" y="0"/>
+          <a:chExt cx="0" cy="0"/>
+        </a:xfrm>
+      </p:grpSpPr>
+      <p:sp>
+        <p:nvSpPr>
+          <p:cNvPr id="2" name="Google Shape;1408;p49">
+            <a:extLst>
+              <a:ext uri="{FF2B5EF4-FFF2-40B4-BE49-F238E27FC236}">
+                <a16:creationId xmlns:a16="http://schemas.microsoft.com/office/drawing/2014/main" id="{1BD2D95A-8BC4-4753-9401-A91E7BB2DC1E}"/>
+              </a:ext>
+            </a:extLst>
+          </p:cNvPr>
+          <p:cNvSpPr txBox="1">
+            <a:spLocks/>
+          </p:cNvSpPr>
+          <p:nvPr/>
+        </p:nvSpPr>
+        <p:spPr>
+          <a:xfrm>
+            <a:off x="720000" y="445025"/>
+            <a:ext cx="7704000" cy="572700"/>
+          </a:xfrm>
+          <a:prstGeom prst="rect">
+            <a:avLst/>
+          </a:prstGeom>
+        </p:spPr>
+        <p:txBody>
+          <a:bodyPr spcFirstLastPara="1" wrap="square" lIns="91425" tIns="91425" rIns="91425" bIns="91425" anchor="t" anchorCtr="0">
+            <a:noAutofit/>
+          </a:bodyPr>
+          <a:lstStyle>
+            <a:defPPr marR="0" lvl="0" algn="l" rtl="0">
+              <a:lnSpc>
+                <a:spcPct val="100000"/>
+              </a:lnSpc>
+              <a:spcBef>
+                <a:spcPts val="0"/>
+              </a:spcBef>
+              <a:spcAft>
+                <a:spcPts val="0"/>
+              </a:spcAft>
+            </a:defPPr>
+            <a:lvl1pPr marR="0" lvl="0" algn="l" rtl="0">
+              <a:lnSpc>
+                <a:spcPct val="100000"/>
+              </a:lnSpc>
+              <a:spcBef>
+                <a:spcPts val="0"/>
+              </a:spcBef>
+              <a:spcAft>
+                <a:spcPts val="0"/>
+              </a:spcAft>
+              <a:buClr>
+                <a:srgbClr val="000000"/>
+              </a:buClr>
+              <a:buFont typeface="Arial"/>
+              <a:defRPr sz="1400" b="0" i="0" u="none" strike="noStrike" cap="none">
+                <a:solidFill>
+                  <a:srgbClr val="000000"/>
+                </a:solidFill>
+                <a:latin typeface="Arial"/>
+                <a:ea typeface="Arial"/>
+                <a:cs typeface="Arial"/>
+                <a:sym typeface="Arial"/>
+              </a:defRPr>
+            </a:lvl1pPr>
+            <a:lvl2pPr marR="0" lvl="1" algn="l" rtl="0">
+              <a:lnSpc>
+                <a:spcPct val="100000"/>
+              </a:lnSpc>
+              <a:spcBef>
+                <a:spcPts val="0"/>
+              </a:spcBef>
+              <a:spcAft>
+                <a:spcPts val="0"/>
+              </a:spcAft>
+              <a:buClr>
+                <a:srgbClr val="000000"/>
+              </a:buClr>
+              <a:buFont typeface="Arial"/>
+              <a:defRPr sz="1400" b="0" i="0" u="none" strike="noStrike" cap="none">
+                <a:solidFill>
+                  <a:srgbClr val="000000"/>
+                </a:solidFill>
+                <a:latin typeface="Arial"/>
+                <a:ea typeface="Arial"/>
+                <a:cs typeface="Arial"/>
+                <a:sym typeface="Arial"/>
+              </a:defRPr>
+            </a:lvl2pPr>
+            <a:lvl3pPr marR="0" lvl="2" algn="l" rtl="0">
+              <a:lnSpc>
+                <a:spcPct val="100000"/>
+              </a:lnSpc>
+              <a:spcBef>
+                <a:spcPts val="0"/>
+              </a:spcBef>
+              <a:spcAft>
+                <a:spcPts val="0"/>
+              </a:spcAft>
+              <a:buClr>
+                <a:srgbClr val="000000"/>
+              </a:buClr>
+              <a:buFont typeface="Arial"/>
+              <a:defRPr sz="1400" b="0" i="0" u="none" strike="noStrike" cap="none">
+                <a:solidFill>
+                  <a:srgbClr val="000000"/>
+                </a:solidFill>
+                <a:latin typeface="Arial"/>
+                <a:ea typeface="Arial"/>
+                <a:cs typeface="Arial"/>
+                <a:sym typeface="Arial"/>
+              </a:defRPr>
+            </a:lvl3pPr>
+            <a:lvl4pPr marR="0" lvl="3" algn="l" rtl="0">
+              <a:lnSpc>
+                <a:spcPct val="100000"/>
+              </a:lnSpc>
+              <a:spcBef>
+                <a:spcPts val="0"/>
+              </a:spcBef>
+              <a:spcAft>
+                <a:spcPts val="0"/>
+              </a:spcAft>
+              <a:buClr>
+                <a:srgbClr val="000000"/>
+              </a:buClr>
+              <a:buFont typeface="Arial"/>
+              <a:defRPr sz="1400" b="0" i="0" u="none" strike="noStrike" cap="none">
+                <a:solidFill>
+                  <a:srgbClr val="000000"/>
+                </a:solidFill>
+                <a:latin typeface="Arial"/>
+                <a:ea typeface="Arial"/>
+                <a:cs typeface="Arial"/>
+                <a:sym typeface="Arial"/>
+              </a:defRPr>
+            </a:lvl4pPr>
+            <a:lvl5pPr marR="0" lvl="4" algn="l" rtl="0">
+              <a:lnSpc>
+                <a:spcPct val="100000"/>
+              </a:lnSpc>
+              <a:spcBef>
+                <a:spcPts val="0"/>
+              </a:spcBef>
+              <a:spcAft>
+                <a:spcPts val="0"/>
+              </a:spcAft>
+              <a:buClr>
+                <a:srgbClr val="000000"/>
+              </a:buClr>
+              <a:buFont typeface="Arial"/>
+              <a:defRPr sz="1400" b="0" i="0" u="none" strike="noStrike" cap="none">
+                <a:solidFill>
+                  <a:srgbClr val="000000"/>
+                </a:solidFill>
+                <a:latin typeface="Arial"/>
+                <a:ea typeface="Arial"/>
+                <a:cs typeface="Arial"/>
+                <a:sym typeface="Arial"/>
+              </a:defRPr>
+            </a:lvl5pPr>
+            <a:lvl6pPr marR="0" lvl="5" algn="l" rtl="0">
+              <a:lnSpc>
+                <a:spcPct val="100000"/>
+              </a:lnSpc>
+              <a:spcBef>
+                <a:spcPts val="0"/>
+              </a:spcBef>
+              <a:spcAft>
+                <a:spcPts val="0"/>
+              </a:spcAft>
+              <a:buClr>
+                <a:srgbClr val="000000"/>
+              </a:buClr>
+              <a:buFont typeface="Arial"/>
+              <a:defRPr sz="1400" b="0" i="0" u="none" strike="noStrike" cap="none">
+                <a:solidFill>
+                  <a:srgbClr val="000000"/>
+                </a:solidFill>
+                <a:latin typeface="Arial"/>
+                <a:ea typeface="Arial"/>
+                <a:cs typeface="Arial"/>
+                <a:sym typeface="Arial"/>
+              </a:defRPr>
+            </a:lvl6pPr>
+            <a:lvl7pPr marR="0" lvl="6" algn="l" rtl="0">
+              <a:lnSpc>
+                <a:spcPct val="100000"/>
+              </a:lnSpc>
+              <a:spcBef>
+                <a:spcPts val="0"/>
+              </a:spcBef>
+              <a:spcAft>
+                <a:spcPts val="0"/>
+              </a:spcAft>
+              <a:buClr>
+                <a:srgbClr val="000000"/>
+              </a:buClr>
+              <a:buFont typeface="Arial"/>
+              <a:defRPr sz="1400" b="0" i="0" u="none" strike="noStrike" cap="none">
+                <a:solidFill>
+                  <a:srgbClr val="000000"/>
+                </a:solidFill>
+                <a:latin typeface="Arial"/>
+                <a:ea typeface="Arial"/>
+                <a:cs typeface="Arial"/>
+                <a:sym typeface="Arial"/>
+              </a:defRPr>
+            </a:lvl7pPr>
+            <a:lvl8pPr marR="0" lvl="7" algn="l" rtl="0">
+              <a:lnSpc>
+                <a:spcPct val="100000"/>
+              </a:lnSpc>
+              <a:spcBef>
+                <a:spcPts val="0"/>
+              </a:spcBef>
+              <a:spcAft>
+                <a:spcPts val="0"/>
+              </a:spcAft>
+              <a:buClr>
+                <a:srgbClr val="000000"/>
+              </a:buClr>
+              <a:buFont typeface="Arial"/>
+              <a:defRPr sz="1400" b="0" i="0" u="none" strike="noStrike" cap="none">
+                <a:solidFill>
+                  <a:srgbClr val="000000"/>
+                </a:solidFill>
+                <a:latin typeface="Arial"/>
+                <a:ea typeface="Arial"/>
+                <a:cs typeface="Arial"/>
+                <a:sym typeface="Arial"/>
+              </a:defRPr>
+            </a:lvl8pPr>
+            <a:lvl9pPr marR="0" lvl="8" algn="l" rtl="0">
+              <a:lnSpc>
+                <a:spcPct val="100000"/>
+              </a:lnSpc>
+              <a:spcBef>
+                <a:spcPts val="0"/>
+              </a:spcBef>
+              <a:spcAft>
+                <a:spcPts val="0"/>
+              </a:spcAft>
+              <a:buClr>
+                <a:srgbClr val="000000"/>
+              </a:buClr>
+              <a:buFont typeface="Arial"/>
+              <a:defRPr sz="1400" b="0" i="0" u="none" strike="noStrike" cap="none">
+                <a:solidFill>
+                  <a:srgbClr val="000000"/>
+                </a:solidFill>
+                <a:latin typeface="Arial"/>
+                <a:ea typeface="Arial"/>
+                <a:cs typeface="Arial"/>
+                <a:sym typeface="Arial"/>
+              </a:defRPr>
+            </a:lvl9pPr>
+          </a:lstStyle>
+          <a:p>
+            <a:r>
+              <a:rPr lang="en-US" sz="2800" b="1" dirty="0">
+                <a:highlight>
+                  <a:schemeClr val="accent3"/>
+                </a:highlight>
+                <a:latin typeface="Krona One" panose="020B0604020202020204" charset="0"/>
+              </a:rPr>
+              <a:t>ESCALATION</a:t>
+            </a:r>
+          </a:p>
+        </p:txBody>
+      </p:sp>
+      <p:sp>
+        <p:nvSpPr>
+          <p:cNvPr id="3" name="TextBox 2">
+            <a:extLst>
+              <a:ext uri="{FF2B5EF4-FFF2-40B4-BE49-F238E27FC236}">
+                <a16:creationId xmlns:a16="http://schemas.microsoft.com/office/drawing/2014/main" id="{EBA8BFB3-632E-4600-9436-FF94D220B665}"/>
+              </a:ext>
+            </a:extLst>
+          </p:cNvPr>
+          <p:cNvSpPr txBox="1"/>
+          <p:nvPr/>
+        </p:nvSpPr>
+        <p:spPr>
+          <a:xfrm>
+            <a:off x="720000" y="1436948"/>
+            <a:ext cx="7059946" cy="584775"/>
+          </a:xfrm>
+          <a:prstGeom prst="rect">
+            <a:avLst/>
+          </a:prstGeom>
+          <a:noFill/>
+        </p:spPr>
+        <p:txBody>
+          <a:bodyPr wrap="none" rtlCol="0">
+            <a:spAutoFit/>
+          </a:bodyPr>
+          <a:lstStyle/>
+          <a:p>
+            <a:r>
+              <a:rPr lang="en-US" sz="3200" i="1" dirty="0">
+                <a:latin typeface="Miriam Libre" panose="00000500000000000000" pitchFamily="2" charset="-79"/>
+                <a:cs typeface="Miriam Libre" panose="00000500000000000000" pitchFamily="2" charset="-79"/>
+              </a:rPr>
+              <a:t>What if I still want to misbehave? </a:t>
+            </a:r>
+          </a:p>
+        </p:txBody>
+      </p:sp>
+      <p:pic>
+        <p:nvPicPr>
+          <p:cNvPr id="2050" name="Picture 2">
+            <a:extLst>
+              <a:ext uri="{FF2B5EF4-FFF2-40B4-BE49-F238E27FC236}">
+                <a16:creationId xmlns:a16="http://schemas.microsoft.com/office/drawing/2014/main" id="{897A7825-94D1-430A-BF3C-94FBC5E04F2F}"/>
+              </a:ext>
+            </a:extLst>
+          </p:cNvPr>
+          <p:cNvPicPr>
+            <a:picLocks noChangeAspect="1" noChangeArrowheads="1"/>
+          </p:cNvPicPr>
+          <p:nvPr/>
+        </p:nvPicPr>
+        <p:blipFill rotWithShape="1">
+          <a:blip r:embed="rId3">
+            <a:extLst>
+              <a:ext uri="{BEBA8EAE-BF5A-486C-A8C5-ECC9F3942E4B}">
+                <a14:imgProps xmlns:a14="http://schemas.microsoft.com/office/drawing/2010/main">
+                  <a14:imgLayer r:embed="rId4">
+                    <a14:imgEffect>
+                      <a14:colorTemperature colorTemp="8800"/>
+                    </a14:imgEffect>
+                  </a14:imgLayer>
+                </a14:imgProps>
+              </a:ext>
+              <a:ext uri="{28A0092B-C50C-407E-A947-70E740481C1C}">
+                <a14:useLocalDpi xmlns:a14="http://schemas.microsoft.com/office/drawing/2010/main" val="0"/>
+              </a:ext>
+            </a:extLst>
+          </a:blip>
+          <a:srcRect l="48891"/>
+          <a:stretch/>
+        </p:blipFill>
+        <p:spPr bwMode="auto">
+          <a:xfrm>
+            <a:off x="4968433" y="2199445"/>
+            <a:ext cx="3560424" cy="2345323"/>
+          </a:xfrm>
+          <a:prstGeom prst="rect">
+            <a:avLst/>
+          </a:prstGeom>
+          <a:noFill/>
+          <a:extLst>
+            <a:ext uri="{909E8E84-426E-40DD-AFC4-6F175D3DCCD1}">
+              <a14:hiddenFill xmlns:a14="http://schemas.microsoft.com/office/drawing/2010/main">
+                <a:solidFill>
+                  <a:srgbClr val="FFFFFF"/>
+                </a:solidFill>
+              </a14:hiddenFill>
+            </a:ext>
+          </a:extLst>
+        </p:spPr>
+      </p:pic>
+      <p:sp>
+        <p:nvSpPr>
+          <p:cNvPr id="5" name="TextBox 4">
+            <a:extLst>
+              <a:ext uri="{FF2B5EF4-FFF2-40B4-BE49-F238E27FC236}">
+                <a16:creationId xmlns:a16="http://schemas.microsoft.com/office/drawing/2014/main" id="{C2F98E4F-C74C-4738-B8A6-D679A7CF46E0}"/>
+              </a:ext>
+            </a:extLst>
+          </p:cNvPr>
+          <p:cNvSpPr txBox="1"/>
+          <p:nvPr/>
+        </p:nvSpPr>
+        <p:spPr>
+          <a:xfrm>
+            <a:off x="720000" y="2199445"/>
+            <a:ext cx="4206239" cy="2154436"/>
+          </a:xfrm>
+          <a:prstGeom prst="rect">
+            <a:avLst/>
+          </a:prstGeom>
+          <a:noFill/>
+        </p:spPr>
+        <p:txBody>
+          <a:bodyPr wrap="square" rtlCol="0">
+            <a:spAutoFit/>
+          </a:bodyPr>
+          <a:lstStyle/>
+          <a:p>
+            <a:r>
+              <a:rPr lang="en-US" sz="2400" b="1" dirty="0">
+                <a:latin typeface="Miriam Libre" panose="00000500000000000000" pitchFamily="2" charset="-79"/>
+                <a:cs typeface="Miriam Libre" panose="00000500000000000000" pitchFamily="2" charset="-79"/>
+              </a:rPr>
+              <a:t>We may:</a:t>
+            </a:r>
+          </a:p>
+          <a:p>
+            <a:endParaRPr lang="en-US" sz="1000" b="1" dirty="0">
+              <a:latin typeface="Miriam Libre" panose="00000500000000000000" pitchFamily="2" charset="-79"/>
+              <a:cs typeface="Miriam Libre" panose="00000500000000000000" pitchFamily="2" charset="-79"/>
+            </a:endParaRPr>
+          </a:p>
+          <a:p>
+            <a:pPr marL="342900" indent="-342900">
+              <a:buFont typeface="Arial" panose="020B0604020202020204" pitchFamily="34" charset="0"/>
+              <a:buChar char="•"/>
+            </a:pPr>
+            <a:r>
+              <a:rPr lang="en-US" sz="2000" dirty="0">
+                <a:solidFill>
+                  <a:srgbClr val="00B050"/>
+                </a:solidFill>
+                <a:latin typeface="Miriam Libre" panose="00000500000000000000" pitchFamily="2" charset="-79"/>
+                <a:cs typeface="Miriam Libre" panose="00000500000000000000" pitchFamily="2" charset="-79"/>
+              </a:rPr>
+              <a:t>Withhold candy</a:t>
+            </a:r>
+          </a:p>
+          <a:p>
+            <a:pPr marL="342900" indent="-342900">
+              <a:buFont typeface="Arial" panose="020B0604020202020204" pitchFamily="34" charset="0"/>
+              <a:buChar char="•"/>
+            </a:pPr>
+            <a:r>
+              <a:rPr lang="en-US" sz="2000" dirty="0">
+                <a:solidFill>
+                  <a:srgbClr val="6CA62C"/>
+                </a:solidFill>
+                <a:latin typeface="Miriam Libre" panose="00000500000000000000" pitchFamily="2" charset="-79"/>
+                <a:cs typeface="Miriam Libre" panose="00000500000000000000" pitchFamily="2" charset="-79"/>
+              </a:rPr>
+              <a:t>Restate our instructions</a:t>
+            </a:r>
+          </a:p>
+          <a:p>
+            <a:pPr marL="342900" indent="-342900">
+              <a:buFont typeface="Arial" panose="020B0604020202020204" pitchFamily="34" charset="0"/>
+              <a:buChar char="•"/>
+            </a:pPr>
+            <a:r>
+              <a:rPr lang="en-US" sz="2000" dirty="0">
+                <a:solidFill>
+                  <a:schemeClr val="accent2">
+                    <a:lumMod val="50000"/>
+                  </a:schemeClr>
+                </a:solidFill>
+                <a:latin typeface="Miriam Libre" panose="00000500000000000000" pitchFamily="2" charset="-79"/>
+                <a:cs typeface="Miriam Libre" panose="00000500000000000000" pitchFamily="2" charset="-79"/>
+              </a:rPr>
+              <a:t>Give you a chance to try again</a:t>
+            </a:r>
+          </a:p>
+          <a:p>
+            <a:pPr marL="342900" indent="-342900">
+              <a:buFont typeface="Arial" panose="020B0604020202020204" pitchFamily="34" charset="0"/>
+              <a:buChar char="•"/>
+            </a:pPr>
+            <a:r>
+              <a:rPr lang="en-US" sz="2000" dirty="0">
+                <a:solidFill>
+                  <a:schemeClr val="accent1">
+                    <a:lumMod val="50000"/>
+                  </a:schemeClr>
+                </a:solidFill>
+                <a:latin typeface="Miriam Libre" panose="00000500000000000000" pitchFamily="2" charset="-79"/>
+                <a:cs typeface="Miriam Libre" panose="00000500000000000000" pitchFamily="2" charset="-79"/>
+              </a:rPr>
+              <a:t>Let you work in the hall</a:t>
+            </a:r>
+          </a:p>
+          <a:p>
+            <a:pPr marL="342900" indent="-342900">
+              <a:buFont typeface="Arial" panose="020B0604020202020204" pitchFamily="34" charset="0"/>
+              <a:buChar char="•"/>
+            </a:pPr>
+            <a:r>
+              <a:rPr lang="en-US" sz="2000" b="1" dirty="0">
+                <a:solidFill>
+                  <a:srgbClr val="FF0000"/>
+                </a:solidFill>
+                <a:latin typeface="Miriam Libre" panose="00000500000000000000" pitchFamily="2" charset="-79"/>
+                <a:cs typeface="Miriam Libre" panose="00000500000000000000" pitchFamily="2" charset="-79"/>
+              </a:rPr>
+              <a:t>Call Mr. Taylor / Ms. Mac</a:t>
+            </a:r>
+          </a:p>
+        </p:txBody>
+      </p:sp>
+    </p:spTree>
+    <p:extLst>
+      <p:ext uri="{BB962C8B-B14F-4D97-AF65-F5344CB8AC3E}">
+        <p14:creationId xmlns:p14="http://schemas.microsoft.com/office/powerpoint/2010/main" val="2249180225"/>
+      </p:ext>
+    </p:extLst>
+  </p:cSld>
+  <p:clrMapOvr>
+    <a:masterClrMapping/>
+  </p:clrMapOvr>
+  <p:timing>
+    <p:tnLst>
+      <p:par>
+        <p:cTn id="1" dur="indefinite" restart="never" nodeType="tmRoot">
+          <p:childTnLst>
+            <p:seq concurrent="1" nextAc="seek">
+              <p:cTn id="2" dur="indefinite" nodeType="mainSeq">
+                <p:childTnLst>
+                  <p:par>
+                    <p:cTn id="3" fill="hold">
+                      <p:stCondLst>
+                        <p:cond delay="indefinite"/>
+                      </p:stCondLst>
+                      <p:childTnLst>
+                        <p:par>
+                          <p:cTn id="4" fill="hold">
+                            <p:stCondLst>
+                              <p:cond delay="0"/>
+                            </p:stCondLst>
+                            <p:childTnLst>
+                              <p:par>
+                                <p:cTn id="5" presetID="22" presetClass="entr" presetSubtype="1" fill="hold" nodeType="clickEffect">
+                                  <p:stCondLst>
+                                    <p:cond delay="0"/>
+                                  </p:stCondLst>
+                                  <p:childTnLst>
+                                    <p:set>
+                                      <p:cBhvr>
+                                        <p:cTn id="6" dur="1" fill="hold">
+                                          <p:stCondLst>
+                                            <p:cond delay="0"/>
+                                          </p:stCondLst>
+                                        </p:cTn>
+                                        <p:tgtEl>
+                                          <p:spTgt spid="5">
+                                            <p:txEl>
+                                              <p:pRg st="0" end="0"/>
+                                            </p:txEl>
+                                          </p:spTgt>
+                                        </p:tgtEl>
+                                        <p:attrNameLst>
+                                          <p:attrName>style.visibility</p:attrName>
+                                        </p:attrNameLst>
+                                      </p:cBhvr>
+                                      <p:to>
+                                        <p:strVal val="visible"/>
+                                      </p:to>
+                                    </p:set>
+                                    <p:animEffect transition="in" filter="wipe(up)">
+                                      <p:cBhvr>
+                                        <p:cTn id="7" dur="500"/>
+                                        <p:tgtEl>
+                                          <p:spTgt spid="5">
+                                            <p:txEl>
+                                              <p:pRg st="0" end="0"/>
+                                            </p:txEl>
+                                          </p:spTgt>
+                                        </p:tgtEl>
+                                      </p:cBhvr>
+                                    </p:animEffect>
+                                  </p:childTnLst>
+                                </p:cTn>
+                              </p:par>
+                            </p:childTnLst>
+                          </p:cTn>
+                        </p:par>
+                      </p:childTnLst>
+                    </p:cTn>
+                  </p:par>
+                  <p:par>
+                    <p:cTn id="8" fill="hold">
+                      <p:stCondLst>
+                        <p:cond delay="indefinite"/>
+                      </p:stCondLst>
+                      <p:childTnLst>
+                        <p:par>
+                          <p:cTn id="9" fill="hold">
+                            <p:stCondLst>
+                              <p:cond delay="0"/>
+                            </p:stCondLst>
+                            <p:childTnLst>
+                              <p:par>
+                                <p:cTn id="10" presetID="22" presetClass="entr" presetSubtype="1" fill="hold" nodeType="clickEffect">
+                                  <p:stCondLst>
+                                    <p:cond delay="0"/>
+                                  </p:stCondLst>
+                                  <p:childTnLst>
+                                    <p:set>
+                                      <p:cBhvr>
+                                        <p:cTn id="11" dur="1" fill="hold">
+                                          <p:stCondLst>
+                                            <p:cond delay="0"/>
+                                          </p:stCondLst>
+                                        </p:cTn>
+                                        <p:tgtEl>
+                                          <p:spTgt spid="5">
+                                            <p:txEl>
+                                              <p:pRg st="2" end="2"/>
+                                            </p:txEl>
+                                          </p:spTgt>
+                                        </p:tgtEl>
+                                        <p:attrNameLst>
+                                          <p:attrName>style.visibility</p:attrName>
+                                        </p:attrNameLst>
+                                      </p:cBhvr>
+                                      <p:to>
+                                        <p:strVal val="visible"/>
+                                      </p:to>
+                                    </p:set>
+                                    <p:animEffect transition="in" filter="wipe(up)">
+                                      <p:cBhvr>
+                                        <p:cTn id="12" dur="500"/>
+                                        <p:tgtEl>
+                                          <p:spTgt spid="5">
+                                            <p:txEl>
+                                              <p:pRg st="2" end="2"/>
+                                            </p:txEl>
+                                          </p:spTgt>
+                                        </p:tgtEl>
+                                      </p:cBhvr>
+                                    </p:animEffect>
+                                  </p:childTnLst>
+                                </p:cTn>
+                              </p:par>
+                            </p:childTnLst>
+                          </p:cTn>
+                        </p:par>
+                      </p:childTnLst>
+                    </p:cTn>
+                  </p:par>
+                  <p:par>
+                    <p:cTn id="13" fill="hold">
+                      <p:stCondLst>
+                        <p:cond delay="indefinite"/>
+                      </p:stCondLst>
+                      <p:childTnLst>
+                        <p:par>
+                          <p:cTn id="14" fill="hold">
+                            <p:stCondLst>
+                              <p:cond delay="0"/>
+                            </p:stCondLst>
+                            <p:childTnLst>
+                              <p:par>
+                                <p:cTn id="15" presetID="22" presetClass="entr" presetSubtype="1" fill="hold" nodeType="clickEffect">
+                                  <p:stCondLst>
+                                    <p:cond delay="0"/>
+                                  </p:stCondLst>
+                                  <p:childTnLst>
+                                    <p:set>
+                                      <p:cBhvr>
+                                        <p:cTn id="16" dur="1" fill="hold">
+                                          <p:stCondLst>
+                                            <p:cond delay="0"/>
+                                          </p:stCondLst>
+                                        </p:cTn>
+                                        <p:tgtEl>
+                                          <p:spTgt spid="5">
+                                            <p:txEl>
+                                              <p:pRg st="3" end="3"/>
+                                            </p:txEl>
+                                          </p:spTgt>
+                                        </p:tgtEl>
+                                        <p:attrNameLst>
+                                          <p:attrName>style.visibility</p:attrName>
+                                        </p:attrNameLst>
+                                      </p:cBhvr>
+                                      <p:to>
+                                        <p:strVal val="visible"/>
+                                      </p:to>
+                                    </p:set>
+                                    <p:animEffect transition="in" filter="wipe(up)">
+                                      <p:cBhvr>
+                                        <p:cTn id="17" dur="500"/>
+                                        <p:tgtEl>
+                                          <p:spTgt spid="5">
+                                            <p:txEl>
+                                              <p:pRg st="3" end="3"/>
+                                            </p:txEl>
+                                          </p:spTgt>
+                                        </p:tgtEl>
+                                      </p:cBhvr>
+                                    </p:animEffect>
+                                  </p:childTnLst>
+                                </p:cTn>
+                              </p:par>
+                            </p:childTnLst>
+                          </p:cTn>
+                        </p:par>
+                      </p:childTnLst>
+                    </p:cTn>
+                  </p:par>
+                  <p:par>
+                    <p:cTn id="18" fill="hold">
+                      <p:stCondLst>
+                        <p:cond delay="indefinite"/>
+                      </p:stCondLst>
+                      <p:childTnLst>
+                        <p:par>
+                          <p:cTn id="19" fill="hold">
+                            <p:stCondLst>
+                              <p:cond delay="0"/>
+                            </p:stCondLst>
+                            <p:childTnLst>
+                              <p:par>
+                                <p:cTn id="20" presetID="22" presetClass="entr" presetSubtype="1" fill="hold" nodeType="clickEffect">
+                                  <p:stCondLst>
+                                    <p:cond delay="0"/>
+                                  </p:stCondLst>
+                                  <p:childTnLst>
+                                    <p:set>
+                                      <p:cBhvr>
+                                        <p:cTn id="21" dur="1" fill="hold">
+                                          <p:stCondLst>
+                                            <p:cond delay="0"/>
+                                          </p:stCondLst>
+                                        </p:cTn>
+                                        <p:tgtEl>
+                                          <p:spTgt spid="5">
+                                            <p:txEl>
+                                              <p:pRg st="4" end="4"/>
+                                            </p:txEl>
+                                          </p:spTgt>
+                                        </p:tgtEl>
+                                        <p:attrNameLst>
+                                          <p:attrName>style.visibility</p:attrName>
+                                        </p:attrNameLst>
+                                      </p:cBhvr>
+                                      <p:to>
+                                        <p:strVal val="visible"/>
+                                      </p:to>
+                                    </p:set>
+                                    <p:animEffect transition="in" filter="wipe(up)">
+                                      <p:cBhvr>
+                                        <p:cTn id="22" dur="500"/>
+                                        <p:tgtEl>
+                                          <p:spTgt spid="5">
+                                            <p:txEl>
+                                              <p:pRg st="4" end="4"/>
+                                            </p:txEl>
+                                          </p:spTgt>
+                                        </p:tgtEl>
+                                      </p:cBhvr>
+                                    </p:animEffect>
+                                  </p:childTnLst>
+                                </p:cTn>
+                              </p:par>
+                            </p:childTnLst>
+                          </p:cTn>
+                        </p:par>
+                      </p:childTnLst>
+                    </p:cTn>
+                  </p:par>
+                  <p:par>
+                    <p:cTn id="23" fill="hold">
+                      <p:stCondLst>
+                        <p:cond delay="indefinite"/>
+                      </p:stCondLst>
+                      <p:childTnLst>
+                        <p:par>
+                          <p:cTn id="24" fill="hold">
+                            <p:stCondLst>
+                              <p:cond delay="0"/>
+                            </p:stCondLst>
+                            <p:childTnLst>
+                              <p:par>
+                                <p:cTn id="25" presetID="22" presetClass="entr" presetSubtype="1" fill="hold" nodeType="clickEffect">
+                                  <p:stCondLst>
+                                    <p:cond delay="0"/>
+                                  </p:stCondLst>
+                                  <p:childTnLst>
+                                    <p:set>
+                                      <p:cBhvr>
+                                        <p:cTn id="26" dur="1" fill="hold">
+                                          <p:stCondLst>
+                                            <p:cond delay="0"/>
+                                          </p:stCondLst>
+                                        </p:cTn>
+                                        <p:tgtEl>
+                                          <p:spTgt spid="5">
+                                            <p:txEl>
+                                              <p:pRg st="5" end="5"/>
+                                            </p:txEl>
+                                          </p:spTgt>
+                                        </p:tgtEl>
+                                        <p:attrNameLst>
+                                          <p:attrName>style.visibility</p:attrName>
+                                        </p:attrNameLst>
+                                      </p:cBhvr>
+                                      <p:to>
+                                        <p:strVal val="visible"/>
+                                      </p:to>
+                                    </p:set>
+                                    <p:animEffect transition="in" filter="wipe(up)">
+                                      <p:cBhvr>
+                                        <p:cTn id="27" dur="500"/>
+                                        <p:tgtEl>
+                                          <p:spTgt spid="5">
+                                            <p:txEl>
+                                              <p:pRg st="5" end="5"/>
+                                            </p:txEl>
+                                          </p:spTgt>
+                                        </p:tgtEl>
+                                      </p:cBhvr>
+                                    </p:animEffect>
+                                  </p:childTnLst>
+                                </p:cTn>
+                              </p:par>
+                            </p:childTnLst>
+                          </p:cTn>
+                        </p:par>
+                      </p:childTnLst>
+                    </p:cTn>
+                  </p:par>
+                  <p:par>
+                    <p:cTn id="28" fill="hold">
+                      <p:stCondLst>
+                        <p:cond delay="indefinite"/>
+                      </p:stCondLst>
+                      <p:childTnLst>
+                        <p:par>
+                          <p:cTn id="29" fill="hold">
+                            <p:stCondLst>
+                              <p:cond delay="0"/>
+                            </p:stCondLst>
+                            <p:childTnLst>
+                              <p:par>
+                                <p:cTn id="30" presetID="22" presetClass="entr" presetSubtype="1" fill="hold" nodeType="clickEffect">
+                                  <p:stCondLst>
+                                    <p:cond delay="0"/>
+                                  </p:stCondLst>
+                                  <p:childTnLst>
+                                    <p:set>
+                                      <p:cBhvr>
+                                        <p:cTn id="31" dur="1" fill="hold">
+                                          <p:stCondLst>
+                                            <p:cond delay="0"/>
+                                          </p:stCondLst>
+                                        </p:cTn>
+                                        <p:tgtEl>
+                                          <p:spTgt spid="5">
+                                            <p:txEl>
+                                              <p:pRg st="6" end="6"/>
+                                            </p:txEl>
+                                          </p:spTgt>
+                                        </p:tgtEl>
+                                        <p:attrNameLst>
+                                          <p:attrName>style.visibility</p:attrName>
+                                        </p:attrNameLst>
+                                      </p:cBhvr>
+                                      <p:to>
+                                        <p:strVal val="visible"/>
+                                      </p:to>
+                                    </p:set>
+                                    <p:animEffect transition="in" filter="wipe(up)">
+                                      <p:cBhvr>
+                                        <p:cTn id="32" dur="500"/>
+                                        <p:tgtEl>
+                                          <p:spTgt spid="5">
+                                            <p:txEl>
+                                              <p:pRg st="6" end="6"/>
+                                            </p:txEl>
+                                          </p:spTgt>
+                                        </p:tgtEl>
+                                      </p:cBhvr>
+                                    </p:animEffect>
+                                  </p:childTnLst>
+                                </p:cTn>
+                              </p:par>
+                            </p:childTnLst>
+                          </p:cTn>
+                        </p:par>
+                      </p:childTnLst>
+                    </p:cTn>
+                  </p:par>
+                  <p:par>
+                    <p:cTn id="33" fill="hold">
+                      <p:stCondLst>
+                        <p:cond delay="indefinite"/>
+                      </p:stCondLst>
+                      <p:childTnLst>
+                        <p:par>
+                          <p:cTn id="34" fill="hold">
+                            <p:stCondLst>
+                              <p:cond delay="0"/>
+                            </p:stCondLst>
+                            <p:childTnLst>
+                              <p:par>
+                                <p:cTn id="35" presetID="10" presetClass="entr" presetSubtype="0" fill="hold" nodeType="clickEffect">
+                                  <p:stCondLst>
+                                    <p:cond delay="0"/>
+                                  </p:stCondLst>
+                                  <p:childTnLst>
+                                    <p:set>
+                                      <p:cBhvr>
+                                        <p:cTn id="36" dur="1" fill="hold">
+                                          <p:stCondLst>
+                                            <p:cond delay="0"/>
+                                          </p:stCondLst>
+                                        </p:cTn>
+                                        <p:tgtEl>
+                                          <p:spTgt spid="2050"/>
+                                        </p:tgtEl>
+                                        <p:attrNameLst>
+                                          <p:attrName>style.visibility</p:attrName>
+                                        </p:attrNameLst>
+                                      </p:cBhvr>
+                                      <p:to>
+                                        <p:strVal val="visible"/>
+                                      </p:to>
+                                    </p:set>
+                                    <p:animEffect transition="in" filter="fade">
+                                      <p:cBhvr>
+                                        <p:cTn id="37" dur="500"/>
+                                        <p:tgtEl>
+                                          <p:spTgt spid="2050"/>
+                                        </p:tgtEl>
+                                      </p:cBhvr>
+                                    </p:animEffect>
+                                  </p:childTnLst>
+                                </p:cTn>
+                              </p:par>
+                            </p:childTnLst>
+                          </p:cTn>
+                        </p:par>
+                      </p:childTnLst>
+                    </p:cTn>
+                  </p:par>
+                </p:childTnLst>
+              </p:cTn>
+              <p:prevCondLst>
+                <p:cond evt="onPrev" delay="0">
+                  <p:tgtEl>
+                    <p:sldTgt/>
+                  </p:tgtEl>
+                </p:cond>
+              </p:prevCondLst>
+              <p:nextCondLst>
+                <p:cond evt="onNext" delay="0">
+                  <p:tgtEl>
+                    <p:sldTgt/>
+                  </p:tgtEl>
+                </p:cond>
+              </p:nextCondLst>
+            </p:seq>
+          </p:childTnLst>
+        </p:cTn>
+      </p:par>
+    </p:tnLst>
+  </p:timing>
+</p:sld>
+</file>
+
+<file path=ppt/slides/slide5.xml><?xml version="1.0" encoding="utf-8"?>
+<p:sld xmlns:a="http://schemas.openxmlformats.org/drawingml/2006/main" xmlns:r="http://schemas.openxmlformats.org/officeDocument/2006/relationships" xmlns:p="http://schemas.openxmlformats.org/presentationml/2006/main">
+  <p:cSld>
+    <p:spTree>
+      <p:nvGrpSpPr>
         <p:cNvPr id="1" name="Shape 962"/>
         <p:cNvGrpSpPr/>
         <p:nvPr/>

</xml_diff>

<commit_message>
first pass for fall 2023
</commit_message>
<xml_diff>
--- a/IntroHyland/ClassroomExpectations.pptx
+++ b/IntroHyland/ClassroomExpectations.pptx
@@ -2129,7 +2129,7 @@
             </a:pPr>
             <a:r>
               <a:rPr lang="en-US" dirty="0"/>
-              <a:t>Now that we’ve set expectations for you all as students we’re going to give you all the time to create expectations for us as instructors!</a:t>
+              <a:t>Now that we’ve set expectations for you all as students we’re going to give you all the time to create expectations for us!</a:t>
             </a:r>
           </a:p>
           <a:p>
@@ -12926,20 +12926,16 @@
               <a:buNone/>
             </a:pPr>
             <a:r>
-              <a:rPr lang="en" dirty="0"/>
-              <a:t>YOUR </a:t>
-            </a:r>
-            <a:r>
               <a:rPr lang="en" dirty="0">
                 <a:highlight>
-                  <a:schemeClr val="accent2"/>
+                  <a:srgbClr val="97E4FF"/>
                 </a:highlight>
               </a:rPr>
-              <a:t>EXPECTATIONS </a:t>
+              <a:t>YOUR</a:t>
             </a:r>
             <a:r>
               <a:rPr lang="en" dirty="0"/>
-              <a:t>OF US</a:t>
+              <a:t> EXPECTATIONS</a:t>
             </a:r>
             <a:endParaRPr dirty="0">
               <a:highlight>
@@ -12984,8 +12980,8 @@
               <a:buNone/>
             </a:pPr>
             <a:r>
-              <a:rPr lang="en" dirty="0"/>
-              <a:t>GROUP 2</a:t>
+              <a:rPr lang="en-US" dirty="0"/>
+              <a:t>For Students</a:t>
             </a:r>
             <a:endParaRPr dirty="0"/>
           </a:p>
@@ -13019,7 +13015,7 @@
           <a:p>
             <a:r>
               <a:rPr lang="en-US" dirty="0"/>
-              <a:t>GROUP 1</a:t>
+              <a:t>For Instructors</a:t>
             </a:r>
           </a:p>
         </p:txBody>

</xml_diff>

<commit_message>
Update gitbook 2023-08-25 19:40:02
</commit_message>
<xml_diff>
--- a/IntroHyland/ClassroomExpectations.pptx
+++ b/IntroHyland/ClassroomExpectations.pptx
@@ -2129,7 +2129,7 @@
             </a:pPr>
             <a:r>
               <a:rPr lang="en-US" dirty="0"/>
-              <a:t>Now that we’ve set expectations for you all as students we’re going to give you all the time to create expectations for us as instructors!</a:t>
+              <a:t>Now that we’ve set expectations for you all as students we’re going to give you all the time to create expectations for us!</a:t>
             </a:r>
           </a:p>
           <a:p>
@@ -12926,20 +12926,16 @@
               <a:buNone/>
             </a:pPr>
             <a:r>
-              <a:rPr lang="en" dirty="0"/>
-              <a:t>YOUR </a:t>
-            </a:r>
-            <a:r>
               <a:rPr lang="en" dirty="0">
                 <a:highlight>
-                  <a:schemeClr val="accent2"/>
+                  <a:srgbClr val="97E4FF"/>
                 </a:highlight>
               </a:rPr>
-              <a:t>EXPECTATIONS </a:t>
+              <a:t>YOUR</a:t>
             </a:r>
             <a:r>
               <a:rPr lang="en" dirty="0"/>
-              <a:t>OF US</a:t>
+              <a:t> EXPECTATIONS</a:t>
             </a:r>
             <a:endParaRPr dirty="0">
               <a:highlight>
@@ -12984,8 +12980,8 @@
               <a:buNone/>
             </a:pPr>
             <a:r>
-              <a:rPr lang="en" dirty="0"/>
-              <a:t>GROUP 2</a:t>
+              <a:rPr lang="en-US" dirty="0"/>
+              <a:t>For Students</a:t>
             </a:r>
             <a:endParaRPr dirty="0"/>
           </a:p>
@@ -13019,7 +13015,7 @@
           <a:p>
             <a:r>
               <a:rPr lang="en-US" dirty="0"/>
-              <a:t>GROUP 1</a:t>
+              <a:t>For Instructors</a:t>
             </a:r>
           </a:p>
         </p:txBody>

</xml_diff>

<commit_message>
Update gitbook 2023-09-07 11:39:13
</commit_message>
<xml_diff>
--- a/IntroHyland/ClassroomExpectations.pptx
+++ b/IntroHyland/ClassroomExpectations.pptx
@@ -12407,8 +12407,25 @@
                 <a:latin typeface="Miriam Libre" panose="00000500000000000000" pitchFamily="2" charset="-79"/>
                 <a:cs typeface="Miriam Libre" panose="00000500000000000000" pitchFamily="2" charset="-79"/>
               </a:rPr>
-              <a:t>Call Mr. Taylor / Ms. Mac</a:t>
+              <a:t>Call Mr. Taylor / Mr. </a:t>
             </a:r>
+            <a:r>
+              <a:rPr lang="en-US" sz="2000" b="1">
+                <a:solidFill>
+                  <a:srgbClr val="FF0000"/>
+                </a:solidFill>
+                <a:latin typeface="Miriam Libre" panose="00000500000000000000" pitchFamily="2" charset="-79"/>
+                <a:cs typeface="Miriam Libre" panose="00000500000000000000" pitchFamily="2" charset="-79"/>
+              </a:rPr>
+              <a:t>K</a:t>
+            </a:r>
+            <a:endParaRPr lang="en-US" sz="2000" b="1" dirty="0">
+              <a:solidFill>
+                <a:srgbClr val="FF0000"/>
+              </a:solidFill>
+              <a:latin typeface="Miriam Libre" panose="00000500000000000000" pitchFamily="2" charset="-79"/>
+              <a:cs typeface="Miriam Libre" panose="00000500000000000000" pitchFamily="2" charset="-79"/>
+            </a:endParaRPr>
           </a:p>
         </p:txBody>
       </p:sp>

</xml_diff>